<commit_message>
ADS Gate Review - UI Layer Subsystems
</commit_message>
<xml_diff>
--- a/ADS Gate Review/Team Ink3d ADS.pptx
+++ b/ADS Gate Review/Team Ink3d ADS.pptx
@@ -19,6 +19,11 @@
     <p:sldId id="279" r:id="rId13"/>
     <p:sldId id="280" r:id="rId14"/>
     <p:sldId id="281" r:id="rId15"/>
+    <p:sldId id="282" r:id="rId16"/>
+    <p:sldId id="286" r:id="rId17"/>
+    <p:sldId id="283" r:id="rId18"/>
+    <p:sldId id="284" r:id="rId19"/>
+    <p:sldId id="285" r:id="rId20"/>
   </p:sldIdLst>
   <p:sldSz cx="9144000" cy="6858000" type="screen4x3"/>
   <p:notesSz cx="6858000" cy="9144000"/>
@@ -119,7 +124,7 @@
   </p:defaultTextStyle>
   <p:extLst>
     <p:ext uri="{EFAFB233-063F-42B5-8137-9DF3F51BA10A}">
-      <p15:sldGuideLst xmlns:p15="http://schemas.microsoft.com/office/powerpoint/2012/main" xmlns="">
+      <p15:sldGuideLst xmlns="" xmlns:p15="http://schemas.microsoft.com/office/powerpoint/2012/main">
         <p15:guide id="1" orient="horz" pos="2160">
           <p15:clr>
             <a:srgbClr val="A4A3A4"/>
@@ -330,7 +335,7 @@
           <a:p>
             <a:fld id="{8FF4DA45-B795-4CB0-B3BB-6A487B8C4B48}" type="datetimeFigureOut">
               <a:rPr lang="en-US" smtClean="0"/>
-              <a:t>12/7/2013</a:t>
+              <a:t>12/7/13</a:t>
             </a:fld>
             <a:endParaRPr lang="en-US"/>
           </a:p>
@@ -495,7 +500,7 @@
           <a:p>
             <a:fld id="{8FF4DA45-B795-4CB0-B3BB-6A487B8C4B48}" type="datetimeFigureOut">
               <a:rPr lang="en-US" smtClean="0"/>
-              <a:t>12/7/2013</a:t>
+              <a:t>12/7/13</a:t>
             </a:fld>
             <a:endParaRPr lang="en-US"/>
           </a:p>
@@ -670,7 +675,7 @@
           <a:p>
             <a:fld id="{8FF4DA45-B795-4CB0-B3BB-6A487B8C4B48}" type="datetimeFigureOut">
               <a:rPr lang="en-US" smtClean="0"/>
-              <a:t>12/7/2013</a:t>
+              <a:t>12/7/13</a:t>
             </a:fld>
             <a:endParaRPr lang="en-US"/>
           </a:p>
@@ -835,7 +840,7 @@
           <a:p>
             <a:fld id="{8FF4DA45-B795-4CB0-B3BB-6A487B8C4B48}" type="datetimeFigureOut">
               <a:rPr lang="en-US" smtClean="0"/>
-              <a:t>12/7/2013</a:t>
+              <a:t>12/7/13</a:t>
             </a:fld>
             <a:endParaRPr lang="en-US"/>
           </a:p>
@@ -1076,7 +1081,7 @@
           <a:p>
             <a:fld id="{8FF4DA45-B795-4CB0-B3BB-6A487B8C4B48}" type="datetimeFigureOut">
               <a:rPr lang="en-US" smtClean="0"/>
-              <a:t>12/7/2013</a:t>
+              <a:t>12/7/13</a:t>
             </a:fld>
             <a:endParaRPr lang="en-US"/>
           </a:p>
@@ -1359,7 +1364,7 @@
           <a:p>
             <a:fld id="{8FF4DA45-B795-4CB0-B3BB-6A487B8C4B48}" type="datetimeFigureOut">
               <a:rPr lang="en-US" smtClean="0"/>
-              <a:t>12/7/2013</a:t>
+              <a:t>12/7/13</a:t>
             </a:fld>
             <a:endParaRPr lang="en-US"/>
           </a:p>
@@ -1788,7 +1793,7 @@
           <a:p>
             <a:fld id="{8FF4DA45-B795-4CB0-B3BB-6A487B8C4B48}" type="datetimeFigureOut">
               <a:rPr lang="en-US" smtClean="0"/>
-              <a:t>12/7/2013</a:t>
+              <a:t>12/7/13</a:t>
             </a:fld>
             <a:endParaRPr lang="en-US"/>
           </a:p>
@@ -1901,7 +1906,7 @@
           <a:p>
             <a:fld id="{8FF4DA45-B795-4CB0-B3BB-6A487B8C4B48}" type="datetimeFigureOut">
               <a:rPr lang="en-US" smtClean="0"/>
-              <a:t>12/7/2013</a:t>
+              <a:t>12/7/13</a:t>
             </a:fld>
             <a:endParaRPr lang="en-US"/>
           </a:p>
@@ -1991,7 +1996,7 @@
           <a:p>
             <a:fld id="{8FF4DA45-B795-4CB0-B3BB-6A487B8C4B48}" type="datetimeFigureOut">
               <a:rPr lang="en-US" smtClean="0"/>
-              <a:t>12/7/2013</a:t>
+              <a:t>12/7/13</a:t>
             </a:fld>
             <a:endParaRPr lang="en-US"/>
           </a:p>
@@ -2180,7 +2185,7 @@
           <a:p>
             <a:fld id="{8FF4DA45-B795-4CB0-B3BB-6A487B8C4B48}" type="datetimeFigureOut">
               <a:rPr lang="en-US" smtClean="0"/>
-              <a:t>12/7/2013</a:t>
+              <a:t>12/7/13</a:t>
             </a:fld>
             <a:endParaRPr lang="en-US"/>
           </a:p>
@@ -2498,7 +2503,7 @@
           <a:p>
             <a:fld id="{8FF4DA45-B795-4CB0-B3BB-6A487B8C4B48}" type="datetimeFigureOut">
               <a:rPr lang="en-US" smtClean="0"/>
-              <a:t>12/7/2013</a:t>
+              <a:t>12/7/13</a:t>
             </a:fld>
             <a:endParaRPr lang="en-US"/>
           </a:p>
@@ -2877,7 +2882,7 @@
           <a:p>
             <a:fld id="{8FF4DA45-B795-4CB0-B3BB-6A487B8C4B48}" type="datetimeFigureOut">
               <a:rPr lang="en-US" smtClean="0"/>
-              <a:t>12/7/2013</a:t>
+              <a:t>12/7/13</a:t>
             </a:fld>
             <a:endParaRPr lang="en-US"/>
           </a:p>
@@ -3308,7 +3313,7 @@
   <p:timing>
     <p:tnLst>
       <p:par>
-        <p:cTn id="1" dur="indefinite" restart="never" nodeType="tmRoot"/>
+        <p:cTn xmlns:p14="http://schemas.microsoft.com/office/powerpoint/2010/main" id="1" dur="indefinite" restart="never" nodeType="tmRoot"/>
       </p:par>
     </p:tnLst>
   </p:timing>
@@ -3442,14 +3447,14 @@
           </a:ln>
           <a:effectLst/>
           <a:extLst>
-            <a:ext uri="{909E8E84-426E-40DD-AFC4-6F175D3DCCD1}">
+            <a:ext uri="{909E8E84-426E-40dd-AFC4-6F175D3DCCD1}">
               <a14:hiddenFill xmlns:a14="http://schemas.microsoft.com/office/drawing/2010/main">
                 <a:solidFill>
                   <a:schemeClr val="accent1"/>
                 </a:solidFill>
               </a14:hiddenFill>
             </a:ext>
-            <a:ext uri="{91240B29-F687-4F45-9708-019B960494DF}">
+            <a:ext uri="{91240B29-F687-4f45-9708-019B960494DF}">
               <a14:hiddenLine xmlns:a14="http://schemas.microsoft.com/office/drawing/2010/main" w="9525">
                 <a:solidFill>
                   <a:schemeClr val="tx1"/>
@@ -3459,7 +3464,7 @@
                 <a:tailEnd/>
               </a14:hiddenLine>
             </a:ext>
-            <a:ext uri="{AF507438-7753-43E0-B8FC-AC1667EBCBE1}">
+            <a:ext uri="{AF507438-7753-43e0-B8FC-AC1667EBCBE1}">
               <a14:hiddenEffects xmlns:a14="http://schemas.microsoft.com/office/drawing/2010/main">
                 <a:effectLst>
                   <a:outerShdw dist="35921" dir="2700000" algn="ctr" rotWithShape="0">
@@ -3619,14 +3624,14 @@
           </a:ln>
           <a:effectLst/>
           <a:extLst>
-            <a:ext uri="{909E8E84-426E-40DD-AFC4-6F175D3DCCD1}">
+            <a:ext uri="{909E8E84-426E-40dd-AFC4-6F175D3DCCD1}">
               <a14:hiddenFill xmlns:a14="http://schemas.microsoft.com/office/drawing/2010/main">
                 <a:solidFill>
                   <a:schemeClr val="accent1"/>
                 </a:solidFill>
               </a14:hiddenFill>
             </a:ext>
-            <a:ext uri="{91240B29-F687-4F45-9708-019B960494DF}">
+            <a:ext uri="{91240B29-F687-4f45-9708-019B960494DF}">
               <a14:hiddenLine xmlns:a14="http://schemas.microsoft.com/office/drawing/2010/main" w="9525">
                 <a:solidFill>
                   <a:schemeClr val="tx1"/>
@@ -3636,7 +3641,7 @@
                 <a:tailEnd/>
               </a14:hiddenLine>
             </a:ext>
-            <a:ext uri="{AF507438-7753-43E0-B8FC-AC1667EBCBE1}">
+            <a:ext uri="{AF507438-7753-43e0-B8FC-AC1667EBCBE1}">
               <a14:hiddenEffects xmlns:a14="http://schemas.microsoft.com/office/drawing/2010/main">
                 <a:effectLst>
                   <a:outerShdw dist="35921" dir="2700000" algn="ctr" rotWithShape="0">
@@ -3817,14 +3822,14 @@
           </a:ln>
           <a:effectLst/>
           <a:extLst>
-            <a:ext uri="{909E8E84-426E-40DD-AFC4-6F175D3DCCD1}">
+            <a:ext uri="{909E8E84-426E-40dd-AFC4-6F175D3DCCD1}">
               <a14:hiddenFill xmlns:a14="http://schemas.microsoft.com/office/drawing/2010/main">
                 <a:solidFill>
                   <a:schemeClr val="accent1"/>
                 </a:solidFill>
               </a14:hiddenFill>
             </a:ext>
-            <a:ext uri="{91240B29-F687-4F45-9708-019B960494DF}">
+            <a:ext uri="{91240B29-F687-4f45-9708-019B960494DF}">
               <a14:hiddenLine xmlns:a14="http://schemas.microsoft.com/office/drawing/2010/main" w="9525">
                 <a:solidFill>
                   <a:schemeClr val="tx1"/>
@@ -3834,7 +3839,7 @@
                 <a:tailEnd/>
               </a14:hiddenLine>
             </a:ext>
-            <a:ext uri="{AF507438-7753-43E0-B8FC-AC1667EBCBE1}">
+            <a:ext uri="{AF507438-7753-43e0-B8FC-AC1667EBCBE1}">
               <a14:hiddenEffects xmlns:a14="http://schemas.microsoft.com/office/drawing/2010/main">
                 <a:effectLst>
                   <a:outerShdw dist="35921" dir="2700000" algn="ctr" rotWithShape="0">
@@ -4000,14 +4005,14 @@
           </a:ln>
           <a:effectLst/>
           <a:extLst>
-            <a:ext uri="{909E8E84-426E-40DD-AFC4-6F175D3DCCD1}">
+            <a:ext uri="{909E8E84-426E-40dd-AFC4-6F175D3DCCD1}">
               <a14:hiddenFill xmlns:a14="http://schemas.microsoft.com/office/drawing/2010/main">
                 <a:solidFill>
                   <a:schemeClr val="accent1"/>
                 </a:solidFill>
               </a14:hiddenFill>
             </a:ext>
-            <a:ext uri="{91240B29-F687-4F45-9708-019B960494DF}">
+            <a:ext uri="{91240B29-F687-4f45-9708-019B960494DF}">
               <a14:hiddenLine xmlns:a14="http://schemas.microsoft.com/office/drawing/2010/main" w="9525">
                 <a:solidFill>
                   <a:schemeClr val="tx1"/>
@@ -4017,7 +4022,7 @@
                 <a:tailEnd/>
               </a14:hiddenLine>
             </a:ext>
-            <a:ext uri="{AF507438-7753-43E0-B8FC-AC1667EBCBE1}">
+            <a:ext uri="{AF507438-7753-43e0-B8FC-AC1667EBCBE1}">
               <a14:hiddenEffects xmlns:a14="http://schemas.microsoft.com/office/drawing/2010/main">
                 <a:effectLst>
                   <a:outerShdw dist="35921" dir="2700000" algn="ctr" rotWithShape="0">
@@ -4116,14 +4121,14 @@
           </a:ln>
           <a:effectLst/>
           <a:extLst>
-            <a:ext uri="{909E8E84-426E-40DD-AFC4-6F175D3DCCD1}">
+            <a:ext uri="{909E8E84-426E-40dd-AFC4-6F175D3DCCD1}">
               <a14:hiddenFill xmlns:a14="http://schemas.microsoft.com/office/drawing/2010/main">
                 <a:solidFill>
                   <a:schemeClr val="accent1"/>
                 </a:solidFill>
               </a14:hiddenFill>
             </a:ext>
-            <a:ext uri="{91240B29-F687-4F45-9708-019B960494DF}">
+            <a:ext uri="{91240B29-F687-4f45-9708-019B960494DF}">
               <a14:hiddenLine xmlns:a14="http://schemas.microsoft.com/office/drawing/2010/main" w="9525">
                 <a:solidFill>
                   <a:schemeClr val="tx1"/>
@@ -4133,7 +4138,7 @@
                 <a:tailEnd/>
               </a14:hiddenLine>
             </a:ext>
-            <a:ext uri="{AF507438-7753-43E0-B8FC-AC1667EBCBE1}">
+            <a:ext uri="{AF507438-7753-43e0-B8FC-AC1667EBCBE1}">
               <a14:hiddenEffects xmlns:a14="http://schemas.microsoft.com/office/drawing/2010/main">
                 <a:effectLst>
                   <a:outerShdw dist="35921" dir="2700000" algn="ctr" rotWithShape="0">
@@ -4179,14 +4184,14 @@
           </a:ln>
           <a:effectLst/>
           <a:extLst>
-            <a:ext uri="{909E8E84-426E-40DD-AFC4-6F175D3DCCD1}">
+            <a:ext uri="{909E8E84-426E-40dd-AFC4-6F175D3DCCD1}">
               <a14:hiddenFill xmlns:a14="http://schemas.microsoft.com/office/drawing/2010/main">
                 <a:solidFill>
                   <a:schemeClr val="accent1"/>
                 </a:solidFill>
               </a14:hiddenFill>
             </a:ext>
-            <a:ext uri="{91240B29-F687-4F45-9708-019B960494DF}">
+            <a:ext uri="{91240B29-F687-4f45-9708-019B960494DF}">
               <a14:hiddenLine xmlns:a14="http://schemas.microsoft.com/office/drawing/2010/main" w="9525">
                 <a:solidFill>
                   <a:schemeClr val="tx1"/>
@@ -4196,7 +4201,7 @@
                 <a:tailEnd/>
               </a14:hiddenLine>
             </a:ext>
-            <a:ext uri="{AF507438-7753-43E0-B8FC-AC1667EBCBE1}">
+            <a:ext uri="{AF507438-7753-43e0-B8FC-AC1667EBCBE1}">
               <a14:hiddenEffects xmlns:a14="http://schemas.microsoft.com/office/drawing/2010/main">
                 <a:effectLst>
                   <a:outerShdw dist="35921" dir="2700000" algn="ctr" rotWithShape="0">
@@ -4242,7 +4247,7 @@
           <a:graphicData uri="http://schemas.openxmlformats.org/presentationml/2006/ole">
             <mc:AlternateContent xmlns:mc="http://schemas.openxmlformats.org/markup-compatibility/2006">
               <mc:Choice xmlns:v="urn:schemas-microsoft-com:vml" Requires="v">
-                <p:oleObj spid="_x0000_s2052" name="Visio" r:id="rId3" imgW="6972264" imgH="8633520" progId="Visio.Drawing.15">
+                <p:oleObj spid="_x0000_s2056" name="Visio" r:id="rId3" imgW="6972264" imgH="8633520" progId="Visio.Drawing.15">
                   <p:embed/>
                 </p:oleObj>
               </mc:Choice>
@@ -4300,6 +4305,589 @@
 </p:sld>
 </file>
 
+<file path=ppt/slides/slide15.xml><?xml version="1.0" encoding="utf-8"?>
+<p:sld xmlns:a="http://schemas.openxmlformats.org/drawingml/2006/main" xmlns:r="http://schemas.openxmlformats.org/officeDocument/2006/relationships" xmlns:p="http://schemas.openxmlformats.org/presentationml/2006/main">
+  <p:cSld>
+    <p:spTree>
+      <p:nvGrpSpPr>
+        <p:cNvPr id="1" name=""/>
+        <p:cNvGrpSpPr/>
+        <p:nvPr/>
+      </p:nvGrpSpPr>
+      <p:grpSpPr>
+        <a:xfrm>
+          <a:off x="0" y="0"/>
+          <a:ext cx="0" cy="0"/>
+          <a:chOff x="0" y="0"/>
+          <a:chExt cx="0" cy="0"/>
+        </a:xfrm>
+      </p:grpSpPr>
+      <p:sp>
+        <p:nvSpPr>
+          <p:cNvPr id="2" name="Title 1"/>
+          <p:cNvSpPr>
+            <a:spLocks noGrp="1"/>
+          </p:cNvSpPr>
+          <p:nvPr>
+            <p:ph type="title"/>
+          </p:nvPr>
+        </p:nvSpPr>
+        <p:spPr/>
+        <p:txBody>
+          <a:bodyPr/>
+          <a:lstStyle/>
+          <a:p>
+            <a:r>
+              <a:rPr lang="en-US" sz="4400" dirty="0" smtClean="0"/>
+              <a:t>User Interface Layer Subsystems</a:t>
+            </a:r>
+            <a:endParaRPr lang="en-US" sz="4400" dirty="0"/>
+          </a:p>
+        </p:txBody>
+      </p:sp>
+      <p:sp>
+        <p:nvSpPr>
+          <p:cNvPr id="3" name="Content Placeholder 2"/>
+          <p:cNvSpPr>
+            <a:spLocks noGrp="1"/>
+          </p:cNvSpPr>
+          <p:nvPr>
+            <p:ph idx="1"/>
+          </p:nvPr>
+        </p:nvSpPr>
+        <p:spPr/>
+        <p:txBody>
+          <a:bodyPr>
+            <a:normAutofit/>
+          </a:bodyPr>
+          <a:lstStyle/>
+          <a:p>
+            <a:r>
+              <a:rPr lang="en-US" dirty="0" smtClean="0"/>
+              <a:t>Import Module</a:t>
+            </a:r>
+          </a:p>
+          <a:p>
+            <a:pPr lvl="1"/>
+            <a:r>
+              <a:rPr lang="en-US" dirty="0" smtClean="0"/>
+              <a:t>Purpose:  Allow the user to import object files</a:t>
+            </a:r>
+          </a:p>
+          <a:p>
+            <a:pPr lvl="1"/>
+            <a:r>
+              <a:rPr lang="en-US" dirty="0" smtClean="0"/>
+              <a:t>Function:  Display interface from which users import files and pass those files to the Print Module.</a:t>
+            </a:r>
+          </a:p>
+          <a:p>
+            <a:pPr lvl="1"/>
+            <a:r>
+              <a:rPr lang="en-US" dirty="0" smtClean="0"/>
+              <a:t>Dependencies:  Print Module</a:t>
+            </a:r>
+          </a:p>
+          <a:p>
+            <a:pPr lvl="1"/>
+            <a:r>
+              <a:rPr lang="en-US" dirty="0" smtClean="0"/>
+              <a:t>Processing:  Create reference to an object file.</a:t>
+            </a:r>
+          </a:p>
+          <a:p>
+            <a:pPr lvl="1"/>
+            <a:r>
+              <a:rPr lang="en-US" dirty="0" smtClean="0"/>
+              <a:t>Input:  Object File Name</a:t>
+            </a:r>
+          </a:p>
+          <a:p>
+            <a:pPr lvl="1"/>
+            <a:r>
+              <a:rPr lang="en-US" dirty="0" smtClean="0"/>
+              <a:t>Output:  Object File Reference</a:t>
+            </a:r>
+          </a:p>
+          <a:p>
+            <a:pPr lvl="1"/>
+            <a:endParaRPr lang="en-US" dirty="0"/>
+          </a:p>
+        </p:txBody>
+      </p:sp>
+    </p:spTree>
+    <p:extLst>
+      <p:ext uri="{BB962C8B-B14F-4D97-AF65-F5344CB8AC3E}">
+        <p14:creationId xmlns:p14="http://schemas.microsoft.com/office/powerpoint/2010/main" val="4018146552"/>
+      </p:ext>
+    </p:extLst>
+  </p:cSld>
+  <p:clrMapOvr>
+    <a:masterClrMapping/>
+  </p:clrMapOvr>
+</p:sld>
+</file>
+
+<file path=ppt/slides/slide16.xml><?xml version="1.0" encoding="utf-8"?>
+<p:sld xmlns:a="http://schemas.openxmlformats.org/drawingml/2006/main" xmlns:r="http://schemas.openxmlformats.org/officeDocument/2006/relationships" xmlns:p="http://schemas.openxmlformats.org/presentationml/2006/main">
+  <p:cSld>
+    <p:spTree>
+      <p:nvGrpSpPr>
+        <p:cNvPr id="1" name=""/>
+        <p:cNvGrpSpPr/>
+        <p:nvPr/>
+      </p:nvGrpSpPr>
+      <p:grpSpPr>
+        <a:xfrm>
+          <a:off x="0" y="0"/>
+          <a:ext cx="0" cy="0"/>
+          <a:chOff x="0" y="0"/>
+          <a:chExt cx="0" cy="0"/>
+        </a:xfrm>
+      </p:grpSpPr>
+      <p:sp>
+        <p:nvSpPr>
+          <p:cNvPr id="2" name="Title 1"/>
+          <p:cNvSpPr>
+            <a:spLocks noGrp="1"/>
+          </p:cNvSpPr>
+          <p:nvPr>
+            <p:ph type="title"/>
+          </p:nvPr>
+        </p:nvSpPr>
+        <p:spPr/>
+        <p:txBody>
+          <a:bodyPr/>
+          <a:lstStyle/>
+          <a:p>
+            <a:r>
+              <a:rPr lang="en-US" sz="4400" dirty="0"/>
+              <a:t>User Interface Layer Subsystems</a:t>
+            </a:r>
+          </a:p>
+        </p:txBody>
+      </p:sp>
+      <p:sp>
+        <p:nvSpPr>
+          <p:cNvPr id="3" name="Content Placeholder 2"/>
+          <p:cNvSpPr>
+            <a:spLocks noGrp="1"/>
+          </p:cNvSpPr>
+          <p:nvPr>
+            <p:ph idx="1"/>
+          </p:nvPr>
+        </p:nvSpPr>
+        <p:spPr/>
+        <p:txBody>
+          <a:bodyPr/>
+          <a:lstStyle/>
+          <a:p>
+            <a:r>
+              <a:rPr lang="en-US" dirty="0"/>
+              <a:t>Print Module</a:t>
+            </a:r>
+          </a:p>
+          <a:p>
+            <a:pPr lvl="1"/>
+            <a:r>
+              <a:rPr lang="en-US" dirty="0"/>
+              <a:t>Purpose:  Allow user to set print specific settings and initiate a print job.</a:t>
+            </a:r>
+          </a:p>
+          <a:p>
+            <a:pPr lvl="1"/>
+            <a:r>
+              <a:rPr lang="en-US" dirty="0"/>
+              <a:t>Function:  Display interface from which users can set print settings and initiate a print.  Pass the necessary information to the Preprocessing Layer when a print is initiated.</a:t>
+            </a:r>
+          </a:p>
+          <a:p>
+            <a:pPr lvl="1"/>
+            <a:r>
+              <a:rPr lang="en-US" dirty="0"/>
+              <a:t>Dependencies:  Database Interface</a:t>
+            </a:r>
+          </a:p>
+          <a:p>
+            <a:pPr lvl="1"/>
+            <a:r>
+              <a:rPr lang="en-US" dirty="0"/>
+              <a:t>Processing:  Map materials to object files.  Package print request object.</a:t>
+            </a:r>
+          </a:p>
+          <a:p>
+            <a:pPr lvl="1"/>
+            <a:r>
+              <a:rPr lang="en-US" dirty="0"/>
+              <a:t>Input:  Print Settings, Printer Configuration, Material Data, Object File References</a:t>
+            </a:r>
+          </a:p>
+        </p:txBody>
+      </p:sp>
+    </p:spTree>
+    <p:extLst>
+      <p:ext uri="{BB962C8B-B14F-4D97-AF65-F5344CB8AC3E}">
+        <p14:creationId xmlns:p14="http://schemas.microsoft.com/office/powerpoint/2010/main" val="2268171978"/>
+      </p:ext>
+    </p:extLst>
+  </p:cSld>
+  <p:clrMapOvr>
+    <a:masterClrMapping/>
+  </p:clrMapOvr>
+</p:sld>
+</file>
+
+<file path=ppt/slides/slide17.xml><?xml version="1.0" encoding="utf-8"?>
+<p:sld xmlns:a="http://schemas.openxmlformats.org/drawingml/2006/main" xmlns:r="http://schemas.openxmlformats.org/officeDocument/2006/relationships" xmlns:p="http://schemas.openxmlformats.org/presentationml/2006/main">
+  <p:cSld>
+    <p:spTree>
+      <p:nvGrpSpPr>
+        <p:cNvPr id="1" name=""/>
+        <p:cNvGrpSpPr/>
+        <p:nvPr/>
+      </p:nvGrpSpPr>
+      <p:grpSpPr>
+        <a:xfrm>
+          <a:off x="0" y="0"/>
+          <a:ext cx="0" cy="0"/>
+          <a:chOff x="0" y="0"/>
+          <a:chExt cx="0" cy="0"/>
+        </a:xfrm>
+      </p:grpSpPr>
+      <p:sp>
+        <p:nvSpPr>
+          <p:cNvPr id="2" name="Title 1"/>
+          <p:cNvSpPr>
+            <a:spLocks noGrp="1"/>
+          </p:cNvSpPr>
+          <p:nvPr>
+            <p:ph type="title"/>
+          </p:nvPr>
+        </p:nvSpPr>
+        <p:spPr/>
+        <p:txBody>
+          <a:bodyPr/>
+          <a:lstStyle/>
+          <a:p>
+            <a:r>
+              <a:rPr lang="en-US" sz="4400" dirty="0" smtClean="0"/>
+              <a:t>User Interface Layer Subsystems</a:t>
+            </a:r>
+            <a:endParaRPr lang="en-US" sz="4400" dirty="0"/>
+          </a:p>
+        </p:txBody>
+      </p:sp>
+      <p:sp>
+        <p:nvSpPr>
+          <p:cNvPr id="3" name="Content Placeholder 2"/>
+          <p:cNvSpPr>
+            <a:spLocks noGrp="1"/>
+          </p:cNvSpPr>
+          <p:nvPr>
+            <p:ph idx="1"/>
+          </p:nvPr>
+        </p:nvSpPr>
+        <p:spPr/>
+        <p:txBody>
+          <a:bodyPr/>
+          <a:lstStyle/>
+          <a:p>
+            <a:r>
+              <a:rPr lang="en-US" dirty="0" smtClean="0"/>
+              <a:t>Configuration Module</a:t>
+            </a:r>
+          </a:p>
+          <a:p>
+            <a:pPr lvl="1"/>
+            <a:r>
+              <a:rPr lang="en-US" dirty="0" smtClean="0"/>
+              <a:t>Purpose:  Allow the user to configure printer settings and material information.</a:t>
+            </a:r>
+          </a:p>
+          <a:p>
+            <a:pPr lvl="1"/>
+            <a:r>
+              <a:rPr lang="en-US" dirty="0" smtClean="0"/>
+              <a:t>Function:  Display interface from which users can input printer configuration and material information.  Pass information to the Database Interface to be saved.</a:t>
+            </a:r>
+          </a:p>
+          <a:p>
+            <a:pPr lvl="1"/>
+            <a:r>
+              <a:rPr lang="en-US" dirty="0" smtClean="0"/>
+              <a:t>Dependencies:  Database Interface</a:t>
+            </a:r>
+          </a:p>
+          <a:p>
+            <a:pPr lvl="1"/>
+            <a:r>
+              <a:rPr lang="en-US" dirty="0" smtClean="0"/>
+              <a:t>Processing:  User Input Processing</a:t>
+            </a:r>
+          </a:p>
+          <a:p>
+            <a:pPr lvl="1"/>
+            <a:r>
+              <a:rPr lang="en-US" dirty="0" smtClean="0"/>
+              <a:t>Input:  Printer Configuration Data, Material Data</a:t>
+            </a:r>
+          </a:p>
+          <a:p>
+            <a:pPr lvl="1"/>
+            <a:r>
+              <a:rPr lang="en-US" dirty="0" smtClean="0"/>
+              <a:t>Output:  Printer Configuration Data, Material Data</a:t>
+            </a:r>
+            <a:endParaRPr lang="en-US" dirty="0"/>
+          </a:p>
+        </p:txBody>
+      </p:sp>
+    </p:spTree>
+    <p:extLst>
+      <p:ext uri="{BB962C8B-B14F-4D97-AF65-F5344CB8AC3E}">
+        <p14:creationId xmlns:p14="http://schemas.microsoft.com/office/powerpoint/2010/main" val="4098163977"/>
+      </p:ext>
+    </p:extLst>
+  </p:cSld>
+  <p:clrMapOvr>
+    <a:masterClrMapping/>
+  </p:clrMapOvr>
+</p:sld>
+</file>
+
+<file path=ppt/slides/slide18.xml><?xml version="1.0" encoding="utf-8"?>
+<p:sld xmlns:a="http://schemas.openxmlformats.org/drawingml/2006/main" xmlns:r="http://schemas.openxmlformats.org/officeDocument/2006/relationships" xmlns:p="http://schemas.openxmlformats.org/presentationml/2006/main">
+  <p:cSld>
+    <p:spTree>
+      <p:nvGrpSpPr>
+        <p:cNvPr id="1" name=""/>
+        <p:cNvGrpSpPr/>
+        <p:nvPr/>
+      </p:nvGrpSpPr>
+      <p:grpSpPr>
+        <a:xfrm>
+          <a:off x="0" y="0"/>
+          <a:ext cx="0" cy="0"/>
+          <a:chOff x="0" y="0"/>
+          <a:chExt cx="0" cy="0"/>
+        </a:xfrm>
+      </p:grpSpPr>
+      <p:sp>
+        <p:nvSpPr>
+          <p:cNvPr id="2" name="Title 1"/>
+          <p:cNvSpPr>
+            <a:spLocks noGrp="1"/>
+          </p:cNvSpPr>
+          <p:nvPr>
+            <p:ph type="title"/>
+          </p:nvPr>
+        </p:nvSpPr>
+        <p:spPr/>
+        <p:txBody>
+          <a:bodyPr/>
+          <a:lstStyle/>
+          <a:p>
+            <a:r>
+              <a:rPr lang="en-US" sz="4400" dirty="0"/>
+              <a:t>User Interface Layer Subsystems</a:t>
+            </a:r>
+          </a:p>
+        </p:txBody>
+      </p:sp>
+      <p:sp>
+        <p:nvSpPr>
+          <p:cNvPr id="3" name="Content Placeholder 2"/>
+          <p:cNvSpPr>
+            <a:spLocks noGrp="1"/>
+          </p:cNvSpPr>
+          <p:nvPr>
+            <p:ph idx="1"/>
+          </p:nvPr>
+        </p:nvSpPr>
+        <p:spPr/>
+        <p:txBody>
+          <a:bodyPr/>
+          <a:lstStyle/>
+          <a:p>
+            <a:r>
+              <a:rPr lang="en-US" dirty="0" smtClean="0"/>
+              <a:t>Database Interface</a:t>
+            </a:r>
+          </a:p>
+          <a:p>
+            <a:pPr lvl="1"/>
+            <a:r>
+              <a:rPr lang="en-US" dirty="0" smtClean="0"/>
+              <a:t>Purpose:  Abstract data persistence</a:t>
+            </a:r>
+          </a:p>
+          <a:p>
+            <a:pPr lvl="1"/>
+            <a:r>
+              <a:rPr lang="en-US" dirty="0" smtClean="0"/>
+              <a:t>Function:  Receive data from other modules and store it in a database.  Retrieve data from the database for other modules.</a:t>
+            </a:r>
+          </a:p>
+          <a:p>
+            <a:pPr lvl="1"/>
+            <a:r>
+              <a:rPr lang="en-US" dirty="0" smtClean="0"/>
+              <a:t>Dependencies:  None</a:t>
+            </a:r>
+          </a:p>
+          <a:p>
+            <a:pPr lvl="1"/>
+            <a:r>
+              <a:rPr lang="en-US" dirty="0" smtClean="0"/>
+              <a:t>Processing:  Database query generation</a:t>
+            </a:r>
+          </a:p>
+          <a:p>
+            <a:pPr lvl="1"/>
+            <a:r>
+              <a:rPr lang="en-US" dirty="0" smtClean="0"/>
+              <a:t>Input:  Configuration Information</a:t>
+            </a:r>
+          </a:p>
+          <a:p>
+            <a:pPr lvl="1"/>
+            <a:r>
+              <a:rPr lang="en-US" dirty="0" smtClean="0"/>
+              <a:t>Output:  CRUD Operations, Configuration Information</a:t>
+            </a:r>
+          </a:p>
+          <a:p>
+            <a:pPr lvl="1"/>
+            <a:endParaRPr lang="en-US" dirty="0" smtClean="0"/>
+          </a:p>
+        </p:txBody>
+      </p:sp>
+    </p:spTree>
+    <p:extLst>
+      <p:ext uri="{BB962C8B-B14F-4D97-AF65-F5344CB8AC3E}">
+        <p14:creationId xmlns:p14="http://schemas.microsoft.com/office/powerpoint/2010/main" val="1146536164"/>
+      </p:ext>
+    </p:extLst>
+  </p:cSld>
+  <p:clrMapOvr>
+    <a:masterClrMapping/>
+  </p:clrMapOvr>
+</p:sld>
+</file>
+
+<file path=ppt/slides/slide19.xml><?xml version="1.0" encoding="utf-8"?>
+<p:sld xmlns:a="http://schemas.openxmlformats.org/drawingml/2006/main" xmlns:r="http://schemas.openxmlformats.org/officeDocument/2006/relationships" xmlns:p="http://schemas.openxmlformats.org/presentationml/2006/main">
+  <p:cSld>
+    <p:spTree>
+      <p:nvGrpSpPr>
+        <p:cNvPr id="1" name=""/>
+        <p:cNvGrpSpPr/>
+        <p:nvPr/>
+      </p:nvGrpSpPr>
+      <p:grpSpPr>
+        <a:xfrm>
+          <a:off x="0" y="0"/>
+          <a:ext cx="0" cy="0"/>
+          <a:chOff x="0" y="0"/>
+          <a:chExt cx="0" cy="0"/>
+        </a:xfrm>
+      </p:grpSpPr>
+      <p:sp>
+        <p:nvSpPr>
+          <p:cNvPr id="2" name="Title 1"/>
+          <p:cNvSpPr>
+            <a:spLocks noGrp="1"/>
+          </p:cNvSpPr>
+          <p:nvPr>
+            <p:ph type="title"/>
+          </p:nvPr>
+        </p:nvSpPr>
+        <p:spPr/>
+        <p:txBody>
+          <a:bodyPr/>
+          <a:lstStyle/>
+          <a:p>
+            <a:r>
+              <a:rPr lang="en-US" sz="4400" dirty="0"/>
+              <a:t>User Interface Layer Subsystems</a:t>
+            </a:r>
+          </a:p>
+        </p:txBody>
+      </p:sp>
+      <p:sp>
+        <p:nvSpPr>
+          <p:cNvPr id="3" name="Content Placeholder 2"/>
+          <p:cNvSpPr>
+            <a:spLocks noGrp="1"/>
+          </p:cNvSpPr>
+          <p:nvPr>
+            <p:ph idx="1"/>
+          </p:nvPr>
+        </p:nvSpPr>
+        <p:spPr/>
+        <p:txBody>
+          <a:bodyPr/>
+          <a:lstStyle/>
+          <a:p>
+            <a:r>
+              <a:rPr lang="en-US" dirty="0" smtClean="0"/>
+              <a:t>Status Module</a:t>
+            </a:r>
+          </a:p>
+          <a:p>
+            <a:pPr lvl="1"/>
+            <a:r>
+              <a:rPr lang="en-US" dirty="0" smtClean="0"/>
+              <a:t>Purpose:  Display printer status information to the user and allow the user to stop/pause/resume a print job.</a:t>
+            </a:r>
+          </a:p>
+          <a:p>
+            <a:pPr lvl="1"/>
+            <a:r>
+              <a:rPr lang="en-US" dirty="0" smtClean="0"/>
+              <a:t>Function:  Interpret data from the Printer Feedback Layer and display the data to the user.  Send stop/pause/resume commands to the Physical Layer.</a:t>
+            </a:r>
+          </a:p>
+          <a:p>
+            <a:pPr lvl="1"/>
+            <a:r>
+              <a:rPr lang="en-US" dirty="0" smtClean="0"/>
+              <a:t>Processing:  User Input Processing</a:t>
+            </a:r>
+          </a:p>
+          <a:p>
+            <a:pPr lvl="1"/>
+            <a:r>
+              <a:rPr lang="en-US" dirty="0" smtClean="0"/>
+              <a:t>Input:  Stop/Pause/Resume User Input, Printer State Data, Configuration Data</a:t>
+            </a:r>
+          </a:p>
+          <a:p>
+            <a:pPr lvl="1"/>
+            <a:r>
+              <a:rPr lang="en-US" dirty="0" smtClean="0"/>
+              <a:t>Output:  Stop/Pause/Resume Command</a:t>
+            </a:r>
+          </a:p>
+          <a:p>
+            <a:pPr lvl="1"/>
+            <a:endParaRPr lang="en-US" dirty="0"/>
+          </a:p>
+        </p:txBody>
+      </p:sp>
+    </p:spTree>
+    <p:extLst>
+      <p:ext uri="{BB962C8B-B14F-4D97-AF65-F5344CB8AC3E}">
+        <p14:creationId xmlns:p14="http://schemas.microsoft.com/office/powerpoint/2010/main" val="4290690680"/>
+      </p:ext>
+    </p:extLst>
+  </p:cSld>
+  <p:clrMapOvr>
+    <a:masterClrMapping/>
+  </p:clrMapOvr>
+</p:sld>
+</file>
+
 <file path=ppt/slides/slide2.xml><?xml version="1.0" encoding="utf-8"?>
 <p:sld xmlns:a="http://schemas.openxmlformats.org/drawingml/2006/main" xmlns:r="http://schemas.openxmlformats.org/officeDocument/2006/relationships" xmlns:p="http://schemas.openxmlformats.org/presentationml/2006/main">
   <p:cSld>
@@ -5012,14 +5600,14 @@
           </a:ln>
           <a:effectLst/>
           <a:extLst>
-            <a:ext uri="{909E8E84-426E-40DD-AFC4-6F175D3DCCD1}">
+            <a:ext uri="{909E8E84-426E-40dd-AFC4-6F175D3DCCD1}">
               <a14:hiddenFill xmlns:a14="http://schemas.microsoft.com/office/drawing/2010/main">
                 <a:solidFill>
                   <a:schemeClr val="accent1"/>
                 </a:solidFill>
               </a14:hiddenFill>
             </a:ext>
-            <a:ext uri="{91240B29-F687-4F45-9708-019B960494DF}">
+            <a:ext uri="{91240B29-F687-4f45-9708-019B960494DF}">
               <a14:hiddenLine xmlns:a14="http://schemas.microsoft.com/office/drawing/2010/main" w="9525">
                 <a:solidFill>
                   <a:schemeClr val="tx1"/>
@@ -5029,7 +5617,7 @@
                 <a:tailEnd/>
               </a14:hiddenLine>
             </a:ext>
-            <a:ext uri="{AF507438-7753-43E0-B8FC-AC1667EBCBE1}">
+            <a:ext uri="{AF507438-7753-43e0-B8FC-AC1667EBCBE1}">
               <a14:hiddenEffects xmlns:a14="http://schemas.microsoft.com/office/drawing/2010/main">
                 <a:effectLst>
                   <a:outerShdw dist="35921" dir="2700000" algn="ctr" rotWithShape="0">
@@ -5075,7 +5663,7 @@
           <a:graphicData uri="http://schemas.openxmlformats.org/presentationml/2006/ole">
             <mc:AlternateContent xmlns:mc="http://schemas.openxmlformats.org/markup-compatibility/2006">
               <mc:Choice xmlns:v="urn:schemas-microsoft-com:vml" Requires="v">
-                <p:oleObj spid="_x0000_s1030" name="Visio" r:id="rId3" imgW="3867210" imgH="4695840" progId="Visio.Drawing.15">
+                <p:oleObj spid="_x0000_s1034" name="Visio" r:id="rId3" imgW="3867210" imgH="4695840" progId="Visio.Drawing.15">
                   <p:embed/>
                 </p:oleObj>
               </mc:Choice>
@@ -5285,14 +5873,14 @@
           </a:ln>
           <a:effectLst/>
           <a:extLst>
-            <a:ext uri="{909E8E84-426E-40DD-AFC4-6F175D3DCCD1}">
+            <a:ext uri="{909E8E84-426E-40dd-AFC4-6F175D3DCCD1}">
               <a14:hiddenFill xmlns:a14="http://schemas.microsoft.com/office/drawing/2010/main">
                 <a:solidFill>
                   <a:schemeClr val="accent1"/>
                 </a:solidFill>
               </a14:hiddenFill>
             </a:ext>
-            <a:ext uri="{91240B29-F687-4F45-9708-019B960494DF}">
+            <a:ext uri="{91240B29-F687-4f45-9708-019B960494DF}">
               <a14:hiddenLine xmlns:a14="http://schemas.microsoft.com/office/drawing/2010/main" w="9525">
                 <a:solidFill>
                   <a:schemeClr val="tx1"/>
@@ -5302,7 +5890,7 @@
                 <a:tailEnd/>
               </a14:hiddenLine>
             </a:ext>
-            <a:ext uri="{AF507438-7753-43E0-B8FC-AC1667EBCBE1}">
+            <a:ext uri="{AF507438-7753-43e0-B8FC-AC1667EBCBE1}">
               <a14:hiddenEffects xmlns:a14="http://schemas.microsoft.com/office/drawing/2010/main">
                 <a:effectLst>
                   <a:outerShdw dist="35921" dir="2700000" algn="ctr" rotWithShape="0">
@@ -5462,14 +6050,14 @@
           </a:ln>
           <a:effectLst/>
           <a:extLst>
-            <a:ext uri="{909E8E84-426E-40DD-AFC4-6F175D3DCCD1}">
+            <a:ext uri="{909E8E84-426E-40dd-AFC4-6F175D3DCCD1}">
               <a14:hiddenFill xmlns:a14="http://schemas.microsoft.com/office/drawing/2010/main">
                 <a:solidFill>
                   <a:schemeClr val="accent1"/>
                 </a:solidFill>
               </a14:hiddenFill>
             </a:ext>
-            <a:ext uri="{91240B29-F687-4F45-9708-019B960494DF}">
+            <a:ext uri="{91240B29-F687-4f45-9708-019B960494DF}">
               <a14:hiddenLine xmlns:a14="http://schemas.microsoft.com/office/drawing/2010/main" w="9525">
                 <a:solidFill>
                   <a:schemeClr val="tx1"/>
@@ -5479,7 +6067,7 @@
                 <a:tailEnd/>
               </a14:hiddenLine>
             </a:ext>
-            <a:ext uri="{AF507438-7753-43E0-B8FC-AC1667EBCBE1}">
+            <a:ext uri="{AF507438-7753-43e0-B8FC-AC1667EBCBE1}">
               <a14:hiddenEffects xmlns:a14="http://schemas.microsoft.com/office/drawing/2010/main">
                 <a:effectLst>
                   <a:outerShdw dist="35921" dir="2700000" algn="ctr" rotWithShape="0">

</xml_diff>

<commit_message>
Updated ADS Presentation #2
</commit_message>
<xml_diff>
--- a/ADS Gate Review/Team Ink3d ADS.pptx
+++ b/ADS Gate Review/Team Ink3d ADS.pptx
@@ -3454,14 +3454,14 @@
           <a:effectLst/>
           <a:extLst>
             <a:ext uri="{909E8E84-426E-40dd-AFC4-6F175D3DCCD1}">
-              <a14:hiddenFill xmlns:a14="http://schemas.microsoft.com/office/drawing/2010/main" xmlns="">
+              <a14:hiddenFill xmlns="" xmlns:a14="http://schemas.microsoft.com/office/drawing/2010/main">
                 <a:solidFill>
                   <a:schemeClr val="accent1"/>
                 </a:solidFill>
               </a14:hiddenFill>
             </a:ext>
             <a:ext uri="{91240B29-F687-4f45-9708-019B960494DF}">
-              <a14:hiddenLine xmlns:a14="http://schemas.microsoft.com/office/drawing/2010/main" xmlns="" w="9525">
+              <a14:hiddenLine xmlns="" xmlns:a14="http://schemas.microsoft.com/office/drawing/2010/main" w="9525">
                 <a:solidFill>
                   <a:schemeClr val="tx1"/>
                 </a:solidFill>
@@ -3471,7 +3471,7 @@
               </a14:hiddenLine>
             </a:ext>
             <a:ext uri="{AF507438-7753-43e0-B8FC-AC1667EBCBE1}">
-              <a14:hiddenEffects xmlns:a14="http://schemas.microsoft.com/office/drawing/2010/main" xmlns="">
+              <a14:hiddenEffects xmlns="" xmlns:a14="http://schemas.microsoft.com/office/drawing/2010/main">
                 <a:effectLst>
                   <a:outerShdw dist="35921" dir="2700000" algn="ctr" rotWithShape="0">
                     <a:schemeClr val="bg2"/>
@@ -3631,14 +3631,14 @@
           <a:effectLst/>
           <a:extLst>
             <a:ext uri="{909E8E84-426E-40dd-AFC4-6F175D3DCCD1}">
-              <a14:hiddenFill xmlns:a14="http://schemas.microsoft.com/office/drawing/2010/main" xmlns="">
+              <a14:hiddenFill xmlns="" xmlns:a14="http://schemas.microsoft.com/office/drawing/2010/main">
                 <a:solidFill>
                   <a:schemeClr val="accent1"/>
                 </a:solidFill>
               </a14:hiddenFill>
             </a:ext>
             <a:ext uri="{91240B29-F687-4f45-9708-019B960494DF}">
-              <a14:hiddenLine xmlns:a14="http://schemas.microsoft.com/office/drawing/2010/main" xmlns="" w="9525">
+              <a14:hiddenLine xmlns="" xmlns:a14="http://schemas.microsoft.com/office/drawing/2010/main" w="9525">
                 <a:solidFill>
                   <a:schemeClr val="tx1"/>
                 </a:solidFill>
@@ -3648,7 +3648,7 @@
               </a14:hiddenLine>
             </a:ext>
             <a:ext uri="{AF507438-7753-43e0-B8FC-AC1667EBCBE1}">
-              <a14:hiddenEffects xmlns:a14="http://schemas.microsoft.com/office/drawing/2010/main" xmlns="">
+              <a14:hiddenEffects xmlns="" xmlns:a14="http://schemas.microsoft.com/office/drawing/2010/main">
                 <a:effectLst>
                   <a:outerShdw dist="35921" dir="2700000" algn="ctr" rotWithShape="0">
                     <a:schemeClr val="bg2"/>
@@ -3829,14 +3829,14 @@
           <a:effectLst/>
           <a:extLst>
             <a:ext uri="{909E8E84-426E-40dd-AFC4-6F175D3DCCD1}">
-              <a14:hiddenFill xmlns:a14="http://schemas.microsoft.com/office/drawing/2010/main" xmlns="">
+              <a14:hiddenFill xmlns="" xmlns:a14="http://schemas.microsoft.com/office/drawing/2010/main">
                 <a:solidFill>
                   <a:schemeClr val="accent1"/>
                 </a:solidFill>
               </a14:hiddenFill>
             </a:ext>
             <a:ext uri="{91240B29-F687-4f45-9708-019B960494DF}">
-              <a14:hiddenLine xmlns:a14="http://schemas.microsoft.com/office/drawing/2010/main" xmlns="" w="9525">
+              <a14:hiddenLine xmlns="" xmlns:a14="http://schemas.microsoft.com/office/drawing/2010/main" w="9525">
                 <a:solidFill>
                   <a:schemeClr val="tx1"/>
                 </a:solidFill>
@@ -3846,7 +3846,7 @@
               </a14:hiddenLine>
             </a:ext>
             <a:ext uri="{AF507438-7753-43e0-B8FC-AC1667EBCBE1}">
-              <a14:hiddenEffects xmlns:a14="http://schemas.microsoft.com/office/drawing/2010/main" xmlns="">
+              <a14:hiddenEffects xmlns="" xmlns:a14="http://schemas.microsoft.com/office/drawing/2010/main">
                 <a:effectLst>
                   <a:outerShdw dist="35921" dir="2700000" algn="ctr" rotWithShape="0">
                     <a:schemeClr val="bg2"/>
@@ -4012,14 +4012,14 @@
           <a:effectLst/>
           <a:extLst>
             <a:ext uri="{909E8E84-426E-40dd-AFC4-6F175D3DCCD1}">
-              <a14:hiddenFill xmlns:a14="http://schemas.microsoft.com/office/drawing/2010/main" xmlns="">
+              <a14:hiddenFill xmlns="" xmlns:a14="http://schemas.microsoft.com/office/drawing/2010/main">
                 <a:solidFill>
                   <a:schemeClr val="accent1"/>
                 </a:solidFill>
               </a14:hiddenFill>
             </a:ext>
             <a:ext uri="{91240B29-F687-4f45-9708-019B960494DF}">
-              <a14:hiddenLine xmlns:a14="http://schemas.microsoft.com/office/drawing/2010/main" xmlns="" w="9525">
+              <a14:hiddenLine xmlns="" xmlns:a14="http://schemas.microsoft.com/office/drawing/2010/main" w="9525">
                 <a:solidFill>
                   <a:schemeClr val="tx1"/>
                 </a:solidFill>
@@ -4029,7 +4029,7 @@
               </a14:hiddenLine>
             </a:ext>
             <a:ext uri="{AF507438-7753-43e0-B8FC-AC1667EBCBE1}">
-              <a14:hiddenEffects xmlns:a14="http://schemas.microsoft.com/office/drawing/2010/main" xmlns="">
+              <a14:hiddenEffects xmlns="" xmlns:a14="http://schemas.microsoft.com/office/drawing/2010/main">
                 <a:effectLst>
                   <a:outerShdw dist="35921" dir="2700000" algn="ctr" rotWithShape="0">
                     <a:schemeClr val="bg2"/>
@@ -4128,14 +4128,14 @@
           <a:effectLst/>
           <a:extLst>
             <a:ext uri="{909E8E84-426E-40dd-AFC4-6F175D3DCCD1}">
-              <a14:hiddenFill xmlns:a14="http://schemas.microsoft.com/office/drawing/2010/main" xmlns="">
+              <a14:hiddenFill xmlns="" xmlns:a14="http://schemas.microsoft.com/office/drawing/2010/main">
                 <a:solidFill>
                   <a:schemeClr val="accent1"/>
                 </a:solidFill>
               </a14:hiddenFill>
             </a:ext>
             <a:ext uri="{91240B29-F687-4f45-9708-019B960494DF}">
-              <a14:hiddenLine xmlns:a14="http://schemas.microsoft.com/office/drawing/2010/main" xmlns="" w="9525">
+              <a14:hiddenLine xmlns="" xmlns:a14="http://schemas.microsoft.com/office/drawing/2010/main" w="9525">
                 <a:solidFill>
                   <a:schemeClr val="tx1"/>
                 </a:solidFill>
@@ -4145,7 +4145,7 @@
               </a14:hiddenLine>
             </a:ext>
             <a:ext uri="{AF507438-7753-43e0-B8FC-AC1667EBCBE1}">
-              <a14:hiddenEffects xmlns:a14="http://schemas.microsoft.com/office/drawing/2010/main" xmlns="">
+              <a14:hiddenEffects xmlns="" xmlns:a14="http://schemas.microsoft.com/office/drawing/2010/main">
                 <a:effectLst>
                   <a:outerShdw dist="35921" dir="2700000" algn="ctr" rotWithShape="0">
                     <a:schemeClr val="bg2"/>
@@ -4191,14 +4191,14 @@
           <a:effectLst/>
           <a:extLst>
             <a:ext uri="{909E8E84-426E-40dd-AFC4-6F175D3DCCD1}">
-              <a14:hiddenFill xmlns:a14="http://schemas.microsoft.com/office/drawing/2010/main" xmlns="">
+              <a14:hiddenFill xmlns="" xmlns:a14="http://schemas.microsoft.com/office/drawing/2010/main">
                 <a:solidFill>
                   <a:schemeClr val="accent1"/>
                 </a:solidFill>
               </a14:hiddenFill>
             </a:ext>
             <a:ext uri="{91240B29-F687-4f45-9708-019B960494DF}">
-              <a14:hiddenLine xmlns:a14="http://schemas.microsoft.com/office/drawing/2010/main" xmlns="" w="9525">
+              <a14:hiddenLine xmlns="" xmlns:a14="http://schemas.microsoft.com/office/drawing/2010/main" w="9525">
                 <a:solidFill>
                   <a:schemeClr val="tx1"/>
                 </a:solidFill>
@@ -4208,7 +4208,7 @@
               </a14:hiddenLine>
             </a:ext>
             <a:ext uri="{AF507438-7753-43e0-B8FC-AC1667EBCBE1}">
-              <a14:hiddenEffects xmlns:a14="http://schemas.microsoft.com/office/drawing/2010/main" xmlns="">
+              <a14:hiddenEffects xmlns="" xmlns:a14="http://schemas.microsoft.com/office/drawing/2010/main">
                 <a:effectLst>
                   <a:outerShdw dist="35921" dir="2700000" algn="ctr" rotWithShape="0">
                     <a:schemeClr val="bg2"/>
@@ -4253,12 +4253,12 @@
           <a:graphicData uri="http://schemas.openxmlformats.org/presentationml/2006/ole">
             <mc:AlternateContent xmlns:mc="http://schemas.openxmlformats.org/markup-compatibility/2006">
               <mc:Choice xmlns:v="urn:schemas-microsoft-com:vml" Requires="v">
-                <p:oleObj spid="_x0000_s2059" name="Visio" r:id="rId3" imgW="6972264" imgH="8633520" progId="Visio.Drawing.15">
+                <p:oleObj spid="_x0000_s2060" name="Visio" r:id="rId4" imgW="6972264" imgH="8633520" progId="Visio.Drawing.15">
                   <p:embed/>
                 </p:oleObj>
               </mc:Choice>
               <mc:Fallback>
-                <p:oleObj name="Visio" r:id="rId3" imgW="6972264" imgH="8633520" progId="Visio.Drawing.15">
+                <p:oleObj name="Visio" r:id="rId4" imgW="6972264" imgH="8633520" progId="Visio.Drawing.15">
                   <p:embed/>
                   <p:pic>
                     <p:nvPicPr>
@@ -4269,7 +4269,7 @@
                       <p:nvPr/>
                     </p:nvPicPr>
                     <p:blipFill>
-                      <a:blip r:embed="rId4">
+                      <a:blip r:embed="rId5">
                         <a:extLst>
                           <a:ext uri="{28A0092B-C50C-407E-A947-70E740481C1C}">
                             <a14:useLocalDpi xmlns:a14="http://schemas.microsoft.com/office/drawing/2010/main" val="0"/>
@@ -5099,8 +5099,13 @@
             </a:r>
             <a:r>
               <a:rPr lang="en-US" dirty="0" smtClean="0"/>
-              <a:t>: Normalizes</a:t>
-            </a:r>
+              <a:t>: </a:t>
+            </a:r>
+            <a:r>
+              <a:rPr lang="en-US" dirty="0" smtClean="0"/>
+              <a:t>Normalizes Object File</a:t>
+            </a:r>
+            <a:endParaRPr lang="en-US" dirty="0" smtClean="0"/>
           </a:p>
           <a:p>
             <a:pPr lvl="1"/>
@@ -5247,7 +5252,11 @@
             </a:r>
             <a:r>
               <a:rPr lang="en-US" dirty="0" smtClean="0"/>
-              <a:t>Create a set of instructions for the printer to follow in order</a:t>
+              <a:t>Create a set of instructions </a:t>
+            </a:r>
+            <a:r>
+              <a:rPr lang="en-US" dirty="0" smtClean="0"/>
+              <a:t>for the print job</a:t>
             </a:r>
             <a:endParaRPr lang="en-US" dirty="0"/>
           </a:p>
@@ -5255,8 +5264,13 @@
             <a:pPr lvl="1"/>
             <a:r>
               <a:rPr lang="en-US" dirty="0" smtClean="0"/>
-              <a:t>Function:</a:t>
-            </a:r>
+              <a:t>Function</a:t>
+            </a:r>
+            <a:r>
+              <a:rPr lang="en-US" dirty="0" smtClean="0"/>
+              <a:t>: Uses the Object File to create a printing path.</a:t>
+            </a:r>
+            <a:endParaRPr lang="en-US" dirty="0" smtClean="0"/>
           </a:p>
           <a:p>
             <a:pPr lvl="1"/>
@@ -5270,8 +5284,13 @@
             <a:pPr lvl="1"/>
             <a:r>
               <a:rPr lang="en-US" dirty="0"/>
-              <a:t>Processing:  </a:t>
-            </a:r>
+              <a:t>Processing: </a:t>
+            </a:r>
+            <a:r>
+              <a:rPr lang="en-US" dirty="0" smtClean="0"/>
+              <a:t> Slices object into layers</a:t>
+            </a:r>
+            <a:endParaRPr lang="en-US" dirty="0"/>
           </a:p>
           <a:p>
             <a:pPr lvl="1"/>
@@ -5425,13 +5444,31 @@
               <a:rPr lang="en-US" dirty="0"/>
               <a:t>Purpose:  </a:t>
             </a:r>
-          </a:p>
-          <a:p>
-            <a:pPr lvl="1"/>
-            <a:r>
-              <a:rPr lang="en-US" dirty="0" smtClean="0"/>
-              <a:t>Function:</a:t>
-            </a:r>
+            <a:r>
+              <a:rPr lang="en-US" dirty="0" smtClean="0"/>
+              <a:t>To modify the instructions for the printer to accept.</a:t>
+            </a:r>
+            <a:endParaRPr lang="en-US" dirty="0"/>
+          </a:p>
+          <a:p>
+            <a:pPr lvl="1"/>
+            <a:r>
+              <a:rPr lang="en-US" dirty="0" smtClean="0"/>
+              <a:t>Function</a:t>
+            </a:r>
+            <a:r>
+              <a:rPr lang="en-US" dirty="0" smtClean="0"/>
+              <a:t>: Adds instructions for </a:t>
+            </a:r>
+            <a:r>
+              <a:rPr lang="en-US" dirty="0" smtClean="0"/>
+              <a:t>unique commands </a:t>
+            </a:r>
+            <a:r>
+              <a:rPr lang="en-US" dirty="0" smtClean="0"/>
+              <a:t>for the particular printer</a:t>
+            </a:r>
+            <a:endParaRPr lang="en-US" dirty="0" smtClean="0"/>
           </a:p>
           <a:p>
             <a:pPr lvl="1"/>
@@ -5447,6 +5484,11 @@
               <a:rPr lang="en-US" dirty="0"/>
               <a:t>Processing:  </a:t>
             </a:r>
+            <a:r>
+              <a:rPr lang="en-US" dirty="0" smtClean="0"/>
+              <a:t>Modifies G-Code</a:t>
+            </a:r>
+            <a:endParaRPr lang="en-US" dirty="0"/>
           </a:p>
           <a:p>
             <a:pPr lvl="1"/>
@@ -6538,14 +6580,14 @@
           <a:effectLst/>
           <a:extLst>
             <a:ext uri="{909E8E84-426E-40dd-AFC4-6F175D3DCCD1}">
-              <a14:hiddenFill xmlns:a14="http://schemas.microsoft.com/office/drawing/2010/main" xmlns="">
+              <a14:hiddenFill xmlns="" xmlns:a14="http://schemas.microsoft.com/office/drawing/2010/main">
                 <a:solidFill>
                   <a:schemeClr val="accent1"/>
                 </a:solidFill>
               </a14:hiddenFill>
             </a:ext>
             <a:ext uri="{91240B29-F687-4f45-9708-019B960494DF}">
-              <a14:hiddenLine xmlns:a14="http://schemas.microsoft.com/office/drawing/2010/main" xmlns="" w="9525">
+              <a14:hiddenLine xmlns="" xmlns:a14="http://schemas.microsoft.com/office/drawing/2010/main" w="9525">
                 <a:solidFill>
                   <a:schemeClr val="tx1"/>
                 </a:solidFill>
@@ -6555,7 +6597,7 @@
               </a14:hiddenLine>
             </a:ext>
             <a:ext uri="{AF507438-7753-43e0-B8FC-AC1667EBCBE1}">
-              <a14:hiddenEffects xmlns:a14="http://schemas.microsoft.com/office/drawing/2010/main" xmlns="">
+              <a14:hiddenEffects xmlns="" xmlns:a14="http://schemas.microsoft.com/office/drawing/2010/main">
                 <a:effectLst>
                   <a:outerShdw dist="35921" dir="2700000" algn="ctr" rotWithShape="0">
                     <a:schemeClr val="bg2"/>
@@ -6600,12 +6642,12 @@
           <a:graphicData uri="http://schemas.openxmlformats.org/presentationml/2006/ole">
             <mc:AlternateContent xmlns:mc="http://schemas.openxmlformats.org/markup-compatibility/2006">
               <mc:Choice xmlns:v="urn:schemas-microsoft-com:vml" Requires="v">
-                <p:oleObj spid="_x0000_s1037" name="Visio" r:id="rId3" imgW="3867210" imgH="4695840" progId="Visio.Drawing.15">
+                <p:oleObj spid="_x0000_s1038" name="Visio" r:id="rId4" imgW="3867210" imgH="4695840" progId="Visio.Drawing.15">
                   <p:embed/>
                 </p:oleObj>
               </mc:Choice>
               <mc:Fallback>
-                <p:oleObj name="Visio" r:id="rId3" imgW="3867210" imgH="4695840" progId="Visio.Drawing.15">
+                <p:oleObj name="Visio" r:id="rId4" imgW="3867210" imgH="4695840" progId="Visio.Drawing.15">
                   <p:embed/>
                   <p:pic>
                     <p:nvPicPr>
@@ -6616,7 +6658,7 @@
                       <p:nvPr/>
                     </p:nvPicPr>
                     <p:blipFill>
-                      <a:blip r:embed="rId4"/>
+                      <a:blip r:embed="rId5"/>
                       <a:srcRect/>
                       <a:stretch>
                         <a:fillRect/>
@@ -6811,14 +6853,14 @@
           <a:effectLst/>
           <a:extLst>
             <a:ext uri="{909E8E84-426E-40dd-AFC4-6F175D3DCCD1}">
-              <a14:hiddenFill xmlns:a14="http://schemas.microsoft.com/office/drawing/2010/main" xmlns="">
+              <a14:hiddenFill xmlns="" xmlns:a14="http://schemas.microsoft.com/office/drawing/2010/main">
                 <a:solidFill>
                   <a:schemeClr val="accent1"/>
                 </a:solidFill>
               </a14:hiddenFill>
             </a:ext>
             <a:ext uri="{91240B29-F687-4f45-9708-019B960494DF}">
-              <a14:hiddenLine xmlns:a14="http://schemas.microsoft.com/office/drawing/2010/main" xmlns="" w="9525">
+              <a14:hiddenLine xmlns="" xmlns:a14="http://schemas.microsoft.com/office/drawing/2010/main" w="9525">
                 <a:solidFill>
                   <a:schemeClr val="tx1"/>
                 </a:solidFill>
@@ -6828,7 +6870,7 @@
               </a14:hiddenLine>
             </a:ext>
             <a:ext uri="{AF507438-7753-43e0-B8FC-AC1667EBCBE1}">
-              <a14:hiddenEffects xmlns:a14="http://schemas.microsoft.com/office/drawing/2010/main" xmlns="">
+              <a14:hiddenEffects xmlns="" xmlns:a14="http://schemas.microsoft.com/office/drawing/2010/main">
                 <a:effectLst>
                   <a:outerShdw dist="35921" dir="2700000" algn="ctr" rotWithShape="0">
                     <a:schemeClr val="bg2"/>
@@ -6988,14 +7030,14 @@
           <a:effectLst/>
           <a:extLst>
             <a:ext uri="{909E8E84-426E-40dd-AFC4-6F175D3DCCD1}">
-              <a14:hiddenFill xmlns:a14="http://schemas.microsoft.com/office/drawing/2010/main" xmlns="">
+              <a14:hiddenFill xmlns="" xmlns:a14="http://schemas.microsoft.com/office/drawing/2010/main">
                 <a:solidFill>
                   <a:schemeClr val="accent1"/>
                 </a:solidFill>
               </a14:hiddenFill>
             </a:ext>
             <a:ext uri="{91240B29-F687-4f45-9708-019B960494DF}">
-              <a14:hiddenLine xmlns:a14="http://schemas.microsoft.com/office/drawing/2010/main" xmlns="" w="9525">
+              <a14:hiddenLine xmlns="" xmlns:a14="http://schemas.microsoft.com/office/drawing/2010/main" w="9525">
                 <a:solidFill>
                   <a:schemeClr val="tx1"/>
                 </a:solidFill>
@@ -7005,7 +7047,7 @@
               </a14:hiddenLine>
             </a:ext>
             <a:ext uri="{AF507438-7753-43e0-B8FC-AC1667EBCBE1}">
-              <a14:hiddenEffects xmlns:a14="http://schemas.microsoft.com/office/drawing/2010/main" xmlns="">
+              <a14:hiddenEffects xmlns="" xmlns:a14="http://schemas.microsoft.com/office/drawing/2010/main">
                 <a:effectLst>
                   <a:outerShdw dist="35921" dir="2700000" algn="ctr" rotWithShape="0">
                     <a:schemeClr val="bg2"/>

</xml_diff>

<commit_message>
Filled in Physical/Printer Feedback
Added information in ADS Presentation.
</commit_message>
<xml_diff>
--- a/ADS Gate Review/Team Ink3d ADS.pptx
+++ b/ADS Gate Review/Team Ink3d ADS.pptx
@@ -3454,14 +3454,14 @@
           <a:effectLst/>
           <a:extLst>
             <a:ext uri="{909E8E84-426E-40dd-AFC4-6F175D3DCCD1}">
-              <a14:hiddenFill xmlns="" xmlns:a14="http://schemas.microsoft.com/office/drawing/2010/main">
+              <a14:hiddenFill xmlns:a14="http://schemas.microsoft.com/office/drawing/2010/main" xmlns="">
                 <a:solidFill>
                   <a:schemeClr val="accent1"/>
                 </a:solidFill>
               </a14:hiddenFill>
             </a:ext>
             <a:ext uri="{91240B29-F687-4f45-9708-019B960494DF}">
-              <a14:hiddenLine xmlns="" xmlns:a14="http://schemas.microsoft.com/office/drawing/2010/main" w="9525">
+              <a14:hiddenLine xmlns:a14="http://schemas.microsoft.com/office/drawing/2010/main" xmlns="" w="9525">
                 <a:solidFill>
                   <a:schemeClr val="tx1"/>
                 </a:solidFill>
@@ -3471,7 +3471,7 @@
               </a14:hiddenLine>
             </a:ext>
             <a:ext uri="{AF507438-7753-43e0-B8FC-AC1667EBCBE1}">
-              <a14:hiddenEffects xmlns="" xmlns:a14="http://schemas.microsoft.com/office/drawing/2010/main">
+              <a14:hiddenEffects xmlns:a14="http://schemas.microsoft.com/office/drawing/2010/main" xmlns="">
                 <a:effectLst>
                   <a:outerShdw dist="35921" dir="2700000" algn="ctr" rotWithShape="0">
                     <a:schemeClr val="bg2"/>
@@ -3631,14 +3631,14 @@
           <a:effectLst/>
           <a:extLst>
             <a:ext uri="{909E8E84-426E-40dd-AFC4-6F175D3DCCD1}">
-              <a14:hiddenFill xmlns="" xmlns:a14="http://schemas.microsoft.com/office/drawing/2010/main">
+              <a14:hiddenFill xmlns:a14="http://schemas.microsoft.com/office/drawing/2010/main" xmlns="">
                 <a:solidFill>
                   <a:schemeClr val="accent1"/>
                 </a:solidFill>
               </a14:hiddenFill>
             </a:ext>
             <a:ext uri="{91240B29-F687-4f45-9708-019B960494DF}">
-              <a14:hiddenLine xmlns="" xmlns:a14="http://schemas.microsoft.com/office/drawing/2010/main" w="9525">
+              <a14:hiddenLine xmlns:a14="http://schemas.microsoft.com/office/drawing/2010/main" xmlns="" w="9525">
                 <a:solidFill>
                   <a:schemeClr val="tx1"/>
                 </a:solidFill>
@@ -3648,7 +3648,7 @@
               </a14:hiddenLine>
             </a:ext>
             <a:ext uri="{AF507438-7753-43e0-B8FC-AC1667EBCBE1}">
-              <a14:hiddenEffects xmlns="" xmlns:a14="http://schemas.microsoft.com/office/drawing/2010/main">
+              <a14:hiddenEffects xmlns:a14="http://schemas.microsoft.com/office/drawing/2010/main" xmlns="">
                 <a:effectLst>
                   <a:outerShdw dist="35921" dir="2700000" algn="ctr" rotWithShape="0">
                     <a:schemeClr val="bg2"/>
@@ -3829,14 +3829,14 @@
           <a:effectLst/>
           <a:extLst>
             <a:ext uri="{909E8E84-426E-40dd-AFC4-6F175D3DCCD1}">
-              <a14:hiddenFill xmlns="" xmlns:a14="http://schemas.microsoft.com/office/drawing/2010/main">
+              <a14:hiddenFill xmlns:a14="http://schemas.microsoft.com/office/drawing/2010/main" xmlns="">
                 <a:solidFill>
                   <a:schemeClr val="accent1"/>
                 </a:solidFill>
               </a14:hiddenFill>
             </a:ext>
             <a:ext uri="{91240B29-F687-4f45-9708-019B960494DF}">
-              <a14:hiddenLine xmlns="" xmlns:a14="http://schemas.microsoft.com/office/drawing/2010/main" w="9525">
+              <a14:hiddenLine xmlns:a14="http://schemas.microsoft.com/office/drawing/2010/main" xmlns="" w="9525">
                 <a:solidFill>
                   <a:schemeClr val="tx1"/>
                 </a:solidFill>
@@ -3846,7 +3846,7 @@
               </a14:hiddenLine>
             </a:ext>
             <a:ext uri="{AF507438-7753-43e0-B8FC-AC1667EBCBE1}">
-              <a14:hiddenEffects xmlns="" xmlns:a14="http://schemas.microsoft.com/office/drawing/2010/main">
+              <a14:hiddenEffects xmlns:a14="http://schemas.microsoft.com/office/drawing/2010/main" xmlns="">
                 <a:effectLst>
                   <a:outerShdw dist="35921" dir="2700000" algn="ctr" rotWithShape="0">
                     <a:schemeClr val="bg2"/>
@@ -4012,14 +4012,14 @@
           <a:effectLst/>
           <a:extLst>
             <a:ext uri="{909E8E84-426E-40dd-AFC4-6F175D3DCCD1}">
-              <a14:hiddenFill xmlns="" xmlns:a14="http://schemas.microsoft.com/office/drawing/2010/main">
+              <a14:hiddenFill xmlns:a14="http://schemas.microsoft.com/office/drawing/2010/main" xmlns="">
                 <a:solidFill>
                   <a:schemeClr val="accent1"/>
                 </a:solidFill>
               </a14:hiddenFill>
             </a:ext>
             <a:ext uri="{91240B29-F687-4f45-9708-019B960494DF}">
-              <a14:hiddenLine xmlns="" xmlns:a14="http://schemas.microsoft.com/office/drawing/2010/main" w="9525">
+              <a14:hiddenLine xmlns:a14="http://schemas.microsoft.com/office/drawing/2010/main" xmlns="" w="9525">
                 <a:solidFill>
                   <a:schemeClr val="tx1"/>
                 </a:solidFill>
@@ -4029,7 +4029,7 @@
               </a14:hiddenLine>
             </a:ext>
             <a:ext uri="{AF507438-7753-43e0-B8FC-AC1667EBCBE1}">
-              <a14:hiddenEffects xmlns="" xmlns:a14="http://schemas.microsoft.com/office/drawing/2010/main">
+              <a14:hiddenEffects xmlns:a14="http://schemas.microsoft.com/office/drawing/2010/main" xmlns="">
                 <a:effectLst>
                   <a:outerShdw dist="35921" dir="2700000" algn="ctr" rotWithShape="0">
                     <a:schemeClr val="bg2"/>
@@ -4128,14 +4128,14 @@
           <a:effectLst/>
           <a:extLst>
             <a:ext uri="{909E8E84-426E-40dd-AFC4-6F175D3DCCD1}">
-              <a14:hiddenFill xmlns="" xmlns:a14="http://schemas.microsoft.com/office/drawing/2010/main">
+              <a14:hiddenFill xmlns:a14="http://schemas.microsoft.com/office/drawing/2010/main" xmlns="">
                 <a:solidFill>
                   <a:schemeClr val="accent1"/>
                 </a:solidFill>
               </a14:hiddenFill>
             </a:ext>
             <a:ext uri="{91240B29-F687-4f45-9708-019B960494DF}">
-              <a14:hiddenLine xmlns="" xmlns:a14="http://schemas.microsoft.com/office/drawing/2010/main" w="9525">
+              <a14:hiddenLine xmlns:a14="http://schemas.microsoft.com/office/drawing/2010/main" xmlns="" w="9525">
                 <a:solidFill>
                   <a:schemeClr val="tx1"/>
                 </a:solidFill>
@@ -4145,7 +4145,7 @@
               </a14:hiddenLine>
             </a:ext>
             <a:ext uri="{AF507438-7753-43e0-B8FC-AC1667EBCBE1}">
-              <a14:hiddenEffects xmlns="" xmlns:a14="http://schemas.microsoft.com/office/drawing/2010/main">
+              <a14:hiddenEffects xmlns:a14="http://schemas.microsoft.com/office/drawing/2010/main" xmlns="">
                 <a:effectLst>
                   <a:outerShdw dist="35921" dir="2700000" algn="ctr" rotWithShape="0">
                     <a:schemeClr val="bg2"/>
@@ -4191,14 +4191,14 @@
           <a:effectLst/>
           <a:extLst>
             <a:ext uri="{909E8E84-426E-40dd-AFC4-6F175D3DCCD1}">
-              <a14:hiddenFill xmlns="" xmlns:a14="http://schemas.microsoft.com/office/drawing/2010/main">
+              <a14:hiddenFill xmlns:a14="http://schemas.microsoft.com/office/drawing/2010/main" xmlns="">
                 <a:solidFill>
                   <a:schemeClr val="accent1"/>
                 </a:solidFill>
               </a14:hiddenFill>
             </a:ext>
             <a:ext uri="{91240B29-F687-4f45-9708-019B960494DF}">
-              <a14:hiddenLine xmlns="" xmlns:a14="http://schemas.microsoft.com/office/drawing/2010/main" w="9525">
+              <a14:hiddenLine xmlns:a14="http://schemas.microsoft.com/office/drawing/2010/main" xmlns="" w="9525">
                 <a:solidFill>
                   <a:schemeClr val="tx1"/>
                 </a:solidFill>
@@ -4208,7 +4208,7 @@
               </a14:hiddenLine>
             </a:ext>
             <a:ext uri="{AF507438-7753-43e0-B8FC-AC1667EBCBE1}">
-              <a14:hiddenEffects xmlns="" xmlns:a14="http://schemas.microsoft.com/office/drawing/2010/main">
+              <a14:hiddenEffects xmlns:a14="http://schemas.microsoft.com/office/drawing/2010/main" xmlns="">
                 <a:effectLst>
                   <a:outerShdw dist="35921" dir="2700000" algn="ctr" rotWithShape="0">
                     <a:schemeClr val="bg2"/>
@@ -4253,12 +4253,12 @@
           <a:graphicData uri="http://schemas.openxmlformats.org/presentationml/2006/ole">
             <mc:AlternateContent xmlns:mc="http://schemas.openxmlformats.org/markup-compatibility/2006">
               <mc:Choice xmlns:v="urn:schemas-microsoft-com:vml" Requires="v">
-                <p:oleObj spid="_x0000_s2060" name="Visio" r:id="rId4" imgW="6972264" imgH="8633520" progId="Visio.Drawing.15">
+                <p:oleObj spid="_x0000_s2063" name="Visio" r:id="rId3" imgW="6972264" imgH="8633520" progId="Visio.Drawing.15">
                   <p:embed/>
                 </p:oleObj>
               </mc:Choice>
               <mc:Fallback>
-                <p:oleObj name="Visio" r:id="rId4" imgW="6972264" imgH="8633520" progId="Visio.Drawing.15">
+                <p:oleObj name="Visio" r:id="rId3" imgW="6972264" imgH="8633520" progId="Visio.Drawing.15">
                   <p:embed/>
                   <p:pic>
                     <p:nvPicPr>
@@ -4269,7 +4269,7 @@
                       <p:nvPr/>
                     </p:nvPicPr>
                     <p:blipFill>
-                      <a:blip r:embed="rId5">
+                      <a:blip r:embed="rId4">
                         <a:extLst>
                           <a:ext uri="{28A0092B-C50C-407E-A947-70E740481C1C}">
                             <a14:useLocalDpi xmlns:a14="http://schemas.microsoft.com/office/drawing/2010/main" val="0"/>
@@ -5099,13 +5099,8 @@
             </a:r>
             <a:r>
               <a:rPr lang="en-US" dirty="0" smtClean="0"/>
-              <a:t>: </a:t>
-            </a:r>
-            <a:r>
-              <a:rPr lang="en-US" dirty="0" smtClean="0"/>
-              <a:t>Normalizes Object File</a:t>
-            </a:r>
-            <a:endParaRPr lang="en-US" dirty="0" smtClean="0"/>
+              <a:t>: Normalizes Object File</a:t>
+            </a:r>
           </a:p>
           <a:p>
             <a:pPr lvl="1"/>
@@ -5252,25 +5247,16 @@
             </a:r>
             <a:r>
               <a:rPr lang="en-US" dirty="0" smtClean="0"/>
-              <a:t>Create a set of instructions </a:t>
-            </a:r>
-            <a:r>
-              <a:rPr lang="en-US" dirty="0" smtClean="0"/>
-              <a:t>for the print job</a:t>
-            </a:r>
-            <a:endParaRPr lang="en-US" dirty="0"/>
-          </a:p>
-          <a:p>
-            <a:pPr lvl="1"/>
-            <a:r>
-              <a:rPr lang="en-US" dirty="0" smtClean="0"/>
-              <a:t>Function</a:t>
-            </a:r>
-            <a:r>
-              <a:rPr lang="en-US" dirty="0" smtClean="0"/>
-              <a:t>: Uses the Object File to create a printing path.</a:t>
-            </a:r>
-            <a:endParaRPr lang="en-US" dirty="0" smtClean="0"/>
+              <a:t>Create a set of instructions for the print job</a:t>
+            </a:r>
+            <a:endParaRPr lang="en-US" dirty="0"/>
+          </a:p>
+          <a:p>
+            <a:pPr lvl="1"/>
+            <a:r>
+              <a:rPr lang="en-US" dirty="0" smtClean="0"/>
+              <a:t>Function: Uses the Object File to create a printing path.</a:t>
+            </a:r>
           </a:p>
           <a:p>
             <a:pPr lvl="1"/>
@@ -5454,21 +5440,8 @@
             <a:pPr lvl="1"/>
             <a:r>
               <a:rPr lang="en-US" dirty="0" smtClean="0"/>
-              <a:t>Function</a:t>
-            </a:r>
-            <a:r>
-              <a:rPr lang="en-US" dirty="0" smtClean="0"/>
-              <a:t>: Adds instructions for </a:t>
-            </a:r>
-            <a:r>
-              <a:rPr lang="en-US" dirty="0" smtClean="0"/>
-              <a:t>unique commands </a:t>
-            </a:r>
-            <a:r>
-              <a:rPr lang="en-US" dirty="0" smtClean="0"/>
-              <a:t>for the particular printer</a:t>
-            </a:r>
-            <a:endParaRPr lang="en-US" dirty="0" smtClean="0"/>
+              <a:t>Function: Adds instructions for unique commands for the particular printer</a:t>
+            </a:r>
           </a:p>
           <a:p>
             <a:pPr lvl="1"/>
@@ -5630,19 +5603,33 @@
               <a:rPr lang="en-US" dirty="0"/>
               <a:t>Purpose:  </a:t>
             </a:r>
-          </a:p>
-          <a:p>
-            <a:pPr lvl="1"/>
-            <a:r>
-              <a:rPr lang="en-US" dirty="0" smtClean="0"/>
-              <a:t>Function:</a:t>
-            </a:r>
-          </a:p>
-          <a:p>
-            <a:pPr lvl="1"/>
-            <a:r>
-              <a:rPr lang="en-US" dirty="0" smtClean="0"/>
-              <a:t>Dependencies:</a:t>
+            <a:r>
+              <a:rPr lang="en-US" dirty="0" smtClean="0"/>
+              <a:t>To conditionally dispatch G-Codes to packet preparation module based on printer and operator state.</a:t>
+            </a:r>
+            <a:endParaRPr lang="en-US" dirty="0"/>
+          </a:p>
+          <a:p>
+            <a:pPr lvl="1"/>
+            <a:r>
+              <a:rPr lang="en-US" dirty="0" smtClean="0"/>
+              <a:t>Function</a:t>
+            </a:r>
+            <a:r>
+              <a:rPr lang="en-US" dirty="0" smtClean="0"/>
+              <a:t>: Accept status inputs from status module and printer state monitoring and conditionally dispatches G-Code stream to packet preparation module.</a:t>
+            </a:r>
+            <a:endParaRPr lang="en-US" dirty="0" smtClean="0"/>
+          </a:p>
+          <a:p>
+            <a:pPr lvl="1"/>
+            <a:r>
+              <a:rPr lang="en-US" dirty="0" smtClean="0"/>
+              <a:t>Dependencies</a:t>
+            </a:r>
+            <a:r>
+              <a:rPr lang="en-US" dirty="0" smtClean="0"/>
+              <a:t>: Packet preparation module, status module, and printer state monitoring module.</a:t>
             </a:r>
             <a:endParaRPr lang="en-US" dirty="0"/>
           </a:p>
@@ -5652,6 +5639,11 @@
               <a:rPr lang="en-US" dirty="0"/>
               <a:t>Processing:  </a:t>
             </a:r>
+            <a:r>
+              <a:rPr lang="en-US" dirty="0" smtClean="0"/>
+              <a:t>May insert G-codes to halt the print if necessary.</a:t>
+            </a:r>
+            <a:endParaRPr lang="en-US" dirty="0"/>
           </a:p>
           <a:p>
             <a:pPr lvl="1"/>
@@ -5770,19 +5762,33 @@
               <a:rPr lang="en-US" dirty="0"/>
               <a:t>Purpose:  </a:t>
             </a:r>
-          </a:p>
-          <a:p>
-            <a:pPr lvl="1"/>
-            <a:r>
-              <a:rPr lang="en-US" dirty="0" smtClean="0"/>
-              <a:t>Function:</a:t>
-            </a:r>
-          </a:p>
-          <a:p>
-            <a:pPr lvl="1"/>
-            <a:r>
-              <a:rPr lang="en-US" dirty="0" smtClean="0"/>
-              <a:t>Dependencies:</a:t>
+            <a:r>
+              <a:rPr lang="en-US" dirty="0" smtClean="0"/>
+              <a:t>Convert G-Code stream into byte-stream for printer.</a:t>
+            </a:r>
+            <a:endParaRPr lang="en-US" dirty="0"/>
+          </a:p>
+          <a:p>
+            <a:pPr lvl="1"/>
+            <a:r>
+              <a:rPr lang="en-US" dirty="0" smtClean="0"/>
+              <a:t>Function</a:t>
+            </a:r>
+            <a:r>
+              <a:rPr lang="en-US" dirty="0" smtClean="0"/>
+              <a:t>: Serialize G-Code stream and packetize so that the packets can be transmitted to the printer. Establish serial connection to printer firmware.</a:t>
+            </a:r>
+            <a:endParaRPr lang="en-US" dirty="0" smtClean="0"/>
+          </a:p>
+          <a:p>
+            <a:pPr lvl="1"/>
+            <a:r>
+              <a:rPr lang="en-US" dirty="0" smtClean="0"/>
+              <a:t>Dependencies</a:t>
+            </a:r>
+            <a:r>
+              <a:rPr lang="en-US" dirty="0" smtClean="0"/>
+              <a:t>: Printer state controller.</a:t>
             </a:r>
             <a:endParaRPr lang="en-US" dirty="0"/>
           </a:p>
@@ -5792,6 +5798,11 @@
               <a:rPr lang="en-US" dirty="0"/>
               <a:t>Processing:  </a:t>
             </a:r>
+            <a:r>
+              <a:rPr lang="en-US" dirty="0" smtClean="0"/>
+              <a:t>Serialization of G-Code stream. Chunk serialized G-Code stream into packets to be sent to printer firmware.</a:t>
+            </a:r>
+            <a:endParaRPr lang="en-US" dirty="0"/>
           </a:p>
           <a:p>
             <a:pPr lvl="1"/>
@@ -5902,19 +5913,33 @@
               <a:rPr lang="en-US" dirty="0"/>
               <a:t>Purpose:  </a:t>
             </a:r>
-          </a:p>
-          <a:p>
-            <a:pPr lvl="1"/>
-            <a:r>
-              <a:rPr lang="en-US" dirty="0" smtClean="0"/>
-              <a:t>Function:</a:t>
-            </a:r>
-          </a:p>
-          <a:p>
-            <a:pPr lvl="1"/>
-            <a:r>
-              <a:rPr lang="en-US" dirty="0" smtClean="0"/>
-              <a:t>Dependencies:</a:t>
+            <a:r>
+              <a:rPr lang="en-US" dirty="0" smtClean="0"/>
+              <a:t>To monitor the operating status of the printer hardware. </a:t>
+            </a:r>
+            <a:endParaRPr lang="en-US" dirty="0"/>
+          </a:p>
+          <a:p>
+            <a:pPr lvl="1"/>
+            <a:r>
+              <a:rPr lang="en-US" dirty="0" smtClean="0"/>
+              <a:t>Function</a:t>
+            </a:r>
+            <a:r>
+              <a:rPr lang="en-US" dirty="0" smtClean="0"/>
+              <a:t>: Listens for response from printer on established serial connection. Assembles and converts received data into form appropriate for inter-layer transmission. </a:t>
+            </a:r>
+            <a:endParaRPr lang="en-US" dirty="0" smtClean="0"/>
+          </a:p>
+          <a:p>
+            <a:pPr lvl="1"/>
+            <a:r>
+              <a:rPr lang="en-US" dirty="0" smtClean="0"/>
+              <a:t>Dependencies</a:t>
+            </a:r>
+            <a:r>
+              <a:rPr lang="en-US" dirty="0" smtClean="0"/>
+              <a:t>: Printer State Controller, Status Module</a:t>
             </a:r>
             <a:endParaRPr lang="en-US" dirty="0"/>
           </a:p>
@@ -5924,6 +5949,15 @@
               <a:rPr lang="en-US" dirty="0"/>
               <a:t>Processing:  </a:t>
             </a:r>
+            <a:r>
+              <a:rPr lang="en-US" dirty="0" smtClean="0"/>
+              <a:t>Data conversion from printer byte-stream into data structure suitable for transmission to other layers in </a:t>
+            </a:r>
+            <a:r>
+              <a:rPr lang="en-US" smtClean="0"/>
+              <a:t>the system.</a:t>
+            </a:r>
+            <a:endParaRPr lang="en-US" dirty="0"/>
           </a:p>
           <a:p>
             <a:pPr lvl="1"/>
@@ -6580,14 +6614,14 @@
           <a:effectLst/>
           <a:extLst>
             <a:ext uri="{909E8E84-426E-40dd-AFC4-6F175D3DCCD1}">
-              <a14:hiddenFill xmlns="" xmlns:a14="http://schemas.microsoft.com/office/drawing/2010/main">
+              <a14:hiddenFill xmlns:a14="http://schemas.microsoft.com/office/drawing/2010/main" xmlns="">
                 <a:solidFill>
                   <a:schemeClr val="accent1"/>
                 </a:solidFill>
               </a14:hiddenFill>
             </a:ext>
             <a:ext uri="{91240B29-F687-4f45-9708-019B960494DF}">
-              <a14:hiddenLine xmlns="" xmlns:a14="http://schemas.microsoft.com/office/drawing/2010/main" w="9525">
+              <a14:hiddenLine xmlns:a14="http://schemas.microsoft.com/office/drawing/2010/main" xmlns="" w="9525">
                 <a:solidFill>
                   <a:schemeClr val="tx1"/>
                 </a:solidFill>
@@ -6597,7 +6631,7 @@
               </a14:hiddenLine>
             </a:ext>
             <a:ext uri="{AF507438-7753-43e0-B8FC-AC1667EBCBE1}">
-              <a14:hiddenEffects xmlns="" xmlns:a14="http://schemas.microsoft.com/office/drawing/2010/main">
+              <a14:hiddenEffects xmlns:a14="http://schemas.microsoft.com/office/drawing/2010/main" xmlns="">
                 <a:effectLst>
                   <a:outerShdw dist="35921" dir="2700000" algn="ctr" rotWithShape="0">
                     <a:schemeClr val="bg2"/>
@@ -6642,12 +6676,12 @@
           <a:graphicData uri="http://schemas.openxmlformats.org/presentationml/2006/ole">
             <mc:AlternateContent xmlns:mc="http://schemas.openxmlformats.org/markup-compatibility/2006">
               <mc:Choice xmlns:v="urn:schemas-microsoft-com:vml" Requires="v">
-                <p:oleObj spid="_x0000_s1038" name="Visio" r:id="rId4" imgW="3867210" imgH="4695840" progId="Visio.Drawing.15">
+                <p:oleObj spid="_x0000_s1041" name="Visio" r:id="rId3" imgW="3867210" imgH="4695840" progId="Visio.Drawing.15">
                   <p:embed/>
                 </p:oleObj>
               </mc:Choice>
               <mc:Fallback>
-                <p:oleObj name="Visio" r:id="rId4" imgW="3867210" imgH="4695840" progId="Visio.Drawing.15">
+                <p:oleObj name="Visio" r:id="rId3" imgW="3867210" imgH="4695840" progId="Visio.Drawing.15">
                   <p:embed/>
                   <p:pic>
                     <p:nvPicPr>
@@ -6658,7 +6692,7 @@
                       <p:nvPr/>
                     </p:nvPicPr>
                     <p:blipFill>
-                      <a:blip r:embed="rId5"/>
+                      <a:blip r:embed="rId4"/>
                       <a:srcRect/>
                       <a:stretch>
                         <a:fillRect/>
@@ -6853,14 +6887,14 @@
           <a:effectLst/>
           <a:extLst>
             <a:ext uri="{909E8E84-426E-40dd-AFC4-6F175D3DCCD1}">
-              <a14:hiddenFill xmlns="" xmlns:a14="http://schemas.microsoft.com/office/drawing/2010/main">
+              <a14:hiddenFill xmlns:a14="http://schemas.microsoft.com/office/drawing/2010/main" xmlns="">
                 <a:solidFill>
                   <a:schemeClr val="accent1"/>
                 </a:solidFill>
               </a14:hiddenFill>
             </a:ext>
             <a:ext uri="{91240B29-F687-4f45-9708-019B960494DF}">
-              <a14:hiddenLine xmlns="" xmlns:a14="http://schemas.microsoft.com/office/drawing/2010/main" w="9525">
+              <a14:hiddenLine xmlns:a14="http://schemas.microsoft.com/office/drawing/2010/main" xmlns="" w="9525">
                 <a:solidFill>
                   <a:schemeClr val="tx1"/>
                 </a:solidFill>
@@ -6870,7 +6904,7 @@
               </a14:hiddenLine>
             </a:ext>
             <a:ext uri="{AF507438-7753-43e0-B8FC-AC1667EBCBE1}">
-              <a14:hiddenEffects xmlns="" xmlns:a14="http://schemas.microsoft.com/office/drawing/2010/main">
+              <a14:hiddenEffects xmlns:a14="http://schemas.microsoft.com/office/drawing/2010/main" xmlns="">
                 <a:effectLst>
                   <a:outerShdw dist="35921" dir="2700000" algn="ctr" rotWithShape="0">
                     <a:schemeClr val="bg2"/>
@@ -7030,14 +7064,14 @@
           <a:effectLst/>
           <a:extLst>
             <a:ext uri="{909E8E84-426E-40dd-AFC4-6F175D3DCCD1}">
-              <a14:hiddenFill xmlns="" xmlns:a14="http://schemas.microsoft.com/office/drawing/2010/main">
+              <a14:hiddenFill xmlns:a14="http://schemas.microsoft.com/office/drawing/2010/main" xmlns="">
                 <a:solidFill>
                   <a:schemeClr val="accent1"/>
                 </a:solidFill>
               </a14:hiddenFill>
             </a:ext>
             <a:ext uri="{91240B29-F687-4f45-9708-019B960494DF}">
-              <a14:hiddenLine xmlns="" xmlns:a14="http://schemas.microsoft.com/office/drawing/2010/main" w="9525">
+              <a14:hiddenLine xmlns:a14="http://schemas.microsoft.com/office/drawing/2010/main" xmlns="" w="9525">
                 <a:solidFill>
                   <a:schemeClr val="tx1"/>
                 </a:solidFill>
@@ -7047,7 +7081,7 @@
               </a14:hiddenLine>
             </a:ext>
             <a:ext uri="{AF507438-7753-43e0-B8FC-AC1667EBCBE1}">
-              <a14:hiddenEffects xmlns="" xmlns:a14="http://schemas.microsoft.com/office/drawing/2010/main">
+              <a14:hiddenEffects xmlns:a14="http://schemas.microsoft.com/office/drawing/2010/main" xmlns="">
                 <a:effectLst>
                   <a:outerShdw dist="35921" dir="2700000" algn="ctr" rotWithShape="0">
                     <a:schemeClr val="bg2"/>

</xml_diff>

<commit_message>
ADS Gate Review - Updated Print Module Slide
</commit_message>
<xml_diff>
--- a/ADS Gate Review/Team Ink3d ADS.pptx
+++ b/ADS Gate Review/Team Ink3d ADS.pptx
@@ -341,7 +341,7 @@
           <a:p>
             <a:fld id="{8FF4DA45-B795-4CB0-B3BB-6A487B8C4B48}" type="datetimeFigureOut">
               <a:rPr lang="en-US" smtClean="0"/>
-              <a:t>12/7/2013</a:t>
+              <a:t>12/9/2013</a:t>
             </a:fld>
             <a:endParaRPr lang="en-US"/>
           </a:p>
@@ -506,7 +506,7 @@
           <a:p>
             <a:fld id="{8FF4DA45-B795-4CB0-B3BB-6A487B8C4B48}" type="datetimeFigureOut">
               <a:rPr lang="en-US" smtClean="0"/>
-              <a:t>12/7/2013</a:t>
+              <a:t>12/9/2013</a:t>
             </a:fld>
             <a:endParaRPr lang="en-US"/>
           </a:p>
@@ -681,7 +681,7 @@
           <a:p>
             <a:fld id="{8FF4DA45-B795-4CB0-B3BB-6A487B8C4B48}" type="datetimeFigureOut">
               <a:rPr lang="en-US" smtClean="0"/>
-              <a:t>12/7/2013</a:t>
+              <a:t>12/9/2013</a:t>
             </a:fld>
             <a:endParaRPr lang="en-US"/>
           </a:p>
@@ -846,7 +846,7 @@
           <a:p>
             <a:fld id="{8FF4DA45-B795-4CB0-B3BB-6A487B8C4B48}" type="datetimeFigureOut">
               <a:rPr lang="en-US" smtClean="0"/>
-              <a:t>12/7/2013</a:t>
+              <a:t>12/9/2013</a:t>
             </a:fld>
             <a:endParaRPr lang="en-US"/>
           </a:p>
@@ -1087,7 +1087,7 @@
           <a:p>
             <a:fld id="{8FF4DA45-B795-4CB0-B3BB-6A487B8C4B48}" type="datetimeFigureOut">
               <a:rPr lang="en-US" smtClean="0"/>
-              <a:t>12/7/2013</a:t>
+              <a:t>12/9/2013</a:t>
             </a:fld>
             <a:endParaRPr lang="en-US"/>
           </a:p>
@@ -1370,7 +1370,7 @@
           <a:p>
             <a:fld id="{8FF4DA45-B795-4CB0-B3BB-6A487B8C4B48}" type="datetimeFigureOut">
               <a:rPr lang="en-US" smtClean="0"/>
-              <a:t>12/7/2013</a:t>
+              <a:t>12/9/2013</a:t>
             </a:fld>
             <a:endParaRPr lang="en-US"/>
           </a:p>
@@ -1799,7 +1799,7 @@
           <a:p>
             <a:fld id="{8FF4DA45-B795-4CB0-B3BB-6A487B8C4B48}" type="datetimeFigureOut">
               <a:rPr lang="en-US" smtClean="0"/>
-              <a:t>12/7/2013</a:t>
+              <a:t>12/9/2013</a:t>
             </a:fld>
             <a:endParaRPr lang="en-US"/>
           </a:p>
@@ -1912,7 +1912,7 @@
           <a:p>
             <a:fld id="{8FF4DA45-B795-4CB0-B3BB-6A487B8C4B48}" type="datetimeFigureOut">
               <a:rPr lang="en-US" smtClean="0"/>
-              <a:t>12/7/2013</a:t>
+              <a:t>12/9/2013</a:t>
             </a:fld>
             <a:endParaRPr lang="en-US"/>
           </a:p>
@@ -2002,7 +2002,7 @@
           <a:p>
             <a:fld id="{8FF4DA45-B795-4CB0-B3BB-6A487B8C4B48}" type="datetimeFigureOut">
               <a:rPr lang="en-US" smtClean="0"/>
-              <a:t>12/7/2013</a:t>
+              <a:t>12/9/2013</a:t>
             </a:fld>
             <a:endParaRPr lang="en-US"/>
           </a:p>
@@ -2191,7 +2191,7 @@
           <a:p>
             <a:fld id="{8FF4DA45-B795-4CB0-B3BB-6A487B8C4B48}" type="datetimeFigureOut">
               <a:rPr lang="en-US" smtClean="0"/>
-              <a:t>12/7/2013</a:t>
+              <a:t>12/9/2013</a:t>
             </a:fld>
             <a:endParaRPr lang="en-US"/>
           </a:p>
@@ -2509,7 +2509,7 @@
           <a:p>
             <a:fld id="{8FF4DA45-B795-4CB0-B3BB-6A487B8C4B48}" type="datetimeFigureOut">
               <a:rPr lang="en-US" smtClean="0"/>
-              <a:t>12/7/2013</a:t>
+              <a:t>12/9/2013</a:t>
             </a:fld>
             <a:endParaRPr lang="en-US"/>
           </a:p>
@@ -2888,7 +2888,7 @@
           <a:p>
             <a:fld id="{8FF4DA45-B795-4CB0-B3BB-6A487B8C4B48}" type="datetimeFigureOut">
               <a:rPr lang="en-US" smtClean="0"/>
-              <a:t>12/7/2013</a:t>
+              <a:t>12/9/2013</a:t>
             </a:fld>
             <a:endParaRPr lang="en-US"/>
           </a:p>
@@ -3454,14 +3454,14 @@
           <a:effectLst/>
           <a:extLst>
             <a:ext uri="{909E8E84-426E-40dd-AFC4-6F175D3DCCD1}">
-              <a14:hiddenFill xmlns:a14="http://schemas.microsoft.com/office/drawing/2010/main" xmlns="">
+              <a14:hiddenFill xmlns="" xmlns:a14="http://schemas.microsoft.com/office/drawing/2010/main">
                 <a:solidFill>
                   <a:schemeClr val="accent1"/>
                 </a:solidFill>
               </a14:hiddenFill>
             </a:ext>
             <a:ext uri="{91240B29-F687-4f45-9708-019B960494DF}">
-              <a14:hiddenLine xmlns:a14="http://schemas.microsoft.com/office/drawing/2010/main" xmlns="" w="9525">
+              <a14:hiddenLine xmlns="" xmlns:a14="http://schemas.microsoft.com/office/drawing/2010/main" w="9525">
                 <a:solidFill>
                   <a:schemeClr val="tx1"/>
                 </a:solidFill>
@@ -3471,7 +3471,7 @@
               </a14:hiddenLine>
             </a:ext>
             <a:ext uri="{AF507438-7753-43e0-B8FC-AC1667EBCBE1}">
-              <a14:hiddenEffects xmlns:a14="http://schemas.microsoft.com/office/drawing/2010/main" xmlns="">
+              <a14:hiddenEffects xmlns="" xmlns:a14="http://schemas.microsoft.com/office/drawing/2010/main">
                 <a:effectLst>
                   <a:outerShdw dist="35921" dir="2700000" algn="ctr" rotWithShape="0">
                     <a:schemeClr val="bg2"/>
@@ -3504,6 +3504,13 @@
   <p:clrMapOvr>
     <a:masterClrMapping/>
   </p:clrMapOvr>
+  <p:timing>
+    <p:tnLst>
+      <p:par>
+        <p:cTn id="1" dur="indefinite" restart="never" nodeType="tmRoot"/>
+      </p:par>
+    </p:tnLst>
+  </p:timing>
 </p:sld>
 </file>
 
@@ -3631,14 +3638,14 @@
           <a:effectLst/>
           <a:extLst>
             <a:ext uri="{909E8E84-426E-40dd-AFC4-6F175D3DCCD1}">
-              <a14:hiddenFill xmlns:a14="http://schemas.microsoft.com/office/drawing/2010/main" xmlns="">
+              <a14:hiddenFill xmlns="" xmlns:a14="http://schemas.microsoft.com/office/drawing/2010/main">
                 <a:solidFill>
                   <a:schemeClr val="accent1"/>
                 </a:solidFill>
               </a14:hiddenFill>
             </a:ext>
             <a:ext uri="{91240B29-F687-4f45-9708-019B960494DF}">
-              <a14:hiddenLine xmlns:a14="http://schemas.microsoft.com/office/drawing/2010/main" xmlns="" w="9525">
+              <a14:hiddenLine xmlns="" xmlns:a14="http://schemas.microsoft.com/office/drawing/2010/main" w="9525">
                 <a:solidFill>
                   <a:schemeClr val="tx1"/>
                 </a:solidFill>
@@ -3648,7 +3655,7 @@
               </a14:hiddenLine>
             </a:ext>
             <a:ext uri="{AF507438-7753-43e0-B8FC-AC1667EBCBE1}">
-              <a14:hiddenEffects xmlns:a14="http://schemas.microsoft.com/office/drawing/2010/main" xmlns="">
+              <a14:hiddenEffects xmlns="" xmlns:a14="http://schemas.microsoft.com/office/drawing/2010/main">
                 <a:effectLst>
                   <a:outerShdw dist="35921" dir="2700000" algn="ctr" rotWithShape="0">
                     <a:schemeClr val="bg2"/>
@@ -3681,6 +3688,13 @@
   <p:clrMapOvr>
     <a:masterClrMapping/>
   </p:clrMapOvr>
+  <p:timing>
+    <p:tnLst>
+      <p:par>
+        <p:cTn id="1" dur="indefinite" restart="never" nodeType="tmRoot"/>
+      </p:par>
+    </p:tnLst>
+  </p:timing>
 </p:sld>
 </file>
 
@@ -3829,14 +3843,14 @@
           <a:effectLst/>
           <a:extLst>
             <a:ext uri="{909E8E84-426E-40dd-AFC4-6F175D3DCCD1}">
-              <a14:hiddenFill xmlns:a14="http://schemas.microsoft.com/office/drawing/2010/main" xmlns="">
+              <a14:hiddenFill xmlns="" xmlns:a14="http://schemas.microsoft.com/office/drawing/2010/main">
                 <a:solidFill>
                   <a:schemeClr val="accent1"/>
                 </a:solidFill>
               </a14:hiddenFill>
             </a:ext>
             <a:ext uri="{91240B29-F687-4f45-9708-019B960494DF}">
-              <a14:hiddenLine xmlns:a14="http://schemas.microsoft.com/office/drawing/2010/main" xmlns="" w="9525">
+              <a14:hiddenLine xmlns="" xmlns:a14="http://schemas.microsoft.com/office/drawing/2010/main" w="9525">
                 <a:solidFill>
                   <a:schemeClr val="tx1"/>
                 </a:solidFill>
@@ -3846,7 +3860,7 @@
               </a14:hiddenLine>
             </a:ext>
             <a:ext uri="{AF507438-7753-43e0-B8FC-AC1667EBCBE1}">
-              <a14:hiddenEffects xmlns:a14="http://schemas.microsoft.com/office/drawing/2010/main" xmlns="">
+              <a14:hiddenEffects xmlns="" xmlns:a14="http://schemas.microsoft.com/office/drawing/2010/main">
                 <a:effectLst>
                   <a:outerShdw dist="35921" dir="2700000" algn="ctr" rotWithShape="0">
                     <a:schemeClr val="bg2"/>
@@ -3879,6 +3893,13 @@
   <p:clrMapOvr>
     <a:masterClrMapping/>
   </p:clrMapOvr>
+  <p:timing>
+    <p:tnLst>
+      <p:par>
+        <p:cTn id="1" dur="indefinite" restart="never" nodeType="tmRoot"/>
+      </p:par>
+    </p:tnLst>
+  </p:timing>
 </p:sld>
 </file>
 
@@ -4012,14 +4033,14 @@
           <a:effectLst/>
           <a:extLst>
             <a:ext uri="{909E8E84-426E-40dd-AFC4-6F175D3DCCD1}">
-              <a14:hiddenFill xmlns:a14="http://schemas.microsoft.com/office/drawing/2010/main" xmlns="">
+              <a14:hiddenFill xmlns="" xmlns:a14="http://schemas.microsoft.com/office/drawing/2010/main">
                 <a:solidFill>
                   <a:schemeClr val="accent1"/>
                 </a:solidFill>
               </a14:hiddenFill>
             </a:ext>
             <a:ext uri="{91240B29-F687-4f45-9708-019B960494DF}">
-              <a14:hiddenLine xmlns:a14="http://schemas.microsoft.com/office/drawing/2010/main" xmlns="" w="9525">
+              <a14:hiddenLine xmlns="" xmlns:a14="http://schemas.microsoft.com/office/drawing/2010/main" w="9525">
                 <a:solidFill>
                   <a:schemeClr val="tx1"/>
                 </a:solidFill>
@@ -4029,7 +4050,7 @@
               </a14:hiddenLine>
             </a:ext>
             <a:ext uri="{AF507438-7753-43e0-B8FC-AC1667EBCBE1}">
-              <a14:hiddenEffects xmlns:a14="http://schemas.microsoft.com/office/drawing/2010/main" xmlns="">
+              <a14:hiddenEffects xmlns="" xmlns:a14="http://schemas.microsoft.com/office/drawing/2010/main">
                 <a:effectLst>
                   <a:outerShdw dist="35921" dir="2700000" algn="ctr" rotWithShape="0">
                     <a:schemeClr val="bg2"/>
@@ -4062,6 +4083,13 @@
   <p:clrMapOvr>
     <a:masterClrMapping/>
   </p:clrMapOvr>
+  <p:timing>
+    <p:tnLst>
+      <p:par>
+        <p:cTn id="1" dur="indefinite" restart="never" nodeType="tmRoot"/>
+      </p:par>
+    </p:tnLst>
+  </p:timing>
 </p:sld>
 </file>
 
@@ -4128,14 +4156,14 @@
           <a:effectLst/>
           <a:extLst>
             <a:ext uri="{909E8E84-426E-40dd-AFC4-6F175D3DCCD1}">
-              <a14:hiddenFill xmlns:a14="http://schemas.microsoft.com/office/drawing/2010/main" xmlns="">
+              <a14:hiddenFill xmlns="" xmlns:a14="http://schemas.microsoft.com/office/drawing/2010/main">
                 <a:solidFill>
                   <a:schemeClr val="accent1"/>
                 </a:solidFill>
               </a14:hiddenFill>
             </a:ext>
             <a:ext uri="{91240B29-F687-4f45-9708-019B960494DF}">
-              <a14:hiddenLine xmlns:a14="http://schemas.microsoft.com/office/drawing/2010/main" xmlns="" w="9525">
+              <a14:hiddenLine xmlns="" xmlns:a14="http://schemas.microsoft.com/office/drawing/2010/main" w="9525">
                 <a:solidFill>
                   <a:schemeClr val="tx1"/>
                 </a:solidFill>
@@ -4145,7 +4173,7 @@
               </a14:hiddenLine>
             </a:ext>
             <a:ext uri="{AF507438-7753-43e0-B8FC-AC1667EBCBE1}">
-              <a14:hiddenEffects xmlns:a14="http://schemas.microsoft.com/office/drawing/2010/main" xmlns="">
+              <a14:hiddenEffects xmlns="" xmlns:a14="http://schemas.microsoft.com/office/drawing/2010/main">
                 <a:effectLst>
                   <a:outerShdw dist="35921" dir="2700000" algn="ctr" rotWithShape="0">
                     <a:schemeClr val="bg2"/>
@@ -4191,14 +4219,14 @@
           <a:effectLst/>
           <a:extLst>
             <a:ext uri="{909E8E84-426E-40dd-AFC4-6F175D3DCCD1}">
-              <a14:hiddenFill xmlns:a14="http://schemas.microsoft.com/office/drawing/2010/main" xmlns="">
+              <a14:hiddenFill xmlns="" xmlns:a14="http://schemas.microsoft.com/office/drawing/2010/main">
                 <a:solidFill>
                   <a:schemeClr val="accent1"/>
                 </a:solidFill>
               </a14:hiddenFill>
             </a:ext>
             <a:ext uri="{91240B29-F687-4f45-9708-019B960494DF}">
-              <a14:hiddenLine xmlns:a14="http://schemas.microsoft.com/office/drawing/2010/main" xmlns="" w="9525">
+              <a14:hiddenLine xmlns="" xmlns:a14="http://schemas.microsoft.com/office/drawing/2010/main" w="9525">
                 <a:solidFill>
                   <a:schemeClr val="tx1"/>
                 </a:solidFill>
@@ -4208,7 +4236,7 @@
               </a14:hiddenLine>
             </a:ext>
             <a:ext uri="{AF507438-7753-43e0-B8FC-AC1667EBCBE1}">
-              <a14:hiddenEffects xmlns:a14="http://schemas.microsoft.com/office/drawing/2010/main" xmlns="">
+              <a14:hiddenEffects xmlns="" xmlns:a14="http://schemas.microsoft.com/office/drawing/2010/main">
                 <a:effectLst>
                   <a:outerShdw dist="35921" dir="2700000" algn="ctr" rotWithShape="0">
                     <a:schemeClr val="bg2"/>
@@ -4253,12 +4281,12 @@
           <a:graphicData uri="http://schemas.openxmlformats.org/presentationml/2006/ole">
             <mc:AlternateContent xmlns:mc="http://schemas.openxmlformats.org/markup-compatibility/2006">
               <mc:Choice xmlns:v="urn:schemas-microsoft-com:vml" Requires="v">
-                <p:oleObj spid="_x0000_s2063" name="Visio" r:id="rId3" imgW="6972264" imgH="8633520" progId="Visio.Drawing.15">
+                <p:oleObj spid="_x0000_s2064" name="Visio" r:id="rId4" imgW="6972264" imgH="8633520" progId="Visio.Drawing.15">
                   <p:embed/>
                 </p:oleObj>
               </mc:Choice>
               <mc:Fallback>
-                <p:oleObj name="Visio" r:id="rId3" imgW="6972264" imgH="8633520" progId="Visio.Drawing.15">
+                <p:oleObj name="Visio" r:id="rId4" imgW="6972264" imgH="8633520" progId="Visio.Drawing.15">
                   <p:embed/>
                   <p:pic>
                     <p:nvPicPr>
@@ -4269,7 +4297,7 @@
                       <p:nvPr/>
                     </p:nvPicPr>
                     <p:blipFill>
-                      <a:blip r:embed="rId4">
+                      <a:blip r:embed="rId5">
                         <a:extLst>
                           <a:ext uri="{28A0092B-C50C-407E-A947-70E740481C1C}">
                             <a14:useLocalDpi xmlns:a14="http://schemas.microsoft.com/office/drawing/2010/main" val="0"/>
@@ -4308,6 +4336,13 @@
   <p:clrMapOvr>
     <a:masterClrMapping/>
   </p:clrMapOvr>
+  <p:timing>
+    <p:tnLst>
+      <p:par>
+        <p:cTn id="1" dur="indefinite" restart="never" nodeType="tmRoot"/>
+      </p:par>
+    </p:tnLst>
+  </p:timing>
 </p:sld>
 </file>
 
@@ -4431,6 +4466,13 @@
   <p:clrMapOvr>
     <a:masterClrMapping/>
   </p:clrMapOvr>
+  <p:timing>
+    <p:tnLst>
+      <p:par>
+        <p:cTn id="1" dur="indefinite" restart="never" nodeType="tmRoot"/>
+      </p:par>
+    </p:tnLst>
+  </p:timing>
 </p:sld>
 </file>
 
@@ -4525,8 +4567,20 @@
             <a:pPr lvl="1"/>
             <a:r>
               <a:rPr lang="en-US" dirty="0"/>
-              <a:t>Input:  Print Settings, Printer Configuration, Material Data, Object File References</a:t>
-            </a:r>
+              <a:t>Input:  Print Settings, Printer Configuration, Material Data, Object File </a:t>
+            </a:r>
+            <a:r>
+              <a:rPr lang="en-US" dirty="0" smtClean="0"/>
+              <a:t>References</a:t>
+            </a:r>
+          </a:p>
+          <a:p>
+            <a:pPr lvl="1"/>
+            <a:r>
+              <a:rPr lang="en-US" dirty="0" smtClean="0"/>
+              <a:t>Output:  Print Packet (Encapsulates Print Settings, Printer Configuration, Material Data, Object File References)</a:t>
+            </a:r>
+            <a:endParaRPr lang="en-US" dirty="0"/>
           </a:p>
         </p:txBody>
       </p:sp>
@@ -4540,6 +4594,13 @@
   <p:clrMapOvr>
     <a:masterClrMapping/>
   </p:clrMapOvr>
+  <p:timing>
+    <p:tnLst>
+      <p:par>
+        <p:cTn id="1" dur="indefinite" restart="never" nodeType="tmRoot"/>
+      </p:par>
+    </p:tnLst>
+  </p:timing>
 </p:sld>
 </file>
 
@@ -4658,6 +4719,13 @@
   <p:clrMapOvr>
     <a:masterClrMapping/>
   </p:clrMapOvr>
+  <p:timing>
+    <p:tnLst>
+      <p:par>
+        <p:cTn id="1" dur="indefinite" restart="never" nodeType="tmRoot"/>
+      </p:par>
+    </p:tnLst>
+  </p:timing>
 </p:sld>
 </file>
 
@@ -4778,6 +4846,13 @@
   <p:clrMapOvr>
     <a:masterClrMapping/>
   </p:clrMapOvr>
+  <p:timing>
+    <p:tnLst>
+      <p:par>
+        <p:cTn id="1" dur="indefinite" restart="never" nodeType="tmRoot"/>
+      </p:par>
+    </p:tnLst>
+  </p:timing>
 </p:sld>
 </file>
 
@@ -4891,6 +4966,13 @@
   <p:clrMapOvr>
     <a:masterClrMapping/>
   </p:clrMapOvr>
+  <p:timing>
+    <p:tnLst>
+      <p:par>
+        <p:cTn id="1" dur="indefinite" restart="never" nodeType="tmRoot"/>
+      </p:par>
+    </p:tnLst>
+  </p:timing>
 </p:sld>
 </file>
 
@@ -4992,6 +5074,13 @@
   <p:clrMapOvr>
     <a:masterClrMapping/>
   </p:clrMapOvr>
+  <p:timing>
+    <p:tnLst>
+      <p:par>
+        <p:cTn id="1" dur="indefinite" restart="never" nodeType="tmRoot"/>
+      </p:par>
+    </p:tnLst>
+  </p:timing>
 </p:sld>
 </file>
 
@@ -5176,6 +5265,13 @@
   <p:clrMapOvr>
     <a:masterClrMapping/>
   </p:clrMapOvr>
+  <p:timing>
+    <p:tnLst>
+      <p:par>
+        <p:cTn id="1" dur="indefinite" restart="never" nodeType="tmRoot"/>
+      </p:par>
+    </p:tnLst>
+  </p:timing>
 </p:sld>
 </file>
 
@@ -5361,6 +5457,13 @@
   <p:clrMapOvr>
     <a:masterClrMapping/>
   </p:clrMapOvr>
+  <p:timing>
+    <p:tnLst>
+      <p:par>
+        <p:cTn id="1" dur="indefinite" restart="never" nodeType="tmRoot"/>
+      </p:par>
+    </p:tnLst>
+  </p:timing>
 </p:sld>
 </file>
 
@@ -5534,6 +5637,13 @@
   <p:clrMapOvr>
     <a:masterClrMapping/>
   </p:clrMapOvr>
+  <p:timing>
+    <p:tnLst>
+      <p:par>
+        <p:cTn id="1" dur="indefinite" restart="never" nodeType="tmRoot"/>
+      </p:par>
+    </p:tnLst>
+  </p:timing>
 </p:sld>
 </file>
 
@@ -5613,23 +5723,14 @@
             <a:pPr lvl="1"/>
             <a:r>
               <a:rPr lang="en-US" dirty="0" smtClean="0"/>
-              <a:t>Function</a:t>
-            </a:r>
-            <a:r>
-              <a:rPr lang="en-US" dirty="0" smtClean="0"/>
-              <a:t>: Accept status inputs from status module and printer state monitoring and conditionally dispatches G-Code stream to packet preparation module.</a:t>
-            </a:r>
-            <a:endParaRPr lang="en-US" dirty="0" smtClean="0"/>
-          </a:p>
-          <a:p>
-            <a:pPr lvl="1"/>
-            <a:r>
-              <a:rPr lang="en-US" dirty="0" smtClean="0"/>
-              <a:t>Dependencies</a:t>
-            </a:r>
-            <a:r>
-              <a:rPr lang="en-US" dirty="0" smtClean="0"/>
-              <a:t>: Packet preparation module, status module, and printer state monitoring module.</a:t>
+              <a:t>Function: Accept status inputs from status module and printer state monitoring and conditionally dispatches G-Code stream to packet preparation module.</a:t>
+            </a:r>
+          </a:p>
+          <a:p>
+            <a:pPr lvl="1"/>
+            <a:r>
+              <a:rPr lang="en-US" dirty="0" smtClean="0"/>
+              <a:t>Dependencies: Packet preparation module, status module, and printer state monitoring module.</a:t>
             </a:r>
             <a:endParaRPr lang="en-US" dirty="0"/>
           </a:p>
@@ -5772,23 +5873,14 @@
             <a:pPr lvl="1"/>
             <a:r>
               <a:rPr lang="en-US" dirty="0" smtClean="0"/>
-              <a:t>Function</a:t>
-            </a:r>
-            <a:r>
-              <a:rPr lang="en-US" dirty="0" smtClean="0"/>
-              <a:t>: Serialize G-Code stream and packetize so that the packets can be transmitted to the printer. Establish serial connection to printer firmware.</a:t>
-            </a:r>
-            <a:endParaRPr lang="en-US" dirty="0" smtClean="0"/>
-          </a:p>
-          <a:p>
-            <a:pPr lvl="1"/>
-            <a:r>
-              <a:rPr lang="en-US" dirty="0" smtClean="0"/>
-              <a:t>Dependencies</a:t>
-            </a:r>
-            <a:r>
-              <a:rPr lang="en-US" dirty="0" smtClean="0"/>
-              <a:t>: Printer state controller.</a:t>
+              <a:t>Function: Serialize G-Code stream and packetize so that the packets can be transmitted to the printer. Establish serial connection to printer firmware.</a:t>
+            </a:r>
+          </a:p>
+          <a:p>
+            <a:pPr lvl="1"/>
+            <a:r>
+              <a:rPr lang="en-US" dirty="0" smtClean="0"/>
+              <a:t>Dependencies: Printer state controller.</a:t>
             </a:r>
             <a:endParaRPr lang="en-US" dirty="0"/>
           </a:p>
@@ -5923,23 +6015,14 @@
             <a:pPr lvl="1"/>
             <a:r>
               <a:rPr lang="en-US" dirty="0" smtClean="0"/>
-              <a:t>Function</a:t>
-            </a:r>
-            <a:r>
-              <a:rPr lang="en-US" dirty="0" smtClean="0"/>
-              <a:t>: Listens for response from printer on established serial connection. Assembles and converts received data into form appropriate for inter-layer transmission. </a:t>
-            </a:r>
-            <a:endParaRPr lang="en-US" dirty="0" smtClean="0"/>
-          </a:p>
-          <a:p>
-            <a:pPr lvl="1"/>
-            <a:r>
-              <a:rPr lang="en-US" dirty="0" smtClean="0"/>
-              <a:t>Dependencies</a:t>
-            </a:r>
-            <a:r>
-              <a:rPr lang="en-US" dirty="0" smtClean="0"/>
-              <a:t>: Printer State Controller, Status Module</a:t>
+              <a:t>Function: Listens for response from printer on established serial connection. Assembles and converts received data into form appropriate for inter-layer transmission. </a:t>
+            </a:r>
+          </a:p>
+          <a:p>
+            <a:pPr lvl="1"/>
+            <a:r>
+              <a:rPr lang="en-US" dirty="0" smtClean="0"/>
+              <a:t>Dependencies: Printer State Controller, Status Module</a:t>
             </a:r>
             <a:endParaRPr lang="en-US" dirty="0"/>
           </a:p>
@@ -6127,6 +6210,13 @@
   <p:clrMapOvr>
     <a:masterClrMapping/>
   </p:clrMapOvr>
+  <p:timing>
+    <p:tnLst>
+      <p:par>
+        <p:cTn id="1" dur="indefinite" restart="never" nodeType="tmRoot"/>
+      </p:par>
+    </p:tnLst>
+  </p:timing>
 </p:sld>
 </file>
 
@@ -6258,6 +6348,13 @@
   <p:clrMapOvr>
     <a:masterClrMapping/>
   </p:clrMapOvr>
+  <p:timing>
+    <p:tnLst>
+      <p:par>
+        <p:cTn id="1" dur="indefinite" restart="never" nodeType="tmRoot"/>
+      </p:par>
+    </p:tnLst>
+  </p:timing>
 </p:sld>
 </file>
 
@@ -6389,6 +6486,13 @@
   <p:clrMapOvr>
     <a:masterClrMapping/>
   </p:clrMapOvr>
+  <p:timing>
+    <p:tnLst>
+      <p:par>
+        <p:cTn id="1" dur="indefinite" restart="never" nodeType="tmRoot"/>
+      </p:par>
+    </p:tnLst>
+  </p:timing>
 </p:sld>
 </file>
 
@@ -6520,6 +6624,13 @@
   <p:clrMapOvr>
     <a:masterClrMapping/>
   </p:clrMapOvr>
+  <p:timing>
+    <p:tnLst>
+      <p:par>
+        <p:cTn id="1" dur="indefinite" restart="never" nodeType="tmRoot"/>
+      </p:par>
+    </p:tnLst>
+  </p:timing>
 </p:sld>
 </file>
 
@@ -6614,14 +6725,14 @@
           <a:effectLst/>
           <a:extLst>
             <a:ext uri="{909E8E84-426E-40dd-AFC4-6F175D3DCCD1}">
-              <a14:hiddenFill xmlns:a14="http://schemas.microsoft.com/office/drawing/2010/main" xmlns="">
+              <a14:hiddenFill xmlns="" xmlns:a14="http://schemas.microsoft.com/office/drawing/2010/main">
                 <a:solidFill>
                   <a:schemeClr val="accent1"/>
                 </a:solidFill>
               </a14:hiddenFill>
             </a:ext>
             <a:ext uri="{91240B29-F687-4f45-9708-019B960494DF}">
-              <a14:hiddenLine xmlns:a14="http://schemas.microsoft.com/office/drawing/2010/main" xmlns="" w="9525">
+              <a14:hiddenLine xmlns="" xmlns:a14="http://schemas.microsoft.com/office/drawing/2010/main" w="9525">
                 <a:solidFill>
                   <a:schemeClr val="tx1"/>
                 </a:solidFill>
@@ -6631,7 +6742,7 @@
               </a14:hiddenLine>
             </a:ext>
             <a:ext uri="{AF507438-7753-43e0-B8FC-AC1667EBCBE1}">
-              <a14:hiddenEffects xmlns:a14="http://schemas.microsoft.com/office/drawing/2010/main" xmlns="">
+              <a14:hiddenEffects xmlns="" xmlns:a14="http://schemas.microsoft.com/office/drawing/2010/main">
                 <a:effectLst>
                   <a:outerShdw dist="35921" dir="2700000" algn="ctr" rotWithShape="0">
                     <a:schemeClr val="bg2"/>
@@ -6676,12 +6787,12 @@
           <a:graphicData uri="http://schemas.openxmlformats.org/presentationml/2006/ole">
             <mc:AlternateContent xmlns:mc="http://schemas.openxmlformats.org/markup-compatibility/2006">
               <mc:Choice xmlns:v="urn:schemas-microsoft-com:vml" Requires="v">
-                <p:oleObj spid="_x0000_s1041" name="Visio" r:id="rId3" imgW="3867210" imgH="4695840" progId="Visio.Drawing.15">
+                <p:oleObj spid="_x0000_s1042" name="Visio" r:id="rId4" imgW="3867210" imgH="4695840" progId="Visio.Drawing.15">
                   <p:embed/>
                 </p:oleObj>
               </mc:Choice>
               <mc:Fallback>
-                <p:oleObj name="Visio" r:id="rId3" imgW="3867210" imgH="4695840" progId="Visio.Drawing.15">
+                <p:oleObj name="Visio" r:id="rId4" imgW="3867210" imgH="4695840" progId="Visio.Drawing.15">
                   <p:embed/>
                   <p:pic>
                     <p:nvPicPr>
@@ -6692,7 +6803,7 @@
                       <p:nvPr/>
                     </p:nvPicPr>
                     <p:blipFill>
-                      <a:blip r:embed="rId4"/>
+                      <a:blip r:embed="rId5"/>
                       <a:srcRect/>
                       <a:stretch>
                         <a:fillRect/>
@@ -6725,6 +6836,13 @@
   <p:clrMapOvr>
     <a:masterClrMapping/>
   </p:clrMapOvr>
+  <p:timing>
+    <p:tnLst>
+      <p:par>
+        <p:cTn id="1" dur="indefinite" restart="never" nodeType="tmRoot"/>
+      </p:par>
+    </p:tnLst>
+  </p:timing>
 </p:sld>
 </file>
 
@@ -6887,14 +7005,14 @@
           <a:effectLst/>
           <a:extLst>
             <a:ext uri="{909E8E84-426E-40dd-AFC4-6F175D3DCCD1}">
-              <a14:hiddenFill xmlns:a14="http://schemas.microsoft.com/office/drawing/2010/main" xmlns="">
+              <a14:hiddenFill xmlns="" xmlns:a14="http://schemas.microsoft.com/office/drawing/2010/main">
                 <a:solidFill>
                   <a:schemeClr val="accent1"/>
                 </a:solidFill>
               </a14:hiddenFill>
             </a:ext>
             <a:ext uri="{91240B29-F687-4f45-9708-019B960494DF}">
-              <a14:hiddenLine xmlns:a14="http://schemas.microsoft.com/office/drawing/2010/main" xmlns="" w="9525">
+              <a14:hiddenLine xmlns="" xmlns:a14="http://schemas.microsoft.com/office/drawing/2010/main" w="9525">
                 <a:solidFill>
                   <a:schemeClr val="tx1"/>
                 </a:solidFill>
@@ -6904,7 +7022,7 @@
               </a14:hiddenLine>
             </a:ext>
             <a:ext uri="{AF507438-7753-43e0-B8FC-AC1667EBCBE1}">
-              <a14:hiddenEffects xmlns:a14="http://schemas.microsoft.com/office/drawing/2010/main" xmlns="">
+              <a14:hiddenEffects xmlns="" xmlns:a14="http://schemas.microsoft.com/office/drawing/2010/main">
                 <a:effectLst>
                   <a:outerShdw dist="35921" dir="2700000" algn="ctr" rotWithShape="0">
                     <a:schemeClr val="bg2"/>
@@ -6937,6 +7055,13 @@
   <p:clrMapOvr>
     <a:masterClrMapping/>
   </p:clrMapOvr>
+  <p:timing>
+    <p:tnLst>
+      <p:par>
+        <p:cTn id="1" dur="indefinite" restart="never" nodeType="tmRoot"/>
+      </p:par>
+    </p:tnLst>
+  </p:timing>
 </p:sld>
 </file>
 
@@ -7064,14 +7189,14 @@
           <a:effectLst/>
           <a:extLst>
             <a:ext uri="{909E8E84-426E-40dd-AFC4-6F175D3DCCD1}">
-              <a14:hiddenFill xmlns:a14="http://schemas.microsoft.com/office/drawing/2010/main" xmlns="">
+              <a14:hiddenFill xmlns="" xmlns:a14="http://schemas.microsoft.com/office/drawing/2010/main">
                 <a:solidFill>
                   <a:schemeClr val="accent1"/>
                 </a:solidFill>
               </a14:hiddenFill>
             </a:ext>
             <a:ext uri="{91240B29-F687-4f45-9708-019B960494DF}">
-              <a14:hiddenLine xmlns:a14="http://schemas.microsoft.com/office/drawing/2010/main" xmlns="" w="9525">
+              <a14:hiddenLine xmlns="" xmlns:a14="http://schemas.microsoft.com/office/drawing/2010/main" w="9525">
                 <a:solidFill>
                   <a:schemeClr val="tx1"/>
                 </a:solidFill>
@@ -7081,7 +7206,7 @@
               </a14:hiddenLine>
             </a:ext>
             <a:ext uri="{AF507438-7753-43e0-B8FC-AC1667EBCBE1}">
-              <a14:hiddenEffects xmlns:a14="http://schemas.microsoft.com/office/drawing/2010/main" xmlns="">
+              <a14:hiddenEffects xmlns="" xmlns:a14="http://schemas.microsoft.com/office/drawing/2010/main">
                 <a:effectLst>
                   <a:outerShdw dist="35921" dir="2700000" algn="ctr" rotWithShape="0">
                     <a:schemeClr val="bg2"/>
@@ -7114,6 +7239,13 @@
   <p:clrMapOvr>
     <a:masterClrMapping/>
   </p:clrMapOvr>
+  <p:timing>
+    <p:tnLst>
+      <p:par>
+        <p:cTn id="1" dur="indefinite" restart="never" nodeType="tmRoot"/>
+      </p:par>
+    </p:tnLst>
+  </p:timing>
 </p:sld>
 </file>
 

</xml_diff>

<commit_message>
Updated ADS Slides and Document
</commit_message>
<xml_diff>
--- a/ADS Gate Review/Team Ink3d ADS.pptx
+++ b/ADS Gate Review/Team Ink3d ADS.pptx
@@ -20,16 +20,22 @@
     <p:sldId id="280" r:id="rId14"/>
     <p:sldId id="281" r:id="rId15"/>
     <p:sldId id="282" r:id="rId16"/>
-    <p:sldId id="286" r:id="rId17"/>
-    <p:sldId id="283" r:id="rId18"/>
-    <p:sldId id="284" r:id="rId19"/>
-    <p:sldId id="285" r:id="rId20"/>
-    <p:sldId id="287" r:id="rId21"/>
-    <p:sldId id="288" r:id="rId22"/>
-    <p:sldId id="289" r:id="rId23"/>
-    <p:sldId id="290" r:id="rId24"/>
-    <p:sldId id="291" r:id="rId25"/>
-    <p:sldId id="292" r:id="rId26"/>
+    <p:sldId id="293" r:id="rId17"/>
+    <p:sldId id="286" r:id="rId18"/>
+    <p:sldId id="283" r:id="rId19"/>
+    <p:sldId id="284" r:id="rId20"/>
+    <p:sldId id="285" r:id="rId21"/>
+    <p:sldId id="287" r:id="rId22"/>
+    <p:sldId id="294" r:id="rId23"/>
+    <p:sldId id="288" r:id="rId24"/>
+    <p:sldId id="295" r:id="rId25"/>
+    <p:sldId id="289" r:id="rId26"/>
+    <p:sldId id="296" r:id="rId27"/>
+    <p:sldId id="290" r:id="rId28"/>
+    <p:sldId id="297" r:id="rId29"/>
+    <p:sldId id="291" r:id="rId30"/>
+    <p:sldId id="292" r:id="rId31"/>
+    <p:sldId id="298" r:id="rId32"/>
   </p:sldIdLst>
   <p:sldSz cx="9144000" cy="6858000" type="screen4x3"/>
   <p:notesSz cx="6858000" cy="9144000"/>
@@ -130,7 +136,7 @@
   </p:defaultTextStyle>
   <p:extLst>
     <p:ext uri="{EFAFB233-063F-42B5-8137-9DF3F51BA10A}">
-      <p15:sldGuideLst xmlns:p15="http://schemas.microsoft.com/office/powerpoint/2012/main">
+      <p15:sldGuideLst xmlns:p15="http://schemas.microsoft.com/office/powerpoint/2012/main" xmlns="">
         <p15:guide id="1" orient="horz" pos="2160">
           <p15:clr>
             <a:srgbClr val="A4A3A4"/>
@@ -3453,15 +3459,15 @@
           </a:ln>
           <a:effectLst/>
           <a:extLst>
-            <a:ext uri="{909E8E84-426E-40dd-AFC4-6F175D3DCCD1}">
-              <a14:hiddenFill xmlns="" xmlns:a14="http://schemas.microsoft.com/office/drawing/2010/main">
+            <a:ext uri="{909E8E84-426E-40DD-AFC4-6F175D3DCCD1}">
+              <a14:hiddenFill xmlns:a14="http://schemas.microsoft.com/office/drawing/2010/main">
                 <a:solidFill>
                   <a:schemeClr val="accent1"/>
                 </a:solidFill>
               </a14:hiddenFill>
             </a:ext>
-            <a:ext uri="{91240B29-F687-4f45-9708-019B960494DF}">
-              <a14:hiddenLine xmlns="" xmlns:a14="http://schemas.microsoft.com/office/drawing/2010/main" w="9525">
+            <a:ext uri="{91240B29-F687-4F45-9708-019B960494DF}">
+              <a14:hiddenLine xmlns:a14="http://schemas.microsoft.com/office/drawing/2010/main" w="9525">
                 <a:solidFill>
                   <a:schemeClr val="tx1"/>
                 </a:solidFill>
@@ -3470,8 +3476,8 @@
                 <a:tailEnd/>
               </a14:hiddenLine>
             </a:ext>
-            <a:ext uri="{AF507438-7753-43e0-B8FC-AC1667EBCBE1}">
-              <a14:hiddenEffects xmlns="" xmlns:a14="http://schemas.microsoft.com/office/drawing/2010/main">
+            <a:ext uri="{AF507438-7753-43E0-B8FC-AC1667EBCBE1}">
+              <a14:hiddenEffects xmlns:a14="http://schemas.microsoft.com/office/drawing/2010/main">
                 <a:effectLst>
                   <a:outerShdw dist="35921" dir="2700000" algn="ctr" rotWithShape="0">
                     <a:schemeClr val="bg2"/>
@@ -3637,15 +3643,15 @@
           </a:ln>
           <a:effectLst/>
           <a:extLst>
-            <a:ext uri="{909E8E84-426E-40dd-AFC4-6F175D3DCCD1}">
-              <a14:hiddenFill xmlns="" xmlns:a14="http://schemas.microsoft.com/office/drawing/2010/main">
+            <a:ext uri="{909E8E84-426E-40DD-AFC4-6F175D3DCCD1}">
+              <a14:hiddenFill xmlns:a14="http://schemas.microsoft.com/office/drawing/2010/main">
                 <a:solidFill>
                   <a:schemeClr val="accent1"/>
                 </a:solidFill>
               </a14:hiddenFill>
             </a:ext>
-            <a:ext uri="{91240B29-F687-4f45-9708-019B960494DF}">
-              <a14:hiddenLine xmlns="" xmlns:a14="http://schemas.microsoft.com/office/drawing/2010/main" w="9525">
+            <a:ext uri="{91240B29-F687-4F45-9708-019B960494DF}">
+              <a14:hiddenLine xmlns:a14="http://schemas.microsoft.com/office/drawing/2010/main" w="9525">
                 <a:solidFill>
                   <a:schemeClr val="tx1"/>
                 </a:solidFill>
@@ -3654,8 +3660,8 @@
                 <a:tailEnd/>
               </a14:hiddenLine>
             </a:ext>
-            <a:ext uri="{AF507438-7753-43e0-B8FC-AC1667EBCBE1}">
-              <a14:hiddenEffects xmlns="" xmlns:a14="http://schemas.microsoft.com/office/drawing/2010/main">
+            <a:ext uri="{AF507438-7753-43E0-B8FC-AC1667EBCBE1}">
+              <a14:hiddenEffects xmlns:a14="http://schemas.microsoft.com/office/drawing/2010/main">
                 <a:effectLst>
                   <a:outerShdw dist="35921" dir="2700000" algn="ctr" rotWithShape="0">
                     <a:schemeClr val="bg2"/>
@@ -3842,15 +3848,15 @@
           </a:ln>
           <a:effectLst/>
           <a:extLst>
-            <a:ext uri="{909E8E84-426E-40dd-AFC4-6F175D3DCCD1}">
-              <a14:hiddenFill xmlns="" xmlns:a14="http://schemas.microsoft.com/office/drawing/2010/main">
+            <a:ext uri="{909E8E84-426E-40DD-AFC4-6F175D3DCCD1}">
+              <a14:hiddenFill xmlns:a14="http://schemas.microsoft.com/office/drawing/2010/main">
                 <a:solidFill>
                   <a:schemeClr val="accent1"/>
                 </a:solidFill>
               </a14:hiddenFill>
             </a:ext>
-            <a:ext uri="{91240B29-F687-4f45-9708-019B960494DF}">
-              <a14:hiddenLine xmlns="" xmlns:a14="http://schemas.microsoft.com/office/drawing/2010/main" w="9525">
+            <a:ext uri="{91240B29-F687-4F45-9708-019B960494DF}">
+              <a14:hiddenLine xmlns:a14="http://schemas.microsoft.com/office/drawing/2010/main" w="9525">
                 <a:solidFill>
                   <a:schemeClr val="tx1"/>
                 </a:solidFill>
@@ -3859,8 +3865,8 @@
                 <a:tailEnd/>
               </a14:hiddenLine>
             </a:ext>
-            <a:ext uri="{AF507438-7753-43e0-B8FC-AC1667EBCBE1}">
-              <a14:hiddenEffects xmlns="" xmlns:a14="http://schemas.microsoft.com/office/drawing/2010/main">
+            <a:ext uri="{AF507438-7753-43E0-B8FC-AC1667EBCBE1}">
+              <a14:hiddenEffects xmlns:a14="http://schemas.microsoft.com/office/drawing/2010/main">
                 <a:effectLst>
                   <a:outerShdw dist="35921" dir="2700000" algn="ctr" rotWithShape="0">
                     <a:schemeClr val="bg2"/>
@@ -4032,15 +4038,15 @@
           </a:ln>
           <a:effectLst/>
           <a:extLst>
-            <a:ext uri="{909E8E84-426E-40dd-AFC4-6F175D3DCCD1}">
-              <a14:hiddenFill xmlns="" xmlns:a14="http://schemas.microsoft.com/office/drawing/2010/main">
+            <a:ext uri="{909E8E84-426E-40DD-AFC4-6F175D3DCCD1}">
+              <a14:hiddenFill xmlns:a14="http://schemas.microsoft.com/office/drawing/2010/main">
                 <a:solidFill>
                   <a:schemeClr val="accent1"/>
                 </a:solidFill>
               </a14:hiddenFill>
             </a:ext>
-            <a:ext uri="{91240B29-F687-4f45-9708-019B960494DF}">
-              <a14:hiddenLine xmlns="" xmlns:a14="http://schemas.microsoft.com/office/drawing/2010/main" w="9525">
+            <a:ext uri="{91240B29-F687-4F45-9708-019B960494DF}">
+              <a14:hiddenLine xmlns:a14="http://schemas.microsoft.com/office/drawing/2010/main" w="9525">
                 <a:solidFill>
                   <a:schemeClr val="tx1"/>
                 </a:solidFill>
@@ -4049,8 +4055,8 @@
                 <a:tailEnd/>
               </a14:hiddenLine>
             </a:ext>
-            <a:ext uri="{AF507438-7753-43e0-B8FC-AC1667EBCBE1}">
-              <a14:hiddenEffects xmlns="" xmlns:a14="http://schemas.microsoft.com/office/drawing/2010/main">
+            <a:ext uri="{AF507438-7753-43E0-B8FC-AC1667EBCBE1}">
+              <a14:hiddenEffects xmlns:a14="http://schemas.microsoft.com/office/drawing/2010/main">
                 <a:effectLst>
                   <a:outerShdw dist="35921" dir="2700000" algn="ctr" rotWithShape="0">
                     <a:schemeClr val="bg2"/>
@@ -4155,15 +4161,15 @@
           </a:ln>
           <a:effectLst/>
           <a:extLst>
-            <a:ext uri="{909E8E84-426E-40dd-AFC4-6F175D3DCCD1}">
-              <a14:hiddenFill xmlns="" xmlns:a14="http://schemas.microsoft.com/office/drawing/2010/main">
+            <a:ext uri="{909E8E84-426E-40DD-AFC4-6F175D3DCCD1}">
+              <a14:hiddenFill xmlns:a14="http://schemas.microsoft.com/office/drawing/2010/main">
                 <a:solidFill>
                   <a:schemeClr val="accent1"/>
                 </a:solidFill>
               </a14:hiddenFill>
             </a:ext>
-            <a:ext uri="{91240B29-F687-4f45-9708-019B960494DF}">
-              <a14:hiddenLine xmlns="" xmlns:a14="http://schemas.microsoft.com/office/drawing/2010/main" w="9525">
+            <a:ext uri="{91240B29-F687-4F45-9708-019B960494DF}">
+              <a14:hiddenLine xmlns:a14="http://schemas.microsoft.com/office/drawing/2010/main" w="9525">
                 <a:solidFill>
                   <a:schemeClr val="tx1"/>
                 </a:solidFill>
@@ -4172,8 +4178,8 @@
                 <a:tailEnd/>
               </a14:hiddenLine>
             </a:ext>
-            <a:ext uri="{AF507438-7753-43e0-B8FC-AC1667EBCBE1}">
-              <a14:hiddenEffects xmlns="" xmlns:a14="http://schemas.microsoft.com/office/drawing/2010/main">
+            <a:ext uri="{AF507438-7753-43E0-B8FC-AC1667EBCBE1}">
+              <a14:hiddenEffects xmlns:a14="http://schemas.microsoft.com/office/drawing/2010/main">
                 <a:effectLst>
                   <a:outerShdw dist="35921" dir="2700000" algn="ctr" rotWithShape="0">
                     <a:schemeClr val="bg2"/>
@@ -4218,15 +4224,15 @@
           </a:ln>
           <a:effectLst/>
           <a:extLst>
-            <a:ext uri="{909E8E84-426E-40dd-AFC4-6F175D3DCCD1}">
-              <a14:hiddenFill xmlns="" xmlns:a14="http://schemas.microsoft.com/office/drawing/2010/main">
+            <a:ext uri="{909E8E84-426E-40DD-AFC4-6F175D3DCCD1}">
+              <a14:hiddenFill xmlns:a14="http://schemas.microsoft.com/office/drawing/2010/main">
                 <a:solidFill>
                   <a:schemeClr val="accent1"/>
                 </a:solidFill>
               </a14:hiddenFill>
             </a:ext>
-            <a:ext uri="{91240B29-F687-4f45-9708-019B960494DF}">
-              <a14:hiddenLine xmlns="" xmlns:a14="http://schemas.microsoft.com/office/drawing/2010/main" w="9525">
+            <a:ext uri="{91240B29-F687-4F45-9708-019B960494DF}">
+              <a14:hiddenLine xmlns:a14="http://schemas.microsoft.com/office/drawing/2010/main" w="9525">
                 <a:solidFill>
                   <a:schemeClr val="tx1"/>
                 </a:solidFill>
@@ -4235,8 +4241,8 @@
                 <a:tailEnd/>
               </a14:hiddenLine>
             </a:ext>
-            <a:ext uri="{AF507438-7753-43e0-B8FC-AC1667EBCBE1}">
-              <a14:hiddenEffects xmlns="" xmlns:a14="http://schemas.microsoft.com/office/drawing/2010/main">
+            <a:ext uri="{AF507438-7753-43E0-B8FC-AC1667EBCBE1}">
+              <a14:hiddenEffects xmlns:a14="http://schemas.microsoft.com/office/drawing/2010/main">
                 <a:effectLst>
                   <a:outerShdw dist="35921" dir="2700000" algn="ctr" rotWithShape="0">
                     <a:schemeClr val="bg2"/>
@@ -4259,73 +4265,60 @@
           </a:p>
         </p:txBody>
       </p:sp>
-      <p:graphicFrame>
-        <p:nvGraphicFramePr>
-          <p:cNvPr id="7" name="Object 6"/>
-          <p:cNvGraphicFramePr>
-            <a:graphicFrameLocks noChangeAspect="1"/>
-          </p:cNvGraphicFramePr>
-          <p:nvPr>
-            <p:extLst>
-              <p:ext uri="{D42A27DB-BD31-4B8C-83A1-F6EECF244321}">
-                <p14:modId xmlns:p14="http://schemas.microsoft.com/office/powerpoint/2010/main" val="152849231"/>
-              </p:ext>
-            </p:extLst>
-          </p:nvPr>
-        </p:nvGraphicFramePr>
-        <p:xfrm>
-          <a:off x="2057400" y="1219200"/>
-          <a:ext cx="4419600" cy="5467838"/>
-        </p:xfrm>
-        <a:graphic>
-          <a:graphicData uri="http://schemas.openxmlformats.org/presentationml/2006/ole">
-            <mc:AlternateContent xmlns:mc="http://schemas.openxmlformats.org/markup-compatibility/2006">
-              <mc:Choice xmlns:v="urn:schemas-microsoft-com:vml" Requires="v">
-                <p:oleObj spid="_x0000_s2064" name="Visio" r:id="rId4" imgW="6972264" imgH="8633520" progId="Visio.Drawing.15">
-                  <p:embed/>
-                </p:oleObj>
-              </mc:Choice>
-              <mc:Fallback>
-                <p:oleObj name="Visio" r:id="rId4" imgW="6972264" imgH="8633520" progId="Visio.Drawing.15">
-                  <p:embed/>
-                  <p:pic>
-                    <p:nvPicPr>
-                      <p:cNvPr id="0" name="Object 1"/>
-                      <p:cNvPicPr>
-                        <a:picLocks noChangeAspect="1" noChangeArrowheads="1"/>
-                      </p:cNvPicPr>
-                      <p:nvPr/>
-                    </p:nvPicPr>
-                    <p:blipFill>
-                      <a:blip r:embed="rId5">
-                        <a:extLst>
-                          <a:ext uri="{28A0092B-C50C-407E-A947-70E740481C1C}">
-                            <a14:useLocalDpi xmlns:a14="http://schemas.microsoft.com/office/drawing/2010/main" val="0"/>
-                          </a:ext>
-                        </a:extLst>
-                      </a:blip>
-                      <a:srcRect/>
-                      <a:stretch>
-                        <a:fillRect/>
-                      </a:stretch>
-                    </p:blipFill>
-                    <p:spPr bwMode="auto">
-                      <a:xfrm>
-                        <a:off x="2057400" y="1219200"/>
-                        <a:ext cx="4419600" cy="5467838"/>
-                      </a:xfrm>
-                      <a:prstGeom prst="rect">
-                        <a:avLst/>
-                      </a:prstGeom>
-                      <a:noFill/>
-                    </p:spPr>
-                  </p:pic>
-                </p:oleObj>
-              </mc:Fallback>
-            </mc:AlternateContent>
-          </a:graphicData>
-        </a:graphic>
-      </p:graphicFrame>
+      <p:pic>
+        <p:nvPicPr>
+          <p:cNvPr id="2065" name="Picture 17"/>
+          <p:cNvPicPr>
+            <a:picLocks noChangeAspect="1" noChangeArrowheads="1"/>
+          </p:cNvPicPr>
+          <p:nvPr/>
+        </p:nvPicPr>
+        <p:blipFill>
+          <a:blip r:embed="rId2">
+            <a:extLst>
+              <a:ext uri="{28A0092B-C50C-407E-A947-70E740481C1C}">
+                <a14:useLocalDpi xmlns:a14="http://schemas.microsoft.com/office/drawing/2010/main" val="0"/>
+              </a:ext>
+            </a:extLst>
+          </a:blip>
+          <a:srcRect/>
+          <a:stretch>
+            <a:fillRect/>
+          </a:stretch>
+        </p:blipFill>
+        <p:spPr bwMode="auto">
+          <a:xfrm>
+            <a:off x="2133600" y="1219200"/>
+            <a:ext cx="4461052" cy="5476875"/>
+          </a:xfrm>
+          <a:prstGeom prst="rect">
+            <a:avLst/>
+          </a:prstGeom>
+          <a:noFill/>
+          <a:ln>
+            <a:noFill/>
+          </a:ln>
+          <a:extLst>
+            <a:ext uri="{909E8E84-426E-40DD-AFC4-6F175D3DCCD1}">
+              <a14:hiddenFill xmlns:a14="http://schemas.microsoft.com/office/drawing/2010/main">
+                <a:solidFill>
+                  <a:schemeClr val="accent1"/>
+                </a:solidFill>
+              </a14:hiddenFill>
+            </a:ext>
+            <a:ext uri="{91240B29-F687-4F45-9708-019B960494DF}">
+              <a14:hiddenLine xmlns:a14="http://schemas.microsoft.com/office/drawing/2010/main" w="9525">
+                <a:solidFill>
+                  <a:schemeClr val="tx1"/>
+                </a:solidFill>
+                <a:miter lim="800000"/>
+                <a:headEnd/>
+                <a:tailEnd/>
+              </a14:hiddenLine>
+            </a:ext>
+          </a:extLst>
+        </p:spPr>
+      </p:pic>
     </p:spTree>
     <p:extLst>
       <p:ext uri="{BB962C8B-B14F-4D97-AF65-F5344CB8AC3E}">
@@ -4388,74 +4381,137 @@
       </p:sp>
       <p:sp>
         <p:nvSpPr>
-          <p:cNvPr id="3" name="Content Placeholder 2"/>
-          <p:cNvSpPr>
-            <a:spLocks noGrp="1"/>
-          </p:cNvSpPr>
-          <p:nvPr>
-            <p:ph idx="1"/>
-          </p:nvPr>
-        </p:nvSpPr>
-        <p:spPr/>
-        <p:txBody>
-          <a:bodyPr>
-            <a:normAutofit/>
+          <p:cNvPr id="5" name="Rectangle 2"/>
+          <p:cNvSpPr>
+            <a:spLocks noChangeArrowheads="1"/>
+          </p:cNvSpPr>
+          <p:nvPr/>
+        </p:nvSpPr>
+        <p:spPr bwMode="auto">
+          <a:xfrm>
+            <a:off x="0" y="0"/>
+            <a:ext cx="9144000" cy="0"/>
+          </a:xfrm>
+          <a:prstGeom prst="rect">
+            <a:avLst/>
+          </a:prstGeom>
+          <a:noFill/>
+          <a:ln>
+            <a:noFill/>
+          </a:ln>
+          <a:effectLst/>
+          <a:extLst>
+            <a:ext uri="{909E8E84-426E-40DD-AFC4-6F175D3DCCD1}">
+              <a14:hiddenFill xmlns:a14="http://schemas.microsoft.com/office/drawing/2010/main">
+                <a:solidFill>
+                  <a:schemeClr val="accent1"/>
+                </a:solidFill>
+              </a14:hiddenFill>
+            </a:ext>
+            <a:ext uri="{91240B29-F687-4F45-9708-019B960494DF}">
+              <a14:hiddenLine xmlns:a14="http://schemas.microsoft.com/office/drawing/2010/main" w="9525">
+                <a:solidFill>
+                  <a:schemeClr val="tx1"/>
+                </a:solidFill>
+                <a:miter lim="800000"/>
+                <a:headEnd/>
+                <a:tailEnd/>
+              </a14:hiddenLine>
+            </a:ext>
+            <a:ext uri="{AF507438-7753-43E0-B8FC-AC1667EBCBE1}">
+              <a14:hiddenEffects xmlns:a14="http://schemas.microsoft.com/office/drawing/2010/main">
+                <a:effectLst>
+                  <a:outerShdw dist="35921" dir="2700000" algn="ctr" rotWithShape="0">
+                    <a:schemeClr val="bg2"/>
+                  </a:outerShdw>
+                </a:effectLst>
+              </a14:hiddenEffects>
+            </a:ext>
+          </a:extLst>
+        </p:spPr>
+        <p:txBody>
+          <a:bodyPr vert="horz" wrap="none" lIns="91440" tIns="45720" rIns="91440" bIns="45720" numCol="1" anchor="ctr" anchorCtr="0" compatLnSpc="1">
+            <a:prstTxWarp prst="textNoShape">
+              <a:avLst/>
+            </a:prstTxWarp>
+            <a:spAutoFit/>
           </a:bodyPr>
           <a:lstStyle/>
           <a:p>
-            <a:r>
-              <a:rPr lang="en-US" dirty="0" smtClean="0"/>
-              <a:t>Import Module</a:t>
-            </a:r>
-          </a:p>
-          <a:p>
-            <a:pPr lvl="1"/>
-            <a:r>
-              <a:rPr lang="en-US" dirty="0" smtClean="0"/>
-              <a:t>Purpose:  Allow the user to import object files</a:t>
-            </a:r>
-          </a:p>
-          <a:p>
-            <a:pPr lvl="1"/>
-            <a:r>
-              <a:rPr lang="en-US" dirty="0" smtClean="0"/>
-              <a:t>Function:  Display interface from which users import files and pass those files to the Print Module.</a:t>
-            </a:r>
-          </a:p>
-          <a:p>
-            <a:pPr lvl="1"/>
-            <a:r>
-              <a:rPr lang="en-US" dirty="0" smtClean="0"/>
-              <a:t>Dependencies:  Print Module</a:t>
-            </a:r>
-          </a:p>
-          <a:p>
-            <a:pPr lvl="1"/>
-            <a:r>
-              <a:rPr lang="en-US" dirty="0" smtClean="0"/>
-              <a:t>Processing:  Create reference to an object file.</a:t>
-            </a:r>
-          </a:p>
-          <a:p>
-            <a:pPr lvl="1"/>
-            <a:r>
-              <a:rPr lang="en-US" dirty="0" smtClean="0"/>
-              <a:t>Input:  Object File Name</a:t>
-            </a:r>
-          </a:p>
-          <a:p>
-            <a:pPr lvl="1"/>
-            <a:r>
-              <a:rPr lang="en-US" dirty="0" smtClean="0"/>
-              <a:t>Output:  Object File Reference</a:t>
-            </a:r>
-          </a:p>
-          <a:p>
-            <a:pPr lvl="1"/>
-            <a:endParaRPr lang="en-US" dirty="0"/>
-          </a:p>
-        </p:txBody>
-      </p:sp>
+            <a:endParaRPr lang="en-US"/>
+          </a:p>
+        </p:txBody>
+      </p:sp>
+      <p:graphicFrame>
+        <p:nvGraphicFramePr>
+          <p:cNvPr id="6" name="Object 5"/>
+          <p:cNvGraphicFramePr>
+            <a:graphicFrameLocks noChangeAspect="1"/>
+          </p:cNvGraphicFramePr>
+          <p:nvPr>
+            <p:extLst>
+              <p:ext uri="{D42A27DB-BD31-4B8C-83A1-F6EECF244321}">
+                <p14:modId xmlns:p14="http://schemas.microsoft.com/office/powerpoint/2010/main" val="608060557"/>
+              </p:ext>
+            </p:extLst>
+          </p:nvPr>
+        </p:nvGraphicFramePr>
+        <p:xfrm>
+          <a:off x="1219200" y="1447800"/>
+          <a:ext cx="5943600" cy="4295775"/>
+        </p:xfrm>
+        <a:graphic>
+          <a:graphicData uri="http://schemas.openxmlformats.org/presentationml/2006/ole">
+            <mc:AlternateContent xmlns:mc="http://schemas.openxmlformats.org/markup-compatibility/2006">
+              <mc:Choice xmlns:v="urn:schemas-microsoft-com:vml" Requires="v">
+                <p:oleObj spid="_x0000_s3076" name="Visio" r:id="rId3" imgW="7134210" imgH="5152950" progId="Visio.Drawing.15">
+                  <p:embed/>
+                </p:oleObj>
+              </mc:Choice>
+              <mc:Fallback>
+                <p:oleObj name="Visio" r:id="rId3" imgW="7134210" imgH="5152950" progId="Visio.Drawing.15">
+                  <p:embed/>
+                  <p:pic>
+                    <p:nvPicPr>
+                      <p:cNvPr id="0" name="Object 1"/>
+                      <p:cNvPicPr>
+                        <a:picLocks noChangeAspect="1" noChangeArrowheads="1"/>
+                      </p:cNvPicPr>
+                      <p:nvPr/>
+                    </p:nvPicPr>
+                    <p:blipFill>
+                      <a:blip r:embed="rId4"/>
+                      <a:srcRect/>
+                      <a:stretch>
+                        <a:fillRect/>
+                      </a:stretch>
+                    </p:blipFill>
+                    <p:spPr bwMode="auto">
+                      <a:xfrm>
+                        <a:off x="1219200" y="1447800"/>
+                        <a:ext cx="5943600" cy="4295775"/>
+                      </a:xfrm>
+                      <a:prstGeom prst="rect">
+                        <a:avLst/>
+                      </a:prstGeom>
+                      <a:noFill/>
+                      <a:extLst>
+                        <a:ext uri="{909E8E84-426E-40DD-AFC4-6F175D3DCCD1}">
+                          <a14:hiddenFill xmlns:a14="http://schemas.microsoft.com/office/drawing/2010/main">
+                            <a:solidFill>
+                              <a:srgbClr val="FFFFFF"/>
+                            </a:solidFill>
+                          </a14:hiddenFill>
+                        </a:ext>
+                      </a:extLst>
+                    </p:spPr>
+                  </p:pic>
+                </p:oleObj>
+              </mc:Fallback>
+            </mc:AlternateContent>
+          </a:graphicData>
+        </a:graphic>
+      </p:graphicFrame>
     </p:spTree>
     <p:extLst>
       <p:ext uri="{BB962C8B-B14F-4D97-AF65-F5344CB8AC3E}">
@@ -4509,9 +4565,10 @@
           <a:lstStyle/>
           <a:p>
             <a:r>
-              <a:rPr lang="en-US" sz="4400" dirty="0"/>
+              <a:rPr lang="en-US" sz="4400" dirty="0" smtClean="0"/>
               <a:t>User Interface Layer Subsystems</a:t>
             </a:r>
+            <a:endParaRPr lang="en-US" sz="4400" dirty="0"/>
           </a:p>
         </p:txBody>
       </p:sp>
@@ -4527,59 +4584,60 @@
         </p:nvSpPr>
         <p:spPr/>
         <p:txBody>
-          <a:bodyPr/>
-          <a:lstStyle/>
-          <a:p>
-            <a:r>
-              <a:rPr lang="en-US" dirty="0"/>
-              <a:t>Print Module</a:t>
-            </a:r>
-          </a:p>
-          <a:p>
-            <a:pPr lvl="1"/>
-            <a:r>
-              <a:rPr lang="en-US" dirty="0"/>
-              <a:t>Purpose:  Allow user to set print specific settings and initiate a print job.</a:t>
-            </a:r>
-          </a:p>
-          <a:p>
-            <a:pPr lvl="1"/>
-            <a:r>
-              <a:rPr lang="en-US" dirty="0"/>
-              <a:t>Function:  Display interface from which users can set print settings and initiate a print.  Pass the necessary information to the Preprocessing Layer when a print is initiated.</a:t>
-            </a:r>
-          </a:p>
-          <a:p>
-            <a:pPr lvl="1"/>
-            <a:r>
-              <a:rPr lang="en-US" dirty="0"/>
-              <a:t>Dependencies:  Database Interface</a:t>
-            </a:r>
-          </a:p>
-          <a:p>
-            <a:pPr lvl="1"/>
-            <a:r>
-              <a:rPr lang="en-US" dirty="0"/>
-              <a:t>Processing:  Map materials to object files.  Package print request object.</a:t>
-            </a:r>
-          </a:p>
-          <a:p>
-            <a:pPr lvl="1"/>
-            <a:r>
-              <a:rPr lang="en-US" dirty="0"/>
-              <a:t>Input:  Print Settings, Printer Configuration, Material Data, Object File </a:t>
-            </a:r>
-            <a:r>
-              <a:rPr lang="en-US" dirty="0" smtClean="0"/>
-              <a:t>References</a:t>
-            </a:r>
-          </a:p>
-          <a:p>
-            <a:pPr lvl="1"/>
-            <a:r>
-              <a:rPr lang="en-US" dirty="0" smtClean="0"/>
-              <a:t>Output:  Print Packet (Encapsulates Print Settings, Printer Configuration, Material Data, Object File References)</a:t>
-            </a:r>
+          <a:bodyPr>
+            <a:normAutofit/>
+          </a:bodyPr>
+          <a:lstStyle/>
+          <a:p>
+            <a:r>
+              <a:rPr lang="en-US" dirty="0" smtClean="0"/>
+              <a:t>Import Module</a:t>
+            </a:r>
+          </a:p>
+          <a:p>
+            <a:pPr lvl="1"/>
+            <a:r>
+              <a:rPr lang="en-US" dirty="0" smtClean="0"/>
+              <a:t>Purpose:  Allow the user to import object files</a:t>
+            </a:r>
+          </a:p>
+          <a:p>
+            <a:pPr lvl="1"/>
+            <a:r>
+              <a:rPr lang="en-US" dirty="0" smtClean="0"/>
+              <a:t>Function:  Display interface from which users import files and pass those files to the Print Module.</a:t>
+            </a:r>
+          </a:p>
+          <a:p>
+            <a:pPr lvl="1"/>
+            <a:r>
+              <a:rPr lang="en-US" dirty="0" smtClean="0"/>
+              <a:t>Dependencies:  Print Module</a:t>
+            </a:r>
+          </a:p>
+          <a:p>
+            <a:pPr lvl="1"/>
+            <a:r>
+              <a:rPr lang="en-US" dirty="0" smtClean="0"/>
+              <a:t>Processing:  Create reference to an object file.</a:t>
+            </a:r>
+          </a:p>
+          <a:p>
+            <a:pPr lvl="1"/>
+            <a:r>
+              <a:rPr lang="en-US" dirty="0" smtClean="0"/>
+              <a:t>Input:  Object File Name</a:t>
+            </a:r>
+          </a:p>
+          <a:p>
+            <a:pPr lvl="1"/>
+            <a:r>
+              <a:rPr lang="en-US" dirty="0" smtClean="0"/>
+              <a:t>Output:  Object File Reference</a:t>
+            </a:r>
+          </a:p>
+          <a:p>
+            <a:pPr lvl="1"/>
             <a:endParaRPr lang="en-US" dirty="0"/>
           </a:p>
         </p:txBody>
@@ -4587,7 +4645,7 @@
     </p:spTree>
     <p:extLst>
       <p:ext uri="{BB962C8B-B14F-4D97-AF65-F5344CB8AC3E}">
-        <p14:creationId xmlns:p14="http://schemas.microsoft.com/office/powerpoint/2010/main" val="2268171978"/>
+        <p14:creationId xmlns:p14="http://schemas.microsoft.com/office/powerpoint/2010/main" val="4151627602"/>
       </p:ext>
     </p:extLst>
   </p:cSld>
@@ -4637,10 +4695,9 @@
           <a:lstStyle/>
           <a:p>
             <a:r>
-              <a:rPr lang="en-US" sz="4400" dirty="0" smtClean="0"/>
+              <a:rPr lang="en-US" sz="4400" dirty="0"/>
               <a:t>User Interface Layer Subsystems</a:t>
             </a:r>
-            <a:endParaRPr lang="en-US" sz="4400" dirty="0"/>
           </a:p>
         </p:txBody>
       </p:sp>
@@ -4660,50 +4717,54 @@
           <a:lstStyle/>
           <a:p>
             <a:r>
-              <a:rPr lang="en-US" dirty="0" smtClean="0"/>
-              <a:t>Configuration Module</a:t>
-            </a:r>
-          </a:p>
-          <a:p>
-            <a:pPr lvl="1"/>
-            <a:r>
-              <a:rPr lang="en-US" dirty="0" smtClean="0"/>
-              <a:t>Purpose:  Allow the user to configure printer settings and material information.</a:t>
-            </a:r>
-          </a:p>
-          <a:p>
-            <a:pPr lvl="1"/>
-            <a:r>
-              <a:rPr lang="en-US" dirty="0" smtClean="0"/>
-              <a:t>Function:  Display interface from which users can input printer configuration and material information.  Pass information to the Database Interface to be saved.</a:t>
-            </a:r>
-          </a:p>
-          <a:p>
-            <a:pPr lvl="1"/>
-            <a:r>
-              <a:rPr lang="en-US" dirty="0" smtClean="0"/>
+              <a:rPr lang="en-US" dirty="0"/>
+              <a:t>Print Module</a:t>
+            </a:r>
+          </a:p>
+          <a:p>
+            <a:pPr lvl="1"/>
+            <a:r>
+              <a:rPr lang="en-US" dirty="0"/>
+              <a:t>Purpose:  Allow user to set print specific settings and initiate a print job.</a:t>
+            </a:r>
+          </a:p>
+          <a:p>
+            <a:pPr lvl="1"/>
+            <a:r>
+              <a:rPr lang="en-US" dirty="0"/>
+              <a:t>Function:  Display interface from which users can set print settings and initiate a print.  Pass the necessary information to the Preprocessing Layer when a print is initiated.</a:t>
+            </a:r>
+          </a:p>
+          <a:p>
+            <a:pPr lvl="1"/>
+            <a:r>
+              <a:rPr lang="en-US" dirty="0"/>
               <a:t>Dependencies:  Database Interface</a:t>
             </a:r>
           </a:p>
           <a:p>
             <a:pPr lvl="1"/>
             <a:r>
-              <a:rPr lang="en-US" dirty="0" smtClean="0"/>
-              <a:t>Processing:  User Input Processing</a:t>
-            </a:r>
-          </a:p>
-          <a:p>
-            <a:pPr lvl="1"/>
-            <a:r>
-              <a:rPr lang="en-US" dirty="0" smtClean="0"/>
-              <a:t>Input:  Printer Configuration Data, Material Data</a:t>
-            </a:r>
-          </a:p>
-          <a:p>
-            <a:pPr lvl="1"/>
-            <a:r>
-              <a:rPr lang="en-US" dirty="0" smtClean="0"/>
-              <a:t>Output:  Printer Configuration Data, Material Data</a:t>
+              <a:rPr lang="en-US" dirty="0"/>
+              <a:t>Processing:  Map materials to object files.  Package print request object.</a:t>
+            </a:r>
+          </a:p>
+          <a:p>
+            <a:pPr lvl="1"/>
+            <a:r>
+              <a:rPr lang="en-US" dirty="0"/>
+              <a:t>Input:  Print Settings, Printer Configuration, Material Data, Object File </a:t>
+            </a:r>
+            <a:r>
+              <a:rPr lang="en-US" dirty="0" smtClean="0"/>
+              <a:t>References</a:t>
+            </a:r>
+          </a:p>
+          <a:p>
+            <a:pPr lvl="1"/>
+            <a:r>
+              <a:rPr lang="en-US" dirty="0" smtClean="0"/>
+              <a:t>Output:  Print Packet (Encapsulates Print Settings, Printer Configuration, Material Data, Object File References)</a:t>
             </a:r>
             <a:endParaRPr lang="en-US" dirty="0"/>
           </a:p>
@@ -4712,7 +4773,7 @@
     </p:spTree>
     <p:extLst>
       <p:ext uri="{BB962C8B-B14F-4D97-AF65-F5344CB8AC3E}">
-        <p14:creationId xmlns:p14="http://schemas.microsoft.com/office/powerpoint/2010/main" val="4098163977"/>
+        <p14:creationId xmlns:p14="http://schemas.microsoft.com/office/powerpoint/2010/main" val="2268171978"/>
       </p:ext>
     </p:extLst>
   </p:cSld>
@@ -4762,9 +4823,10 @@
           <a:lstStyle/>
           <a:p>
             <a:r>
-              <a:rPr lang="en-US" sz="4400" dirty="0"/>
+              <a:rPr lang="en-US" sz="4400" dirty="0" smtClean="0"/>
               <a:t>User Interface Layer Subsystems</a:t>
             </a:r>
+            <a:endParaRPr lang="en-US" sz="4400" dirty="0"/>
           </a:p>
         </p:txBody>
       </p:sp>
@@ -4785,61 +4847,58 @@
           <a:p>
             <a:r>
               <a:rPr lang="en-US" dirty="0" smtClean="0"/>
-              <a:t>Database Interface</a:t>
-            </a:r>
-          </a:p>
-          <a:p>
-            <a:pPr lvl="1"/>
-            <a:r>
-              <a:rPr lang="en-US" dirty="0" smtClean="0"/>
-              <a:t>Purpose:  Abstract data persistence</a:t>
-            </a:r>
-          </a:p>
-          <a:p>
-            <a:pPr lvl="1"/>
-            <a:r>
-              <a:rPr lang="en-US" dirty="0" smtClean="0"/>
-              <a:t>Function:  Receive data from other modules and store it in a database.  Retrieve data from the database for other modules.</a:t>
-            </a:r>
-          </a:p>
-          <a:p>
-            <a:pPr lvl="1"/>
-            <a:r>
-              <a:rPr lang="en-US" dirty="0" smtClean="0"/>
-              <a:t>Dependencies:  None</a:t>
-            </a:r>
-          </a:p>
-          <a:p>
-            <a:pPr lvl="1"/>
-            <a:r>
-              <a:rPr lang="en-US" dirty="0" smtClean="0"/>
-              <a:t>Processing:  Database query generation</a:t>
-            </a:r>
-          </a:p>
-          <a:p>
-            <a:pPr lvl="1"/>
-            <a:r>
-              <a:rPr lang="en-US" dirty="0" smtClean="0"/>
-              <a:t>Input:  Configuration Information</a:t>
-            </a:r>
-          </a:p>
-          <a:p>
-            <a:pPr lvl="1"/>
-            <a:r>
-              <a:rPr lang="en-US" dirty="0" smtClean="0"/>
-              <a:t>Output:  CRUD Operations, Configuration Information</a:t>
-            </a:r>
-          </a:p>
-          <a:p>
-            <a:pPr lvl="1"/>
-            <a:endParaRPr lang="en-US" dirty="0" smtClean="0"/>
+              <a:t>Configuration Module</a:t>
+            </a:r>
+          </a:p>
+          <a:p>
+            <a:pPr lvl="1"/>
+            <a:r>
+              <a:rPr lang="en-US" dirty="0" smtClean="0"/>
+              <a:t>Purpose:  Allow the user to configure printer settings and material information.</a:t>
+            </a:r>
+          </a:p>
+          <a:p>
+            <a:pPr lvl="1"/>
+            <a:r>
+              <a:rPr lang="en-US" dirty="0" smtClean="0"/>
+              <a:t>Function:  Display interface from which users can input printer configuration and material information.  Pass information to the Database Interface to be saved.</a:t>
+            </a:r>
+          </a:p>
+          <a:p>
+            <a:pPr lvl="1"/>
+            <a:r>
+              <a:rPr lang="en-US" dirty="0" smtClean="0"/>
+              <a:t>Dependencies:  Database Interface</a:t>
+            </a:r>
+          </a:p>
+          <a:p>
+            <a:pPr lvl="1"/>
+            <a:r>
+              <a:rPr lang="en-US" dirty="0" smtClean="0"/>
+              <a:t>Processing:  User Input Processing</a:t>
+            </a:r>
+          </a:p>
+          <a:p>
+            <a:pPr lvl="1"/>
+            <a:r>
+              <a:rPr lang="en-US" dirty="0" smtClean="0"/>
+              <a:t>Input:  Printer Configuration Data, Material Data</a:t>
+            </a:r>
+          </a:p>
+          <a:p>
+            <a:pPr lvl="1"/>
+            <a:r>
+              <a:rPr lang="en-US" dirty="0" smtClean="0"/>
+              <a:t>Output:  Printer Configuration Data, Material Data</a:t>
+            </a:r>
+            <a:endParaRPr lang="en-US" dirty="0"/>
           </a:p>
         </p:txBody>
       </p:sp>
     </p:spTree>
     <p:extLst>
       <p:ext uri="{BB962C8B-B14F-4D97-AF65-F5344CB8AC3E}">
-        <p14:creationId xmlns:p14="http://schemas.microsoft.com/office/powerpoint/2010/main" val="1146536164"/>
+        <p14:creationId xmlns:p14="http://schemas.microsoft.com/office/powerpoint/2010/main" val="4098163977"/>
       </p:ext>
     </p:extLst>
   </p:cSld>
@@ -4912,54 +4971,61 @@
           <a:p>
             <a:r>
               <a:rPr lang="en-US" dirty="0" smtClean="0"/>
-              <a:t>Status Module</a:t>
-            </a:r>
-          </a:p>
-          <a:p>
-            <a:pPr lvl="1"/>
-            <a:r>
-              <a:rPr lang="en-US" dirty="0" smtClean="0"/>
-              <a:t>Purpose:  Display printer status information to the user and allow the user to stop/pause/resume a print job.</a:t>
-            </a:r>
-          </a:p>
-          <a:p>
-            <a:pPr lvl="1"/>
-            <a:r>
-              <a:rPr lang="en-US" dirty="0" smtClean="0"/>
-              <a:t>Function:  Interpret data from the Printer Feedback Layer and display the data to the user.  Send stop/pause/resume commands to the Physical Layer.</a:t>
-            </a:r>
-          </a:p>
-          <a:p>
-            <a:pPr lvl="1"/>
-            <a:r>
-              <a:rPr lang="en-US" dirty="0" smtClean="0"/>
-              <a:t>Processing:  User Input Processing</a:t>
-            </a:r>
-          </a:p>
-          <a:p>
-            <a:pPr lvl="1"/>
-            <a:r>
-              <a:rPr lang="en-US" dirty="0" smtClean="0"/>
-              <a:t>Input:  Stop/Pause/Resume User Input, Printer State Data, Configuration Data</a:t>
-            </a:r>
-          </a:p>
-          <a:p>
-            <a:pPr lvl="1"/>
-            <a:r>
-              <a:rPr lang="en-US" dirty="0" smtClean="0"/>
-              <a:t>Output:  Stop/Pause/Resume Command</a:t>
-            </a:r>
-          </a:p>
-          <a:p>
-            <a:pPr lvl="1"/>
-            <a:endParaRPr lang="en-US" dirty="0"/>
+              <a:t>Database Interface</a:t>
+            </a:r>
+          </a:p>
+          <a:p>
+            <a:pPr lvl="1"/>
+            <a:r>
+              <a:rPr lang="en-US" dirty="0" smtClean="0"/>
+              <a:t>Purpose:  Abstract data persistence</a:t>
+            </a:r>
+          </a:p>
+          <a:p>
+            <a:pPr lvl="1"/>
+            <a:r>
+              <a:rPr lang="en-US" dirty="0" smtClean="0"/>
+              <a:t>Function:  Receive data from other modules and store it in a database.  Retrieve data from the database for other modules.</a:t>
+            </a:r>
+          </a:p>
+          <a:p>
+            <a:pPr lvl="1"/>
+            <a:r>
+              <a:rPr lang="en-US" dirty="0" smtClean="0"/>
+              <a:t>Dependencies:  None</a:t>
+            </a:r>
+          </a:p>
+          <a:p>
+            <a:pPr lvl="1"/>
+            <a:r>
+              <a:rPr lang="en-US" dirty="0" smtClean="0"/>
+              <a:t>Processing:  Database query generation</a:t>
+            </a:r>
+          </a:p>
+          <a:p>
+            <a:pPr lvl="1"/>
+            <a:r>
+              <a:rPr lang="en-US" dirty="0" smtClean="0"/>
+              <a:t>Input:  Configuration Information</a:t>
+            </a:r>
+          </a:p>
+          <a:p>
+            <a:pPr lvl="1"/>
+            <a:r>
+              <a:rPr lang="en-US" dirty="0" smtClean="0"/>
+              <a:t>Output:  CRUD Operations, Configuration Information</a:t>
+            </a:r>
+          </a:p>
+          <a:p>
+            <a:pPr lvl="1"/>
+            <a:endParaRPr lang="en-US" dirty="0" smtClean="0"/>
           </a:p>
         </p:txBody>
       </p:sp>
     </p:spTree>
     <p:extLst>
       <p:ext uri="{BB962C8B-B14F-4D97-AF65-F5344CB8AC3E}">
-        <p14:creationId xmlns:p14="http://schemas.microsoft.com/office/powerpoint/2010/main" val="4290690680"/>
+        <p14:creationId xmlns:p14="http://schemas.microsoft.com/office/powerpoint/2010/main" val="1146536164"/>
       </p:ext>
     </p:extLst>
   </p:cSld>
@@ -5117,10 +5183,9 @@
           <a:lstStyle/>
           <a:p>
             <a:r>
-              <a:rPr lang="en-US" dirty="0" smtClean="0"/>
-              <a:t>Preprocessing Layer Subsystems</a:t>
-            </a:r>
-            <a:endParaRPr lang="en-US" dirty="0"/>
+              <a:rPr lang="en-US" sz="4400" dirty="0"/>
+              <a:t>User Interface Layer Subsystems</a:t>
+            </a:r>
           </a:p>
         </p:txBody>
       </p:sp>
@@ -5136,121 +5201,51 @@
         </p:nvSpPr>
         <p:spPr/>
         <p:txBody>
-          <a:bodyPr>
-            <a:normAutofit lnSpcReduction="10000"/>
-          </a:bodyPr>
-          <a:lstStyle/>
-          <a:p>
-            <a:r>
-              <a:rPr lang="en-US" dirty="0" smtClean="0"/>
-              <a:t>Normalization Module</a:t>
-            </a:r>
-          </a:p>
-          <a:p>
-            <a:pPr lvl="1"/>
-            <a:r>
-              <a:rPr lang="en-US" dirty="0"/>
-              <a:t>Purpose: </a:t>
-            </a:r>
-            <a:r>
-              <a:rPr lang="en-US" dirty="0" smtClean="0"/>
-              <a:t>Provide a uniform interface between the Print Module and the Processing Layer. </a:t>
-            </a:r>
-          </a:p>
-          <a:p>
-            <a:pPr lvl="1"/>
-            <a:r>
-              <a:rPr lang="en-US" dirty="0" smtClean="0"/>
-              <a:t>Function: </a:t>
-            </a:r>
-            <a:r>
-              <a:rPr lang="en-US" dirty="0"/>
-              <a:t>Translate and repackage the print request object in to the format that the processing layer </a:t>
-            </a:r>
-            <a:r>
-              <a:rPr lang="en-US" dirty="0" smtClean="0"/>
-              <a:t>needs</a:t>
-            </a:r>
-          </a:p>
-          <a:p>
-            <a:pPr lvl="1"/>
-            <a:r>
-              <a:rPr lang="en-US" dirty="0" smtClean="0"/>
-              <a:t>Dependencies: Print Module</a:t>
-            </a:r>
-            <a:endParaRPr lang="en-US" dirty="0"/>
-          </a:p>
-          <a:p>
-            <a:pPr lvl="1"/>
-            <a:r>
-              <a:rPr lang="en-US" dirty="0"/>
-              <a:t>Processing</a:t>
-            </a:r>
-            <a:r>
-              <a:rPr lang="en-US" dirty="0" smtClean="0"/>
-              <a:t>: Normalizes Object File</a:t>
-            </a:r>
-          </a:p>
-          <a:p>
-            <a:pPr lvl="1"/>
-            <a:r>
-              <a:rPr lang="en-US" dirty="0" smtClean="0"/>
-              <a:t>Input: Packet of Files</a:t>
-            </a:r>
-          </a:p>
-          <a:p>
-            <a:pPr lvl="2"/>
-            <a:r>
-              <a:rPr lang="en-US" dirty="0" smtClean="0"/>
-              <a:t>The Object(s)</a:t>
-            </a:r>
-          </a:p>
-          <a:p>
-            <a:pPr lvl="2"/>
-            <a:r>
-              <a:rPr lang="en-US" dirty="0" smtClean="0"/>
-              <a:t>Material(s)</a:t>
-            </a:r>
-          </a:p>
-          <a:p>
-            <a:pPr lvl="2"/>
-            <a:r>
-              <a:rPr lang="en-US" dirty="0" smtClean="0"/>
-              <a:t>Printer Configuration</a:t>
-            </a:r>
-            <a:endParaRPr lang="en-US" dirty="0"/>
-          </a:p>
-          <a:p>
-            <a:pPr lvl="1"/>
-            <a:r>
-              <a:rPr lang="en-US" dirty="0"/>
-              <a:t>Output</a:t>
-            </a:r>
-            <a:r>
-              <a:rPr lang="en-US" dirty="0" smtClean="0"/>
-              <a:t>: Packet of Files</a:t>
-            </a:r>
-          </a:p>
-          <a:p>
-            <a:pPr lvl="2"/>
-            <a:r>
-              <a:rPr lang="en-US" dirty="0" smtClean="0"/>
-              <a:t>Normalized Object</a:t>
-            </a:r>
-          </a:p>
-          <a:p>
-            <a:pPr lvl="2"/>
-            <a:r>
-              <a:rPr lang="en-US" dirty="0" smtClean="0"/>
-              <a:t>Definition</a:t>
-            </a:r>
-          </a:p>
-          <a:p>
-            <a:pPr lvl="2"/>
-            <a:r>
-              <a:rPr lang="en-US" dirty="0" smtClean="0"/>
-              <a:t>Print Configuration</a:t>
-            </a:r>
+          <a:bodyPr/>
+          <a:lstStyle/>
+          <a:p>
+            <a:r>
+              <a:rPr lang="en-US" dirty="0" smtClean="0"/>
+              <a:t>Status Module</a:t>
+            </a:r>
+          </a:p>
+          <a:p>
+            <a:pPr lvl="1"/>
+            <a:r>
+              <a:rPr lang="en-US" dirty="0" smtClean="0"/>
+              <a:t>Purpose:  Display printer status information to the user and allow the user to stop/pause/resume a print job.</a:t>
+            </a:r>
+          </a:p>
+          <a:p>
+            <a:pPr lvl="1"/>
+            <a:r>
+              <a:rPr lang="en-US" dirty="0" smtClean="0"/>
+              <a:t>Function:  Interpret data from the Printer Feedback Layer and display the data to the user.  Send stop/pause/resume commands to the Physical Layer.</a:t>
+            </a:r>
+          </a:p>
+          <a:p>
+            <a:pPr lvl="1"/>
+            <a:r>
+              <a:rPr lang="en-US" dirty="0" smtClean="0"/>
+              <a:t>Processing:  User Input Processing</a:t>
+            </a:r>
+          </a:p>
+          <a:p>
+            <a:pPr lvl="1"/>
+            <a:r>
+              <a:rPr lang="en-US" dirty="0" smtClean="0"/>
+              <a:t>Input:  Stop/Pause/Resume User Input, Printer State Data, Configuration Data</a:t>
+            </a:r>
+          </a:p>
+          <a:p>
+            <a:pPr lvl="1"/>
+            <a:r>
+              <a:rPr lang="en-US" dirty="0" smtClean="0"/>
+              <a:t>Output:  Stop/Pause/Resume Command</a:t>
+            </a:r>
+          </a:p>
+          <a:p>
+            <a:pPr lvl="1"/>
             <a:endParaRPr lang="en-US" dirty="0"/>
           </a:p>
         </p:txBody>
@@ -5258,7 +5253,7 @@
     </p:spTree>
     <p:extLst>
       <p:ext uri="{BB962C8B-B14F-4D97-AF65-F5344CB8AC3E}">
-        <p14:creationId xmlns:p14="http://schemas.microsoft.com/office/powerpoint/2010/main" val="1038311817"/>
+        <p14:creationId xmlns:p14="http://schemas.microsoft.com/office/powerpoint/2010/main" val="4290690680"/>
       </p:ext>
     </p:extLst>
   </p:cSld>
@@ -5309,7 +5304,7 @@
           <a:p>
             <a:r>
               <a:rPr lang="en-US" dirty="0" smtClean="0"/>
-              <a:t>Processing Layer Subsystems</a:t>
+              <a:t>Preprocessing Layer Subsystems</a:t>
             </a:r>
             <a:endParaRPr lang="en-US" dirty="0"/>
           </a:p>
@@ -5317,140 +5312,147 @@
       </p:sp>
       <p:sp>
         <p:nvSpPr>
-          <p:cNvPr id="3" name="Content Placeholder 2"/>
-          <p:cNvSpPr>
-            <a:spLocks noGrp="1"/>
-          </p:cNvSpPr>
-          <p:nvPr>
-            <p:ph idx="1"/>
-          </p:nvPr>
-        </p:nvSpPr>
-        <p:spPr/>
-        <p:txBody>
-          <a:bodyPr/>
-          <a:lstStyle/>
-          <a:p>
-            <a:r>
-              <a:rPr lang="en-US" dirty="0" smtClean="0"/>
-              <a:t>Slicing Engine</a:t>
-            </a:r>
-          </a:p>
-          <a:p>
-            <a:pPr lvl="1"/>
-            <a:r>
-              <a:rPr lang="en-US" dirty="0"/>
-              <a:t>Purpose:  </a:t>
-            </a:r>
-            <a:r>
-              <a:rPr lang="en-US" dirty="0" smtClean="0"/>
-              <a:t>Create a set of instructions for the print job</a:t>
-            </a:r>
-            <a:endParaRPr lang="en-US" dirty="0"/>
-          </a:p>
-          <a:p>
-            <a:pPr lvl="1"/>
-            <a:r>
-              <a:rPr lang="en-US" dirty="0" smtClean="0"/>
-              <a:t>Function: Uses the Object File to create a printing path.</a:t>
-            </a:r>
-          </a:p>
-          <a:p>
-            <a:pPr lvl="1"/>
-            <a:r>
-              <a:rPr lang="en-US" dirty="0" smtClean="0"/>
-              <a:t>Dependencies: Normalization Module</a:t>
-            </a:r>
-            <a:endParaRPr lang="en-US" dirty="0"/>
-          </a:p>
-          <a:p>
-            <a:pPr lvl="1"/>
-            <a:r>
-              <a:rPr lang="en-US" dirty="0"/>
-              <a:t>Processing: </a:t>
-            </a:r>
-            <a:r>
-              <a:rPr lang="en-US" dirty="0" smtClean="0"/>
-              <a:t> Slices object into layers</a:t>
-            </a:r>
-            <a:endParaRPr lang="en-US" dirty="0"/>
-          </a:p>
-          <a:p>
-            <a:pPr lvl="1"/>
-            <a:r>
-              <a:rPr lang="en-US" dirty="0"/>
-              <a:t>Input</a:t>
-            </a:r>
-            <a:r>
-              <a:rPr lang="en-US" dirty="0" smtClean="0"/>
-              <a:t>: </a:t>
-            </a:r>
-            <a:r>
-              <a:rPr lang="en-US" dirty="0"/>
-              <a:t>Packet of Files</a:t>
-            </a:r>
-          </a:p>
-          <a:p>
-            <a:pPr lvl="2"/>
-            <a:r>
-              <a:rPr lang="en-US" dirty="0"/>
-              <a:t>Normalized Object</a:t>
-            </a:r>
-          </a:p>
-          <a:p>
-            <a:pPr lvl="2"/>
-            <a:r>
-              <a:rPr lang="en-US" dirty="0"/>
-              <a:t>Definition</a:t>
-            </a:r>
-          </a:p>
-          <a:p>
-            <a:pPr lvl="2"/>
-            <a:r>
-              <a:rPr lang="en-US" dirty="0"/>
-              <a:t>Print </a:t>
-            </a:r>
-            <a:r>
-              <a:rPr lang="en-US" dirty="0" smtClean="0"/>
-              <a:t>Configuration</a:t>
-            </a:r>
-            <a:endParaRPr lang="en-US" dirty="0"/>
-          </a:p>
-          <a:p>
-            <a:pPr lvl="1"/>
-            <a:r>
-              <a:rPr lang="en-US" dirty="0"/>
-              <a:t>Output</a:t>
-            </a:r>
-            <a:r>
-              <a:rPr lang="en-US" dirty="0" smtClean="0"/>
-              <a:t>: Packet of Files</a:t>
-            </a:r>
-          </a:p>
-          <a:p>
-            <a:pPr lvl="2"/>
-            <a:r>
-              <a:rPr lang="en-US" dirty="0" smtClean="0"/>
-              <a:t>G-Code</a:t>
-            </a:r>
-          </a:p>
-          <a:p>
-            <a:pPr lvl="2"/>
-            <a:r>
-              <a:rPr lang="en-US" dirty="0" smtClean="0"/>
-              <a:t>Print Configuration</a:t>
-            </a:r>
-            <a:endParaRPr lang="en-US" dirty="0"/>
-          </a:p>
-          <a:p>
-            <a:pPr lvl="1"/>
-            <a:endParaRPr lang="en-US" dirty="0"/>
-          </a:p>
-        </p:txBody>
-      </p:sp>
+          <p:cNvPr id="5" name="Rectangle 2"/>
+          <p:cNvSpPr>
+            <a:spLocks noChangeArrowheads="1"/>
+          </p:cNvSpPr>
+          <p:nvPr/>
+        </p:nvSpPr>
+        <p:spPr bwMode="auto">
+          <a:xfrm>
+            <a:off x="0" y="0"/>
+            <a:ext cx="9144000" cy="0"/>
+          </a:xfrm>
+          <a:prstGeom prst="rect">
+            <a:avLst/>
+          </a:prstGeom>
+          <a:noFill/>
+          <a:ln>
+            <a:noFill/>
+          </a:ln>
+          <a:effectLst/>
+          <a:extLst>
+            <a:ext uri="{909E8E84-426E-40DD-AFC4-6F175D3DCCD1}">
+              <a14:hiddenFill xmlns:a14="http://schemas.microsoft.com/office/drawing/2010/main">
+                <a:solidFill>
+                  <a:schemeClr val="accent1"/>
+                </a:solidFill>
+              </a14:hiddenFill>
+            </a:ext>
+            <a:ext uri="{91240B29-F687-4F45-9708-019B960494DF}">
+              <a14:hiddenLine xmlns:a14="http://schemas.microsoft.com/office/drawing/2010/main" w="9525">
+                <a:solidFill>
+                  <a:schemeClr val="tx1"/>
+                </a:solidFill>
+                <a:miter lim="800000"/>
+                <a:headEnd/>
+                <a:tailEnd/>
+              </a14:hiddenLine>
+            </a:ext>
+            <a:ext uri="{AF507438-7753-43E0-B8FC-AC1667EBCBE1}">
+              <a14:hiddenEffects xmlns:a14="http://schemas.microsoft.com/office/drawing/2010/main">
+                <a:effectLst>
+                  <a:outerShdw dist="35921" dir="2700000" algn="ctr" rotWithShape="0">
+                    <a:schemeClr val="bg2"/>
+                  </a:outerShdw>
+                </a:effectLst>
+              </a14:hiddenEffects>
+            </a:ext>
+          </a:extLst>
+        </p:spPr>
+        <p:txBody>
+          <a:bodyPr vert="horz" wrap="none" lIns="91440" tIns="45720" rIns="91440" bIns="45720" numCol="1" anchor="ctr" anchorCtr="0" compatLnSpc="1">
+            <a:prstTxWarp prst="textNoShape">
+              <a:avLst/>
+            </a:prstTxWarp>
+            <a:spAutoFit/>
+          </a:bodyPr>
+          <a:lstStyle/>
+          <a:p>
+            <a:endParaRPr lang="en-US"/>
+          </a:p>
+        </p:txBody>
+      </p:sp>
+      <p:graphicFrame>
+        <p:nvGraphicFramePr>
+          <p:cNvPr id="6" name="Object 5"/>
+          <p:cNvGraphicFramePr>
+            <a:graphicFrameLocks noChangeAspect="1"/>
+          </p:cNvGraphicFramePr>
+          <p:nvPr>
+            <p:extLst>
+              <p:ext uri="{D42A27DB-BD31-4B8C-83A1-F6EECF244321}">
+                <p14:modId xmlns:p14="http://schemas.microsoft.com/office/powerpoint/2010/main" val="2615743629"/>
+              </p:ext>
+            </p:extLst>
+          </p:nvPr>
+        </p:nvGraphicFramePr>
+        <p:xfrm>
+          <a:off x="1295400" y="1600200"/>
+          <a:ext cx="5915025" cy="4533900"/>
+        </p:xfrm>
+        <a:graphic>
+          <a:graphicData uri="http://schemas.openxmlformats.org/presentationml/2006/ole">
+            <mc:AlternateContent xmlns:mc="http://schemas.openxmlformats.org/markup-compatibility/2006">
+              <mc:Choice xmlns:v="urn:schemas-microsoft-com:vml" Requires="v">
+                <p:oleObj spid="_x0000_s4100" name="Visio" r:id="rId3" imgW="5914944" imgH="4533804" progId="Visio.Drawing.15">
+                  <p:embed/>
+                </p:oleObj>
+              </mc:Choice>
+              <mc:Fallback>
+                <p:oleObj name="Visio" r:id="rId3" imgW="5914944" imgH="4533804" progId="Visio.Drawing.15">
+                  <p:embed/>
+                  <p:pic>
+                    <p:nvPicPr>
+                      <p:cNvPr id="0" name="Object 1"/>
+                      <p:cNvPicPr>
+                        <a:picLocks noChangeAspect="1" noChangeArrowheads="1"/>
+                      </p:cNvPicPr>
+                      <p:nvPr/>
+                    </p:nvPicPr>
+                    <p:blipFill>
+                      <a:blip r:embed="rId4">
+                        <a:extLst>
+                          <a:ext uri="{28A0092B-C50C-407E-A947-70E740481C1C}">
+                            <a14:useLocalDpi xmlns:a14="http://schemas.microsoft.com/office/drawing/2010/main" val="0"/>
+                          </a:ext>
+                        </a:extLst>
+                      </a:blip>
+                      <a:srcRect/>
+                      <a:stretch>
+                        <a:fillRect/>
+                      </a:stretch>
+                    </p:blipFill>
+                    <p:spPr bwMode="auto">
+                      <a:xfrm>
+                        <a:off x="1295400" y="1600200"/>
+                        <a:ext cx="5915025" cy="4533900"/>
+                      </a:xfrm>
+                      <a:prstGeom prst="rect">
+                        <a:avLst/>
+                      </a:prstGeom>
+                      <a:noFill/>
+                      <a:extLst>
+                        <a:ext uri="{909E8E84-426E-40DD-AFC4-6F175D3DCCD1}">
+                          <a14:hiddenFill xmlns:a14="http://schemas.microsoft.com/office/drawing/2010/main">
+                            <a:solidFill>
+                              <a:srgbClr val="FFFFFF"/>
+                            </a:solidFill>
+                          </a14:hiddenFill>
+                        </a:ext>
+                      </a:extLst>
+                    </p:spPr>
+                  </p:pic>
+                </p:oleObj>
+              </mc:Fallback>
+            </mc:AlternateContent>
+          </a:graphicData>
+        </a:graphic>
+      </p:graphicFrame>
     </p:spTree>
     <p:extLst>
       <p:ext uri="{BB962C8B-B14F-4D97-AF65-F5344CB8AC3E}">
-        <p14:creationId xmlns:p14="http://schemas.microsoft.com/office/powerpoint/2010/main" val="2203546236"/>
+        <p14:creationId xmlns:p14="http://schemas.microsoft.com/office/powerpoint/2010/main" val="1038311817"/>
       </p:ext>
     </p:extLst>
   </p:cSld>
@@ -5501,7 +5503,7 @@
           <a:p>
             <a:r>
               <a:rPr lang="en-US" dirty="0" smtClean="0"/>
-              <a:t>Post Processing Layer Subsystems</a:t>
+              <a:t>Preprocessing Layer Subsystems</a:t>
             </a:r>
             <a:endParaRPr lang="en-US" dirty="0"/>
           </a:p>
@@ -5519,76 +5521,87 @@
         </p:nvSpPr>
         <p:spPr/>
         <p:txBody>
-          <a:bodyPr/>
-          <a:lstStyle/>
-          <a:p>
-            <a:r>
-              <a:rPr lang="en-US" dirty="0" smtClean="0"/>
-              <a:t>G-Code Preparation</a:t>
+          <a:bodyPr>
+            <a:normAutofit lnSpcReduction="10000"/>
+          </a:bodyPr>
+          <a:lstStyle/>
+          <a:p>
+            <a:r>
+              <a:rPr lang="en-US" dirty="0" smtClean="0"/>
+              <a:t>Normalization Module</a:t>
             </a:r>
           </a:p>
           <a:p>
             <a:pPr lvl="1"/>
             <a:r>
               <a:rPr lang="en-US" dirty="0"/>
-              <a:t>Purpose:  </a:t>
-            </a:r>
-            <a:r>
-              <a:rPr lang="en-US" dirty="0" smtClean="0"/>
-              <a:t>To modify the instructions for the printer to accept.</a:t>
+              <a:t>Purpose: </a:t>
+            </a:r>
+            <a:r>
+              <a:rPr lang="en-US" dirty="0" smtClean="0"/>
+              <a:t>Provide a uniform interface between the Print Module and the Processing Layer. </a:t>
+            </a:r>
+          </a:p>
+          <a:p>
+            <a:pPr lvl="1"/>
+            <a:r>
+              <a:rPr lang="en-US" dirty="0" smtClean="0"/>
+              <a:t>Function: </a:t>
+            </a:r>
+            <a:r>
+              <a:rPr lang="en-US" dirty="0"/>
+              <a:t>Translate and repackage the print request object in to the format that the processing layer </a:t>
+            </a:r>
+            <a:r>
+              <a:rPr lang="en-US" dirty="0" smtClean="0"/>
+              <a:t>needs</a:t>
+            </a:r>
+          </a:p>
+          <a:p>
+            <a:pPr lvl="1"/>
+            <a:r>
+              <a:rPr lang="en-US" dirty="0" smtClean="0"/>
+              <a:t>Dependencies: Print Module</a:t>
             </a:r>
             <a:endParaRPr lang="en-US" dirty="0"/>
           </a:p>
           <a:p>
             <a:pPr lvl="1"/>
             <a:r>
-              <a:rPr lang="en-US" dirty="0" smtClean="0"/>
-              <a:t>Function: Adds instructions for unique commands for the particular printer</a:t>
-            </a:r>
-          </a:p>
-          <a:p>
-            <a:pPr lvl="1"/>
-            <a:r>
-              <a:rPr lang="en-US" dirty="0" smtClean="0"/>
-              <a:t>Dependencies: Slicing Engine</a:t>
-            </a:r>
-            <a:endParaRPr lang="en-US" dirty="0"/>
-          </a:p>
-          <a:p>
-            <a:pPr lvl="1"/>
-            <a:r>
               <a:rPr lang="en-US" dirty="0"/>
-              <a:t>Processing:  </a:t>
-            </a:r>
-            <a:r>
-              <a:rPr lang="en-US" dirty="0" smtClean="0"/>
-              <a:t>Modifies G-Code</a:t>
-            </a:r>
-            <a:endParaRPr lang="en-US" dirty="0"/>
-          </a:p>
-          <a:p>
-            <a:pPr lvl="1"/>
-            <a:r>
-              <a:rPr lang="en-US" dirty="0"/>
-              <a:t>Input</a:t>
-            </a:r>
-            <a:r>
-              <a:rPr lang="en-US" dirty="0" smtClean="0"/>
-              <a:t>: Packet of Files</a:t>
+              <a:t>Processing</a:t>
+            </a:r>
+            <a:r>
+              <a:rPr lang="en-US" dirty="0" smtClean="0"/>
+              <a:t>: Normalizes Object File</a:t>
+            </a:r>
+          </a:p>
+          <a:p>
+            <a:pPr lvl="1"/>
+            <a:r>
+              <a:rPr lang="en-US" dirty="0" smtClean="0"/>
+              <a:t>Input: Packet of Files</a:t>
             </a:r>
           </a:p>
           <a:p>
             <a:pPr lvl="2"/>
             <a:r>
               <a:rPr lang="en-US" dirty="0" smtClean="0"/>
-              <a:t>G-Code</a:t>
+              <a:t>The Object(s)</a:t>
             </a:r>
           </a:p>
           <a:p>
             <a:pPr lvl="2"/>
             <a:r>
               <a:rPr lang="en-US" dirty="0" smtClean="0"/>
-              <a:t>Print Configuration</a:t>
+              <a:t>Material(s)</a:t>
+            </a:r>
+          </a:p>
+          <a:p>
+            <a:pPr lvl="2"/>
+            <a:r>
+              <a:rPr lang="en-US" dirty="0" smtClean="0"/>
+              <a:t>Printer Configuration</a:t>
             </a:r>
             <a:endParaRPr lang="en-US" dirty="0"/>
           </a:p>
@@ -5607,22 +5620,22 @@
             <a:pPr lvl="2"/>
             <a:r>
               <a:rPr lang="en-US" dirty="0" smtClean="0"/>
-              <a:t>G-Code</a:t>
+              <a:t>Normalized Object</a:t>
             </a:r>
           </a:p>
           <a:p>
             <a:pPr lvl="2"/>
             <a:r>
               <a:rPr lang="en-US" dirty="0" smtClean="0"/>
+              <a:t>Definition</a:t>
+            </a:r>
+          </a:p>
+          <a:p>
+            <a:pPr lvl="2"/>
+            <a:r>
+              <a:rPr lang="en-US" dirty="0" smtClean="0"/>
               <a:t>Print Configuration</a:t>
             </a:r>
-          </a:p>
-          <a:p>
-            <a:pPr lvl="2"/>
-            <a:endParaRPr lang="en-US" dirty="0"/>
-          </a:p>
-          <a:p>
-            <a:pPr lvl="1"/>
             <a:endParaRPr lang="en-US" dirty="0"/>
           </a:p>
         </p:txBody>
@@ -5630,7 +5643,7 @@
     </p:spTree>
     <p:extLst>
       <p:ext uri="{BB962C8B-B14F-4D97-AF65-F5344CB8AC3E}">
-        <p14:creationId xmlns:p14="http://schemas.microsoft.com/office/powerpoint/2010/main" val="4058787402"/>
+        <p14:creationId xmlns:p14="http://schemas.microsoft.com/office/powerpoint/2010/main" val="3536798908"/>
       </p:ext>
     </p:extLst>
   </p:cSld>
@@ -5681,7 +5694,7 @@
           <a:p>
             <a:r>
               <a:rPr lang="en-US" dirty="0" smtClean="0"/>
-              <a:t>Physical Layer Subsystems</a:t>
+              <a:t>Processing Layer Subsystems</a:t>
             </a:r>
             <a:endParaRPr lang="en-US" dirty="0"/>
           </a:p>
@@ -5689,111 +5702,154 @@
       </p:sp>
       <p:sp>
         <p:nvSpPr>
-          <p:cNvPr id="3" name="Content Placeholder 2"/>
-          <p:cNvSpPr>
-            <a:spLocks noGrp="1"/>
-          </p:cNvSpPr>
-          <p:nvPr>
-            <p:ph idx="1"/>
-          </p:nvPr>
-        </p:nvSpPr>
-        <p:spPr/>
-        <p:txBody>
-          <a:bodyPr/>
-          <a:lstStyle/>
-          <a:p>
-            <a:r>
-              <a:rPr lang="en-US" dirty="0" smtClean="0"/>
-              <a:t>Printer State Controller</a:t>
-            </a:r>
-          </a:p>
-          <a:p>
-            <a:pPr lvl="1"/>
-            <a:r>
-              <a:rPr lang="en-US" dirty="0"/>
-              <a:t>Purpose:  </a:t>
-            </a:r>
-            <a:r>
-              <a:rPr lang="en-US" dirty="0" smtClean="0"/>
-              <a:t>To conditionally dispatch G-Codes to packet preparation module based on printer and operator state.</a:t>
-            </a:r>
-            <a:endParaRPr lang="en-US" dirty="0"/>
-          </a:p>
-          <a:p>
-            <a:pPr lvl="1"/>
-            <a:r>
-              <a:rPr lang="en-US" dirty="0" smtClean="0"/>
-              <a:t>Function: Accept status inputs from status module and printer state monitoring and conditionally dispatches G-Code stream to packet preparation module.</a:t>
-            </a:r>
-          </a:p>
-          <a:p>
-            <a:pPr lvl="1"/>
-            <a:r>
-              <a:rPr lang="en-US" dirty="0" smtClean="0"/>
-              <a:t>Dependencies: Packet preparation module, status module, and printer state monitoring module.</a:t>
-            </a:r>
-            <a:endParaRPr lang="en-US" dirty="0"/>
-          </a:p>
-          <a:p>
-            <a:pPr lvl="1"/>
-            <a:r>
-              <a:rPr lang="en-US" dirty="0"/>
-              <a:t>Processing:  </a:t>
-            </a:r>
-            <a:r>
-              <a:rPr lang="en-US" dirty="0" smtClean="0"/>
-              <a:t>May insert G-codes to halt the print if necessary.</a:t>
-            </a:r>
-            <a:endParaRPr lang="en-US" dirty="0"/>
-          </a:p>
-          <a:p>
-            <a:pPr lvl="1"/>
-            <a:r>
-              <a:rPr lang="en-US" dirty="0"/>
-              <a:t>Input</a:t>
-            </a:r>
-            <a:r>
-              <a:rPr lang="en-US" dirty="0" smtClean="0"/>
-              <a:t>: Error State, Packet of Files</a:t>
-            </a:r>
-          </a:p>
-          <a:p>
-            <a:pPr lvl="2"/>
-            <a:r>
-              <a:rPr lang="en-US" dirty="0" smtClean="0"/>
-              <a:t>G-Code</a:t>
-            </a:r>
-          </a:p>
-          <a:p>
-            <a:pPr lvl="2"/>
-            <a:r>
-              <a:rPr lang="en-US" dirty="0" smtClean="0"/>
-              <a:t>Print Configuration</a:t>
-            </a:r>
-          </a:p>
-          <a:p>
-            <a:pPr lvl="1"/>
-            <a:r>
-              <a:rPr lang="en-US" dirty="0" smtClean="0"/>
-              <a:t>Output: G-Code</a:t>
-            </a:r>
-          </a:p>
-          <a:p>
-            <a:pPr lvl="1"/>
-            <a:endParaRPr lang="en-US" dirty="0"/>
-          </a:p>
-        </p:txBody>
-      </p:sp>
+          <p:cNvPr id="5" name="Rectangle 2"/>
+          <p:cNvSpPr>
+            <a:spLocks noChangeArrowheads="1"/>
+          </p:cNvSpPr>
+          <p:nvPr/>
+        </p:nvSpPr>
+        <p:spPr bwMode="auto">
+          <a:xfrm>
+            <a:off x="0" y="0"/>
+            <a:ext cx="9144000" cy="0"/>
+          </a:xfrm>
+          <a:prstGeom prst="rect">
+            <a:avLst/>
+          </a:prstGeom>
+          <a:noFill/>
+          <a:ln>
+            <a:noFill/>
+          </a:ln>
+          <a:effectLst/>
+          <a:extLst>
+            <a:ext uri="{909E8E84-426E-40DD-AFC4-6F175D3DCCD1}">
+              <a14:hiddenFill xmlns:a14="http://schemas.microsoft.com/office/drawing/2010/main">
+                <a:solidFill>
+                  <a:schemeClr val="accent1"/>
+                </a:solidFill>
+              </a14:hiddenFill>
+            </a:ext>
+            <a:ext uri="{91240B29-F687-4F45-9708-019B960494DF}">
+              <a14:hiddenLine xmlns:a14="http://schemas.microsoft.com/office/drawing/2010/main" w="9525">
+                <a:solidFill>
+                  <a:schemeClr val="tx1"/>
+                </a:solidFill>
+                <a:miter lim="800000"/>
+                <a:headEnd/>
+                <a:tailEnd/>
+              </a14:hiddenLine>
+            </a:ext>
+            <a:ext uri="{AF507438-7753-43E0-B8FC-AC1667EBCBE1}">
+              <a14:hiddenEffects xmlns:a14="http://schemas.microsoft.com/office/drawing/2010/main">
+                <a:effectLst>
+                  <a:outerShdw dist="35921" dir="2700000" algn="ctr" rotWithShape="0">
+                    <a:schemeClr val="bg2"/>
+                  </a:outerShdw>
+                </a:effectLst>
+              </a14:hiddenEffects>
+            </a:ext>
+          </a:extLst>
+        </p:spPr>
+        <p:txBody>
+          <a:bodyPr vert="horz" wrap="none" lIns="91440" tIns="45720" rIns="91440" bIns="45720" numCol="1" anchor="ctr" anchorCtr="0" compatLnSpc="1">
+            <a:prstTxWarp prst="textNoShape">
+              <a:avLst/>
+            </a:prstTxWarp>
+            <a:spAutoFit/>
+          </a:bodyPr>
+          <a:lstStyle/>
+          <a:p>
+            <a:endParaRPr lang="en-US"/>
+          </a:p>
+        </p:txBody>
+      </p:sp>
+      <p:graphicFrame>
+        <p:nvGraphicFramePr>
+          <p:cNvPr id="6" name="Object 5"/>
+          <p:cNvGraphicFramePr>
+            <a:graphicFrameLocks noChangeAspect="1"/>
+          </p:cNvGraphicFramePr>
+          <p:nvPr>
+            <p:extLst>
+              <p:ext uri="{D42A27DB-BD31-4B8C-83A1-F6EECF244321}">
+                <p14:modId xmlns:p14="http://schemas.microsoft.com/office/powerpoint/2010/main" val="2657362425"/>
+              </p:ext>
+            </p:extLst>
+          </p:nvPr>
+        </p:nvGraphicFramePr>
+        <p:xfrm>
+          <a:off x="2362200" y="1752600"/>
+          <a:ext cx="3943350" cy="3152775"/>
+        </p:xfrm>
+        <a:graphic>
+          <a:graphicData uri="http://schemas.openxmlformats.org/presentationml/2006/ole">
+            <mc:AlternateContent xmlns:mc="http://schemas.openxmlformats.org/markup-compatibility/2006">
+              <mc:Choice xmlns:v="urn:schemas-microsoft-com:vml" Requires="v">
+                <p:oleObj spid="_x0000_s5123" name="Visio" r:id="rId3" imgW="3943350" imgH="3152790" progId="Visio.Drawing.15">
+                  <p:embed/>
+                </p:oleObj>
+              </mc:Choice>
+              <mc:Fallback>
+                <p:oleObj name="Visio" r:id="rId3" imgW="3943350" imgH="3152790" progId="Visio.Drawing.15">
+                  <p:embed/>
+                  <p:pic>
+                    <p:nvPicPr>
+                      <p:cNvPr id="0" name="Object 1"/>
+                      <p:cNvPicPr>
+                        <a:picLocks noChangeAspect="1" noChangeArrowheads="1"/>
+                      </p:cNvPicPr>
+                      <p:nvPr/>
+                    </p:nvPicPr>
+                    <p:blipFill>
+                      <a:blip r:embed="rId4"/>
+                      <a:srcRect/>
+                      <a:stretch>
+                        <a:fillRect/>
+                      </a:stretch>
+                    </p:blipFill>
+                    <p:spPr bwMode="auto">
+                      <a:xfrm>
+                        <a:off x="2362200" y="1752600"/>
+                        <a:ext cx="3943350" cy="3152775"/>
+                      </a:xfrm>
+                      <a:prstGeom prst="rect">
+                        <a:avLst/>
+                      </a:prstGeom>
+                      <a:noFill/>
+                      <a:extLst>
+                        <a:ext uri="{909E8E84-426E-40DD-AFC4-6F175D3DCCD1}">
+                          <a14:hiddenFill xmlns:a14="http://schemas.microsoft.com/office/drawing/2010/main">
+                            <a:solidFill>
+                              <a:srgbClr val="FFFFFF"/>
+                            </a:solidFill>
+                          </a14:hiddenFill>
+                        </a:ext>
+                      </a:extLst>
+                    </p:spPr>
+                  </p:pic>
+                </p:oleObj>
+              </mc:Fallback>
+            </mc:AlternateContent>
+          </a:graphicData>
+        </a:graphic>
+      </p:graphicFrame>
     </p:spTree>
     <p:extLst>
       <p:ext uri="{BB962C8B-B14F-4D97-AF65-F5344CB8AC3E}">
-        <p14:creationId xmlns:p14="http://schemas.microsoft.com/office/powerpoint/2010/main" val="1328895885"/>
+        <p14:creationId xmlns:p14="http://schemas.microsoft.com/office/powerpoint/2010/main" val="2203546236"/>
       </p:ext>
     </p:extLst>
   </p:cSld>
   <p:clrMapOvr>
     <a:masterClrMapping/>
   </p:clrMapOvr>
+  <p:timing>
+    <p:tnLst>
+      <p:par>
+        <p:cTn id="1" dur="indefinite" restart="never" nodeType="tmRoot"/>
+      </p:par>
+    </p:tnLst>
+  </p:timing>
 </p:sld>
 </file>
 
@@ -5831,7 +5887,7 @@
           <a:p>
             <a:r>
               <a:rPr lang="en-US" dirty="0" smtClean="0"/>
-              <a:t>Physical Layer Subsystems</a:t>
+              <a:t>Processing Layer Subsystems</a:t>
             </a:r>
             <a:endParaRPr lang="en-US" dirty="0"/>
           </a:p>
@@ -5854,7 +5910,7 @@
           <a:p>
             <a:r>
               <a:rPr lang="en-US" dirty="0" smtClean="0"/>
-              <a:t>Packet Preparation</a:t>
+              <a:t>Slicing Engine</a:t>
             </a:r>
           </a:p>
           <a:p>
@@ -5865,7 +5921,7 @@
             </a:r>
             <a:r>
               <a:rPr lang="en-US" dirty="0" smtClean="0"/>
-              <a:t>Convert G-Code stream into byte-stream for printer.</a:t>
+              <a:t>Create a set of instructions for the print job</a:t>
             </a:r>
             <a:endParaRPr lang="en-US" dirty="0"/>
           </a:p>
@@ -5873,14 +5929,14 @@
             <a:pPr lvl="1"/>
             <a:r>
               <a:rPr lang="en-US" dirty="0" smtClean="0"/>
-              <a:t>Function: Serialize G-Code stream and packetize so that the packets can be transmitted to the printer. Establish serial connection to printer firmware.</a:t>
-            </a:r>
-          </a:p>
-          <a:p>
-            <a:pPr lvl="1"/>
-            <a:r>
-              <a:rPr lang="en-US" dirty="0" smtClean="0"/>
-              <a:t>Dependencies: Printer state controller.</a:t>
+              <a:t>Function: Uses the Object File to create a printing path.</a:t>
+            </a:r>
+          </a:p>
+          <a:p>
+            <a:pPr lvl="1"/>
+            <a:r>
+              <a:rPr lang="en-US" dirty="0" smtClean="0"/>
+              <a:t>Dependencies: Normalization Module</a:t>
             </a:r>
             <a:endParaRPr lang="en-US" dirty="0"/>
           </a:p>
@@ -5888,11 +5944,11 @@
             <a:pPr lvl="1"/>
             <a:r>
               <a:rPr lang="en-US" dirty="0"/>
-              <a:t>Processing:  </a:t>
-            </a:r>
-            <a:r>
-              <a:rPr lang="en-US" dirty="0" smtClean="0"/>
-              <a:t>Serialization of G-Code stream. Chunk serialized G-Code stream into packets to be sent to printer firmware.</a:t>
+              <a:t>Processing: </a:t>
+            </a:r>
+            <a:r>
+              <a:rPr lang="en-US" dirty="0" smtClean="0"/>
+              <a:t> Slices object into layers</a:t>
             </a:r>
             <a:endParaRPr lang="en-US" dirty="0"/>
           </a:p>
@@ -5904,7 +5960,36 @@
             </a:r>
             <a:r>
               <a:rPr lang="en-US" dirty="0" smtClean="0"/>
-              <a:t>: G-Code</a:t>
+              <a:t>: </a:t>
+            </a:r>
+            <a:r>
+              <a:rPr lang="en-US" dirty="0"/>
+              <a:t>Packet of Files</a:t>
+            </a:r>
+          </a:p>
+          <a:p>
+            <a:pPr lvl="2"/>
+            <a:r>
+              <a:rPr lang="en-US" dirty="0"/>
+              <a:t>Normalized Object</a:t>
+            </a:r>
+          </a:p>
+          <a:p>
+            <a:pPr lvl="2"/>
+            <a:r>
+              <a:rPr lang="en-US" dirty="0"/>
+              <a:t>Definition</a:t>
+            </a:r>
+          </a:p>
+          <a:p>
+            <a:pPr lvl="2"/>
+            <a:r>
+              <a:rPr lang="en-US" dirty="0"/>
+              <a:t>Print </a:t>
+            </a:r>
+            <a:r>
+              <a:rPr lang="en-US" dirty="0" smtClean="0"/>
+              <a:t>Configuration</a:t>
             </a:r>
             <a:endParaRPr lang="en-US" dirty="0"/>
           </a:p>
@@ -5916,7 +6001,21 @@
             </a:r>
             <a:r>
               <a:rPr lang="en-US" dirty="0" smtClean="0"/>
-              <a:t>: Bits on a Wire</a:t>
+              <a:t>: Packet of Files</a:t>
+            </a:r>
+          </a:p>
+          <a:p>
+            <a:pPr lvl="2"/>
+            <a:r>
+              <a:rPr lang="en-US" dirty="0" smtClean="0"/>
+              <a:t>G-Code</a:t>
+            </a:r>
+          </a:p>
+          <a:p>
+            <a:pPr lvl="2"/>
+            <a:r>
+              <a:rPr lang="en-US" dirty="0" smtClean="0"/>
+              <a:t>Print Configuration</a:t>
             </a:r>
             <a:endParaRPr lang="en-US" dirty="0"/>
           </a:p>
@@ -5929,13 +6028,20 @@
     </p:spTree>
     <p:extLst>
       <p:ext uri="{BB962C8B-B14F-4D97-AF65-F5344CB8AC3E}">
-        <p14:creationId xmlns:p14="http://schemas.microsoft.com/office/powerpoint/2010/main" val="1487547368"/>
+        <p14:creationId xmlns:p14="http://schemas.microsoft.com/office/powerpoint/2010/main" val="2094557238"/>
       </p:ext>
     </p:extLst>
   </p:cSld>
   <p:clrMapOvr>
     <a:masterClrMapping/>
   </p:clrMapOvr>
+  <p:timing>
+    <p:tnLst>
+      <p:par>
+        <p:cTn id="1" dur="indefinite" restart="never" nodeType="tmRoot"/>
+      </p:par>
+    </p:tnLst>
+  </p:timing>
 </p:sld>
 </file>
 
@@ -5973,7 +6079,7 @@
           <a:p>
             <a:r>
               <a:rPr lang="en-US" dirty="0" smtClean="0"/>
-              <a:t>Printer Feedback Layer Subsystems</a:t>
+              <a:t>Post Processing Layer Subsystems</a:t>
             </a:r>
             <a:endParaRPr lang="en-US" dirty="0"/>
           </a:p>
@@ -5981,101 +6087,875 @@
       </p:sp>
       <p:sp>
         <p:nvSpPr>
-          <p:cNvPr id="3" name="Content Placeholder 2"/>
-          <p:cNvSpPr>
-            <a:spLocks noGrp="1"/>
-          </p:cNvSpPr>
-          <p:nvPr>
-            <p:ph idx="1"/>
-          </p:nvPr>
-        </p:nvSpPr>
-        <p:spPr/>
-        <p:txBody>
-          <a:bodyPr/>
-          <a:lstStyle/>
-          <a:p>
-            <a:r>
-              <a:rPr lang="en-US" dirty="0" smtClean="0"/>
-              <a:t>State Monitoring</a:t>
-            </a:r>
-          </a:p>
-          <a:p>
-            <a:pPr lvl="1"/>
-            <a:r>
-              <a:rPr lang="en-US" dirty="0"/>
-              <a:t>Purpose:  </a:t>
-            </a:r>
-            <a:r>
-              <a:rPr lang="en-US" dirty="0" smtClean="0"/>
-              <a:t>To monitor the operating status of the printer hardware. </a:t>
-            </a:r>
-            <a:endParaRPr lang="en-US" dirty="0"/>
-          </a:p>
-          <a:p>
-            <a:pPr lvl="1"/>
-            <a:r>
-              <a:rPr lang="en-US" dirty="0" smtClean="0"/>
-              <a:t>Function: Listens for response from printer on established serial connection. Assembles and converts received data into form appropriate for inter-layer transmission. </a:t>
-            </a:r>
-          </a:p>
-          <a:p>
-            <a:pPr lvl="1"/>
-            <a:r>
-              <a:rPr lang="en-US" dirty="0" smtClean="0"/>
-              <a:t>Dependencies: Printer State Controller, Status Module</a:t>
-            </a:r>
-            <a:endParaRPr lang="en-US" dirty="0"/>
-          </a:p>
-          <a:p>
-            <a:pPr lvl="1"/>
-            <a:r>
-              <a:rPr lang="en-US" dirty="0"/>
-              <a:t>Processing:  </a:t>
-            </a:r>
-            <a:r>
-              <a:rPr lang="en-US" dirty="0" smtClean="0"/>
-              <a:t>Data conversion from printer byte-stream into data structure suitable for transmission to other layers in </a:t>
-            </a:r>
-            <a:r>
-              <a:rPr lang="en-US" smtClean="0"/>
-              <a:t>the system.</a:t>
-            </a:r>
-            <a:endParaRPr lang="en-US" dirty="0"/>
-          </a:p>
-          <a:p>
-            <a:pPr lvl="1"/>
-            <a:r>
-              <a:rPr lang="en-US" dirty="0"/>
-              <a:t>Input</a:t>
-            </a:r>
-            <a:r>
-              <a:rPr lang="en-US" dirty="0" smtClean="0"/>
-              <a:t>: State Info</a:t>
-            </a:r>
-            <a:endParaRPr lang="en-US" dirty="0"/>
-          </a:p>
-          <a:p>
-            <a:pPr lvl="1"/>
-            <a:r>
-              <a:rPr lang="en-US" dirty="0"/>
-              <a:t>Output</a:t>
-            </a:r>
-            <a:r>
-              <a:rPr lang="en-US" dirty="0" smtClean="0"/>
-              <a:t>: Error State, State Info</a:t>
-            </a:r>
-            <a:endParaRPr lang="en-US" dirty="0"/>
-          </a:p>
-          <a:p>
-            <a:pPr lvl="1"/>
-            <a:endParaRPr lang="en-US" dirty="0"/>
-          </a:p>
-        </p:txBody>
-      </p:sp>
+          <p:cNvPr id="5" name="Rectangle 2"/>
+          <p:cNvSpPr>
+            <a:spLocks noChangeArrowheads="1"/>
+          </p:cNvSpPr>
+          <p:nvPr/>
+        </p:nvSpPr>
+        <p:spPr bwMode="auto">
+          <a:xfrm>
+            <a:off x="0" y="0"/>
+            <a:ext cx="9144000" cy="0"/>
+          </a:xfrm>
+          <a:prstGeom prst="rect">
+            <a:avLst/>
+          </a:prstGeom>
+          <a:noFill/>
+          <a:ln>
+            <a:noFill/>
+          </a:ln>
+          <a:effectLst/>
+          <a:extLst>
+            <a:ext uri="{909E8E84-426E-40DD-AFC4-6F175D3DCCD1}">
+              <a14:hiddenFill xmlns:a14="http://schemas.microsoft.com/office/drawing/2010/main">
+                <a:solidFill>
+                  <a:schemeClr val="accent1"/>
+                </a:solidFill>
+              </a14:hiddenFill>
+            </a:ext>
+            <a:ext uri="{91240B29-F687-4F45-9708-019B960494DF}">
+              <a14:hiddenLine xmlns:a14="http://schemas.microsoft.com/office/drawing/2010/main" w="9525">
+                <a:solidFill>
+                  <a:schemeClr val="tx1"/>
+                </a:solidFill>
+                <a:miter lim="800000"/>
+                <a:headEnd/>
+                <a:tailEnd/>
+              </a14:hiddenLine>
+            </a:ext>
+            <a:ext uri="{AF507438-7753-43E0-B8FC-AC1667EBCBE1}">
+              <a14:hiddenEffects xmlns:a14="http://schemas.microsoft.com/office/drawing/2010/main">
+                <a:effectLst>
+                  <a:outerShdw dist="35921" dir="2700000" algn="ctr" rotWithShape="0">
+                    <a:schemeClr val="bg2"/>
+                  </a:outerShdw>
+                </a:effectLst>
+              </a14:hiddenEffects>
+            </a:ext>
+          </a:extLst>
+        </p:spPr>
+        <p:txBody>
+          <a:bodyPr vert="horz" wrap="none" lIns="91440" tIns="45720" rIns="91440" bIns="45720" numCol="1" anchor="ctr" anchorCtr="0" compatLnSpc="1">
+            <a:prstTxWarp prst="textNoShape">
+              <a:avLst/>
+            </a:prstTxWarp>
+            <a:spAutoFit/>
+          </a:bodyPr>
+          <a:lstStyle/>
+          <a:p>
+            <a:endParaRPr lang="en-US"/>
+          </a:p>
+        </p:txBody>
+      </p:sp>
+      <p:sp>
+        <p:nvSpPr>
+          <p:cNvPr id="7" name="Rectangle 5"/>
+          <p:cNvSpPr>
+            <a:spLocks noChangeArrowheads="1"/>
+          </p:cNvSpPr>
+          <p:nvPr/>
+        </p:nvSpPr>
+        <p:spPr bwMode="auto">
+          <a:xfrm>
+            <a:off x="0" y="0"/>
+            <a:ext cx="9144000" cy="0"/>
+          </a:xfrm>
+          <a:prstGeom prst="rect">
+            <a:avLst/>
+          </a:prstGeom>
+          <a:noFill/>
+          <a:ln>
+            <a:noFill/>
+          </a:ln>
+          <a:effectLst/>
+          <a:extLst>
+            <a:ext uri="{909E8E84-426E-40DD-AFC4-6F175D3DCCD1}">
+              <a14:hiddenFill xmlns:a14="http://schemas.microsoft.com/office/drawing/2010/main">
+                <a:solidFill>
+                  <a:schemeClr val="accent1"/>
+                </a:solidFill>
+              </a14:hiddenFill>
+            </a:ext>
+            <a:ext uri="{91240B29-F687-4F45-9708-019B960494DF}">
+              <a14:hiddenLine xmlns:a14="http://schemas.microsoft.com/office/drawing/2010/main" w="9525">
+                <a:solidFill>
+                  <a:schemeClr val="tx1"/>
+                </a:solidFill>
+                <a:miter lim="800000"/>
+                <a:headEnd/>
+                <a:tailEnd/>
+              </a14:hiddenLine>
+            </a:ext>
+            <a:ext uri="{AF507438-7753-43E0-B8FC-AC1667EBCBE1}">
+              <a14:hiddenEffects xmlns:a14="http://schemas.microsoft.com/office/drawing/2010/main">
+                <a:effectLst>
+                  <a:outerShdw dist="35921" dir="2700000" algn="ctr" rotWithShape="0">
+                    <a:schemeClr val="bg2"/>
+                  </a:outerShdw>
+                </a:effectLst>
+              </a14:hiddenEffects>
+            </a:ext>
+          </a:extLst>
+        </p:spPr>
+        <p:txBody>
+          <a:bodyPr vert="horz" wrap="none" lIns="91440" tIns="45720" rIns="91440" bIns="45720" numCol="1" anchor="ctr" anchorCtr="0" compatLnSpc="1">
+            <a:prstTxWarp prst="textNoShape">
+              <a:avLst/>
+            </a:prstTxWarp>
+            <a:spAutoFit/>
+          </a:bodyPr>
+          <a:lstStyle/>
+          <a:p>
+            <a:endParaRPr lang="en-US"/>
+          </a:p>
+        </p:txBody>
+      </p:sp>
+      <p:graphicFrame>
+        <p:nvGraphicFramePr>
+          <p:cNvPr id="8" name="Object 7"/>
+          <p:cNvGraphicFramePr>
+            <a:graphicFrameLocks noChangeAspect="1"/>
+          </p:cNvGraphicFramePr>
+          <p:nvPr>
+            <p:extLst>
+              <p:ext uri="{D42A27DB-BD31-4B8C-83A1-F6EECF244321}">
+                <p14:modId xmlns:p14="http://schemas.microsoft.com/office/powerpoint/2010/main" val="458135673"/>
+              </p:ext>
+            </p:extLst>
+          </p:nvPr>
+        </p:nvGraphicFramePr>
+        <p:xfrm>
+          <a:off x="2286000" y="1905000"/>
+          <a:ext cx="3943350" cy="3381375"/>
+        </p:xfrm>
+        <a:graphic>
+          <a:graphicData uri="http://schemas.openxmlformats.org/presentationml/2006/ole">
+            <mc:AlternateContent xmlns:mc="http://schemas.openxmlformats.org/markup-compatibility/2006">
+              <mc:Choice xmlns:v="urn:schemas-microsoft-com:vml" Requires="v">
+                <p:oleObj spid="_x0000_s6150" name="Visio" r:id="rId3" imgW="3943350" imgH="3381480" progId="Visio.Drawing.15">
+                  <p:embed/>
+                </p:oleObj>
+              </mc:Choice>
+              <mc:Fallback>
+                <p:oleObj name="Visio" r:id="rId3" imgW="3943350" imgH="3381480" progId="Visio.Drawing.15">
+                  <p:embed/>
+                  <p:pic>
+                    <p:nvPicPr>
+                      <p:cNvPr id="0" name="Object 4"/>
+                      <p:cNvPicPr>
+                        <a:picLocks noChangeAspect="1" noChangeArrowheads="1"/>
+                      </p:cNvPicPr>
+                      <p:nvPr/>
+                    </p:nvPicPr>
+                    <p:blipFill>
+                      <a:blip r:embed="rId4">
+                        <a:extLst>
+                          <a:ext uri="{28A0092B-C50C-407E-A947-70E740481C1C}">
+                            <a14:useLocalDpi xmlns:a14="http://schemas.microsoft.com/office/drawing/2010/main" val="0"/>
+                          </a:ext>
+                        </a:extLst>
+                      </a:blip>
+                      <a:srcRect/>
+                      <a:stretch>
+                        <a:fillRect/>
+                      </a:stretch>
+                    </p:blipFill>
+                    <p:spPr bwMode="auto">
+                      <a:xfrm>
+                        <a:off x="2286000" y="1905000"/>
+                        <a:ext cx="3943350" cy="3381375"/>
+                      </a:xfrm>
+                      <a:prstGeom prst="rect">
+                        <a:avLst/>
+                      </a:prstGeom>
+                      <a:noFill/>
+                      <a:extLst>
+                        <a:ext uri="{909E8E84-426E-40DD-AFC4-6F175D3DCCD1}">
+                          <a14:hiddenFill xmlns:a14="http://schemas.microsoft.com/office/drawing/2010/main">
+                            <a:solidFill>
+                              <a:srgbClr val="FFFFFF"/>
+                            </a:solidFill>
+                          </a14:hiddenFill>
+                        </a:ext>
+                      </a:extLst>
+                    </p:spPr>
+                  </p:pic>
+                </p:oleObj>
+              </mc:Fallback>
+            </mc:AlternateContent>
+          </a:graphicData>
+        </a:graphic>
+      </p:graphicFrame>
     </p:spTree>
     <p:extLst>
       <p:ext uri="{BB962C8B-B14F-4D97-AF65-F5344CB8AC3E}">
-        <p14:creationId xmlns:p14="http://schemas.microsoft.com/office/powerpoint/2010/main" val="362765055"/>
+        <p14:creationId xmlns:p14="http://schemas.microsoft.com/office/powerpoint/2010/main" val="4058787402"/>
+      </p:ext>
+    </p:extLst>
+  </p:cSld>
+  <p:clrMapOvr>
+    <a:masterClrMapping/>
+  </p:clrMapOvr>
+  <p:timing>
+    <p:tnLst>
+      <p:par>
+        <p:cTn id="1" dur="indefinite" restart="never" nodeType="tmRoot"/>
+      </p:par>
+    </p:tnLst>
+  </p:timing>
+</p:sld>
+</file>
+
+<file path=ppt/slides/slide26.xml><?xml version="1.0" encoding="utf-8"?>
+<p:sld xmlns:a="http://schemas.openxmlformats.org/drawingml/2006/main" xmlns:r="http://schemas.openxmlformats.org/officeDocument/2006/relationships" xmlns:p="http://schemas.openxmlformats.org/presentationml/2006/main">
+  <p:cSld>
+    <p:spTree>
+      <p:nvGrpSpPr>
+        <p:cNvPr id="1" name=""/>
+        <p:cNvGrpSpPr/>
+        <p:nvPr/>
+      </p:nvGrpSpPr>
+      <p:grpSpPr>
+        <a:xfrm>
+          <a:off x="0" y="0"/>
+          <a:ext cx="0" cy="0"/>
+          <a:chOff x="0" y="0"/>
+          <a:chExt cx="0" cy="0"/>
+        </a:xfrm>
+      </p:grpSpPr>
+      <p:sp>
+        <p:nvSpPr>
+          <p:cNvPr id="2" name="Title 1"/>
+          <p:cNvSpPr>
+            <a:spLocks noGrp="1"/>
+          </p:cNvSpPr>
+          <p:nvPr>
+            <p:ph type="title"/>
+          </p:nvPr>
+        </p:nvSpPr>
+        <p:spPr/>
+        <p:txBody>
+          <a:bodyPr/>
+          <a:lstStyle/>
+          <a:p>
+            <a:r>
+              <a:rPr lang="en-US" dirty="0" smtClean="0"/>
+              <a:t>Post Processing Layer Subsystems</a:t>
+            </a:r>
+            <a:endParaRPr lang="en-US" dirty="0"/>
+          </a:p>
+        </p:txBody>
+      </p:sp>
+      <p:sp>
+        <p:nvSpPr>
+          <p:cNvPr id="3" name="Content Placeholder 2"/>
+          <p:cNvSpPr>
+            <a:spLocks noGrp="1"/>
+          </p:cNvSpPr>
+          <p:nvPr>
+            <p:ph idx="1"/>
+          </p:nvPr>
+        </p:nvSpPr>
+        <p:spPr/>
+        <p:txBody>
+          <a:bodyPr/>
+          <a:lstStyle/>
+          <a:p>
+            <a:r>
+              <a:rPr lang="en-US" dirty="0" smtClean="0"/>
+              <a:t>G-Code Preparation</a:t>
+            </a:r>
+          </a:p>
+          <a:p>
+            <a:pPr lvl="1"/>
+            <a:r>
+              <a:rPr lang="en-US" dirty="0"/>
+              <a:t>Purpose:  </a:t>
+            </a:r>
+            <a:r>
+              <a:rPr lang="en-US" dirty="0" smtClean="0"/>
+              <a:t>To modify the instructions for the printer to accept.</a:t>
+            </a:r>
+            <a:endParaRPr lang="en-US" dirty="0"/>
+          </a:p>
+          <a:p>
+            <a:pPr lvl="1"/>
+            <a:r>
+              <a:rPr lang="en-US" dirty="0" smtClean="0"/>
+              <a:t>Function: Adds instructions for unique commands for the particular printer</a:t>
+            </a:r>
+          </a:p>
+          <a:p>
+            <a:pPr lvl="1"/>
+            <a:r>
+              <a:rPr lang="en-US" dirty="0" smtClean="0"/>
+              <a:t>Dependencies: Slicing Engine</a:t>
+            </a:r>
+            <a:endParaRPr lang="en-US" dirty="0"/>
+          </a:p>
+          <a:p>
+            <a:pPr lvl="1"/>
+            <a:r>
+              <a:rPr lang="en-US" dirty="0"/>
+              <a:t>Processing:  </a:t>
+            </a:r>
+            <a:r>
+              <a:rPr lang="en-US" dirty="0" smtClean="0"/>
+              <a:t>Modifies G-Code</a:t>
+            </a:r>
+            <a:endParaRPr lang="en-US" dirty="0"/>
+          </a:p>
+          <a:p>
+            <a:pPr lvl="1"/>
+            <a:r>
+              <a:rPr lang="en-US" dirty="0"/>
+              <a:t>Input</a:t>
+            </a:r>
+            <a:r>
+              <a:rPr lang="en-US" dirty="0" smtClean="0"/>
+              <a:t>: Packet of Files</a:t>
+            </a:r>
+          </a:p>
+          <a:p>
+            <a:pPr lvl="2"/>
+            <a:r>
+              <a:rPr lang="en-US" dirty="0" smtClean="0"/>
+              <a:t>G-Code</a:t>
+            </a:r>
+          </a:p>
+          <a:p>
+            <a:pPr lvl="2"/>
+            <a:r>
+              <a:rPr lang="en-US" dirty="0" smtClean="0"/>
+              <a:t>Print Configuration</a:t>
+            </a:r>
+            <a:endParaRPr lang="en-US" dirty="0"/>
+          </a:p>
+          <a:p>
+            <a:pPr lvl="1"/>
+            <a:r>
+              <a:rPr lang="en-US" dirty="0"/>
+              <a:t>Output</a:t>
+            </a:r>
+            <a:r>
+              <a:rPr lang="en-US" dirty="0" smtClean="0"/>
+              <a:t>: Packet of Files</a:t>
+            </a:r>
+          </a:p>
+          <a:p>
+            <a:pPr lvl="2"/>
+            <a:r>
+              <a:rPr lang="en-US" dirty="0" smtClean="0"/>
+              <a:t>G-Code</a:t>
+            </a:r>
+          </a:p>
+          <a:p>
+            <a:pPr lvl="2"/>
+            <a:r>
+              <a:rPr lang="en-US" dirty="0" smtClean="0"/>
+              <a:t>Print Configuration</a:t>
+            </a:r>
+          </a:p>
+          <a:p>
+            <a:pPr lvl="2"/>
+            <a:endParaRPr lang="en-US" dirty="0"/>
+          </a:p>
+          <a:p>
+            <a:pPr lvl="1"/>
+            <a:endParaRPr lang="en-US" dirty="0"/>
+          </a:p>
+        </p:txBody>
+      </p:sp>
+    </p:spTree>
+    <p:extLst>
+      <p:ext uri="{BB962C8B-B14F-4D97-AF65-F5344CB8AC3E}">
+        <p14:creationId xmlns:p14="http://schemas.microsoft.com/office/powerpoint/2010/main" val="2569205006"/>
+      </p:ext>
+    </p:extLst>
+  </p:cSld>
+  <p:clrMapOvr>
+    <a:masterClrMapping/>
+  </p:clrMapOvr>
+  <p:timing>
+    <p:tnLst>
+      <p:par>
+        <p:cTn id="1" dur="indefinite" restart="never" nodeType="tmRoot"/>
+      </p:par>
+    </p:tnLst>
+  </p:timing>
+</p:sld>
+</file>
+
+<file path=ppt/slides/slide27.xml><?xml version="1.0" encoding="utf-8"?>
+<p:sld xmlns:a="http://schemas.openxmlformats.org/drawingml/2006/main" xmlns:r="http://schemas.openxmlformats.org/officeDocument/2006/relationships" xmlns:p="http://schemas.openxmlformats.org/presentationml/2006/main">
+  <p:cSld>
+    <p:spTree>
+      <p:nvGrpSpPr>
+        <p:cNvPr id="1" name=""/>
+        <p:cNvGrpSpPr/>
+        <p:nvPr/>
+      </p:nvGrpSpPr>
+      <p:grpSpPr>
+        <a:xfrm>
+          <a:off x="0" y="0"/>
+          <a:ext cx="0" cy="0"/>
+          <a:chOff x="0" y="0"/>
+          <a:chExt cx="0" cy="0"/>
+        </a:xfrm>
+      </p:grpSpPr>
+      <p:sp>
+        <p:nvSpPr>
+          <p:cNvPr id="2" name="Title 1"/>
+          <p:cNvSpPr>
+            <a:spLocks noGrp="1"/>
+          </p:cNvSpPr>
+          <p:nvPr>
+            <p:ph type="title"/>
+          </p:nvPr>
+        </p:nvSpPr>
+        <p:spPr/>
+        <p:txBody>
+          <a:bodyPr/>
+          <a:lstStyle/>
+          <a:p>
+            <a:r>
+              <a:rPr lang="en-US" dirty="0" smtClean="0"/>
+              <a:t>Physical Layer Subsystems</a:t>
+            </a:r>
+            <a:endParaRPr lang="en-US" dirty="0"/>
+          </a:p>
+        </p:txBody>
+      </p:sp>
+      <p:sp>
+        <p:nvSpPr>
+          <p:cNvPr id="5" name="Rectangle 2"/>
+          <p:cNvSpPr>
+            <a:spLocks noChangeArrowheads="1"/>
+          </p:cNvSpPr>
+          <p:nvPr/>
+        </p:nvSpPr>
+        <p:spPr bwMode="auto">
+          <a:xfrm>
+            <a:off x="0" y="0"/>
+            <a:ext cx="9144000" cy="0"/>
+          </a:xfrm>
+          <a:prstGeom prst="rect">
+            <a:avLst/>
+          </a:prstGeom>
+          <a:noFill/>
+          <a:ln>
+            <a:noFill/>
+          </a:ln>
+          <a:effectLst/>
+          <a:extLst>
+            <a:ext uri="{909E8E84-426E-40DD-AFC4-6F175D3DCCD1}">
+              <a14:hiddenFill xmlns:a14="http://schemas.microsoft.com/office/drawing/2010/main">
+                <a:solidFill>
+                  <a:schemeClr val="accent1"/>
+                </a:solidFill>
+              </a14:hiddenFill>
+            </a:ext>
+            <a:ext uri="{91240B29-F687-4F45-9708-019B960494DF}">
+              <a14:hiddenLine xmlns:a14="http://schemas.microsoft.com/office/drawing/2010/main" w="9525">
+                <a:solidFill>
+                  <a:schemeClr val="tx1"/>
+                </a:solidFill>
+                <a:miter lim="800000"/>
+                <a:headEnd/>
+                <a:tailEnd/>
+              </a14:hiddenLine>
+            </a:ext>
+            <a:ext uri="{AF507438-7753-43E0-B8FC-AC1667EBCBE1}">
+              <a14:hiddenEffects xmlns:a14="http://schemas.microsoft.com/office/drawing/2010/main">
+                <a:effectLst>
+                  <a:outerShdw dist="35921" dir="2700000" algn="ctr" rotWithShape="0">
+                    <a:schemeClr val="bg2"/>
+                  </a:outerShdw>
+                </a:effectLst>
+              </a14:hiddenEffects>
+            </a:ext>
+          </a:extLst>
+        </p:spPr>
+        <p:txBody>
+          <a:bodyPr vert="horz" wrap="none" lIns="91440" tIns="45720" rIns="91440" bIns="45720" numCol="1" anchor="ctr" anchorCtr="0" compatLnSpc="1">
+            <a:prstTxWarp prst="textNoShape">
+              <a:avLst/>
+            </a:prstTxWarp>
+            <a:spAutoFit/>
+          </a:bodyPr>
+          <a:lstStyle/>
+          <a:p>
+            <a:endParaRPr lang="en-US"/>
+          </a:p>
+        </p:txBody>
+      </p:sp>
+      <p:graphicFrame>
+        <p:nvGraphicFramePr>
+          <p:cNvPr id="6" name="Object 5"/>
+          <p:cNvGraphicFramePr>
+            <a:graphicFrameLocks noChangeAspect="1"/>
+          </p:cNvGraphicFramePr>
+          <p:nvPr>
+            <p:extLst>
+              <p:ext uri="{D42A27DB-BD31-4B8C-83A1-F6EECF244321}">
+                <p14:modId xmlns:p14="http://schemas.microsoft.com/office/powerpoint/2010/main" val="3179052488"/>
+              </p:ext>
+            </p:extLst>
+          </p:nvPr>
+        </p:nvGraphicFramePr>
+        <p:xfrm>
+          <a:off x="1752600" y="1524000"/>
+          <a:ext cx="5943600" cy="5172075"/>
+        </p:xfrm>
+        <a:graphic>
+          <a:graphicData uri="http://schemas.openxmlformats.org/presentationml/2006/ole">
+            <mc:AlternateContent xmlns:mc="http://schemas.openxmlformats.org/markup-compatibility/2006">
+              <mc:Choice xmlns:v="urn:schemas-microsoft-com:vml" Requires="v">
+                <p:oleObj spid="_x0000_s7171" name="Visio" r:id="rId3" imgW="6543720" imgH="5695920" progId="Visio.Drawing.15">
+                  <p:embed/>
+                </p:oleObj>
+              </mc:Choice>
+              <mc:Fallback>
+                <p:oleObj name="Visio" r:id="rId3" imgW="6543720" imgH="5695920" progId="Visio.Drawing.15">
+                  <p:embed/>
+                  <p:pic>
+                    <p:nvPicPr>
+                      <p:cNvPr id="0" name="Object 1"/>
+                      <p:cNvPicPr>
+                        <a:picLocks noChangeAspect="1" noChangeArrowheads="1"/>
+                      </p:cNvPicPr>
+                      <p:nvPr/>
+                    </p:nvPicPr>
+                    <p:blipFill>
+                      <a:blip r:embed="rId4"/>
+                      <a:srcRect/>
+                      <a:stretch>
+                        <a:fillRect/>
+                      </a:stretch>
+                    </p:blipFill>
+                    <p:spPr bwMode="auto">
+                      <a:xfrm>
+                        <a:off x="1752600" y="1524000"/>
+                        <a:ext cx="5943600" cy="5172075"/>
+                      </a:xfrm>
+                      <a:prstGeom prst="rect">
+                        <a:avLst/>
+                      </a:prstGeom>
+                      <a:noFill/>
+                      <a:extLst>
+                        <a:ext uri="{909E8E84-426E-40DD-AFC4-6F175D3DCCD1}">
+                          <a14:hiddenFill xmlns:a14="http://schemas.microsoft.com/office/drawing/2010/main">
+                            <a:solidFill>
+                              <a:srgbClr val="FFFFFF"/>
+                            </a:solidFill>
+                          </a14:hiddenFill>
+                        </a:ext>
+                      </a:extLst>
+                    </p:spPr>
+                  </p:pic>
+                </p:oleObj>
+              </mc:Fallback>
+            </mc:AlternateContent>
+          </a:graphicData>
+        </a:graphic>
+      </p:graphicFrame>
+    </p:spTree>
+    <p:extLst>
+      <p:ext uri="{BB962C8B-B14F-4D97-AF65-F5344CB8AC3E}">
+        <p14:creationId xmlns:p14="http://schemas.microsoft.com/office/powerpoint/2010/main" val="1328895885"/>
+      </p:ext>
+    </p:extLst>
+  </p:cSld>
+  <p:clrMapOvr>
+    <a:masterClrMapping/>
+  </p:clrMapOvr>
+</p:sld>
+</file>
+
+<file path=ppt/slides/slide28.xml><?xml version="1.0" encoding="utf-8"?>
+<p:sld xmlns:a="http://schemas.openxmlformats.org/drawingml/2006/main" xmlns:r="http://schemas.openxmlformats.org/officeDocument/2006/relationships" xmlns:p="http://schemas.openxmlformats.org/presentationml/2006/main">
+  <p:cSld>
+    <p:spTree>
+      <p:nvGrpSpPr>
+        <p:cNvPr id="1" name=""/>
+        <p:cNvGrpSpPr/>
+        <p:nvPr/>
+      </p:nvGrpSpPr>
+      <p:grpSpPr>
+        <a:xfrm>
+          <a:off x="0" y="0"/>
+          <a:ext cx="0" cy="0"/>
+          <a:chOff x="0" y="0"/>
+          <a:chExt cx="0" cy="0"/>
+        </a:xfrm>
+      </p:grpSpPr>
+      <p:sp>
+        <p:nvSpPr>
+          <p:cNvPr id="2" name="Title 1"/>
+          <p:cNvSpPr>
+            <a:spLocks noGrp="1"/>
+          </p:cNvSpPr>
+          <p:nvPr>
+            <p:ph type="title"/>
+          </p:nvPr>
+        </p:nvSpPr>
+        <p:spPr/>
+        <p:txBody>
+          <a:bodyPr/>
+          <a:lstStyle/>
+          <a:p>
+            <a:r>
+              <a:rPr lang="en-US" dirty="0" smtClean="0"/>
+              <a:t>Physical Layer Subsystems</a:t>
+            </a:r>
+            <a:endParaRPr lang="en-US" dirty="0"/>
+          </a:p>
+        </p:txBody>
+      </p:sp>
+      <p:sp>
+        <p:nvSpPr>
+          <p:cNvPr id="3" name="Content Placeholder 2"/>
+          <p:cNvSpPr>
+            <a:spLocks noGrp="1"/>
+          </p:cNvSpPr>
+          <p:nvPr>
+            <p:ph idx="1"/>
+          </p:nvPr>
+        </p:nvSpPr>
+        <p:spPr/>
+        <p:txBody>
+          <a:bodyPr/>
+          <a:lstStyle/>
+          <a:p>
+            <a:r>
+              <a:rPr lang="en-US" dirty="0" smtClean="0"/>
+              <a:t>Printer State Controller</a:t>
+            </a:r>
+          </a:p>
+          <a:p>
+            <a:pPr lvl="1"/>
+            <a:r>
+              <a:rPr lang="en-US" dirty="0"/>
+              <a:t>Purpose:  </a:t>
+            </a:r>
+            <a:r>
+              <a:rPr lang="en-US" dirty="0" smtClean="0"/>
+              <a:t>To conditionally dispatch G-Codes to packet preparation module based on printer and operator state.</a:t>
+            </a:r>
+            <a:endParaRPr lang="en-US" dirty="0"/>
+          </a:p>
+          <a:p>
+            <a:pPr lvl="1"/>
+            <a:r>
+              <a:rPr lang="en-US" dirty="0" smtClean="0"/>
+              <a:t>Function: Accept status inputs from status module and printer state monitoring and conditionally dispatches G-Code stream to packet preparation module.</a:t>
+            </a:r>
+          </a:p>
+          <a:p>
+            <a:pPr lvl="1"/>
+            <a:r>
+              <a:rPr lang="en-US" dirty="0" smtClean="0"/>
+              <a:t>Dependencies: Packet preparation module, status module, and printer state monitoring module.</a:t>
+            </a:r>
+            <a:endParaRPr lang="en-US" dirty="0"/>
+          </a:p>
+          <a:p>
+            <a:pPr lvl="1"/>
+            <a:r>
+              <a:rPr lang="en-US" dirty="0"/>
+              <a:t>Processing:  </a:t>
+            </a:r>
+            <a:r>
+              <a:rPr lang="en-US" dirty="0" smtClean="0"/>
+              <a:t>May insert G-codes to halt the print if necessary.</a:t>
+            </a:r>
+            <a:endParaRPr lang="en-US" dirty="0"/>
+          </a:p>
+          <a:p>
+            <a:pPr lvl="1"/>
+            <a:r>
+              <a:rPr lang="en-US" dirty="0"/>
+              <a:t>Input</a:t>
+            </a:r>
+            <a:r>
+              <a:rPr lang="en-US" dirty="0" smtClean="0"/>
+              <a:t>: Error State, Packet of Files</a:t>
+            </a:r>
+          </a:p>
+          <a:p>
+            <a:pPr lvl="2"/>
+            <a:r>
+              <a:rPr lang="en-US" dirty="0" smtClean="0"/>
+              <a:t>G-Code</a:t>
+            </a:r>
+          </a:p>
+          <a:p>
+            <a:pPr lvl="2"/>
+            <a:r>
+              <a:rPr lang="en-US" dirty="0" smtClean="0"/>
+              <a:t>Print Configuration</a:t>
+            </a:r>
+          </a:p>
+          <a:p>
+            <a:pPr lvl="1"/>
+            <a:r>
+              <a:rPr lang="en-US" dirty="0" smtClean="0"/>
+              <a:t>Output: G-Code</a:t>
+            </a:r>
+          </a:p>
+          <a:p>
+            <a:pPr lvl="1"/>
+            <a:endParaRPr lang="en-US" dirty="0"/>
+          </a:p>
+        </p:txBody>
+      </p:sp>
+    </p:spTree>
+    <p:extLst>
+      <p:ext uri="{BB962C8B-B14F-4D97-AF65-F5344CB8AC3E}">
+        <p14:creationId xmlns:p14="http://schemas.microsoft.com/office/powerpoint/2010/main" val="2811952652"/>
+      </p:ext>
+    </p:extLst>
+  </p:cSld>
+  <p:clrMapOvr>
+    <a:masterClrMapping/>
+  </p:clrMapOvr>
+</p:sld>
+</file>
+
+<file path=ppt/slides/slide29.xml><?xml version="1.0" encoding="utf-8"?>
+<p:sld xmlns:a="http://schemas.openxmlformats.org/drawingml/2006/main" xmlns:r="http://schemas.openxmlformats.org/officeDocument/2006/relationships" xmlns:p="http://schemas.openxmlformats.org/presentationml/2006/main">
+  <p:cSld>
+    <p:spTree>
+      <p:nvGrpSpPr>
+        <p:cNvPr id="1" name=""/>
+        <p:cNvGrpSpPr/>
+        <p:nvPr/>
+      </p:nvGrpSpPr>
+      <p:grpSpPr>
+        <a:xfrm>
+          <a:off x="0" y="0"/>
+          <a:ext cx="0" cy="0"/>
+          <a:chOff x="0" y="0"/>
+          <a:chExt cx="0" cy="0"/>
+        </a:xfrm>
+      </p:grpSpPr>
+      <p:sp>
+        <p:nvSpPr>
+          <p:cNvPr id="2" name="Title 1"/>
+          <p:cNvSpPr>
+            <a:spLocks noGrp="1"/>
+          </p:cNvSpPr>
+          <p:nvPr>
+            <p:ph type="title"/>
+          </p:nvPr>
+        </p:nvSpPr>
+        <p:spPr/>
+        <p:txBody>
+          <a:bodyPr/>
+          <a:lstStyle/>
+          <a:p>
+            <a:r>
+              <a:rPr lang="en-US" dirty="0" smtClean="0"/>
+              <a:t>Physical Layer Subsystems</a:t>
+            </a:r>
+            <a:endParaRPr lang="en-US" dirty="0"/>
+          </a:p>
+        </p:txBody>
+      </p:sp>
+      <p:sp>
+        <p:nvSpPr>
+          <p:cNvPr id="3" name="Content Placeholder 2"/>
+          <p:cNvSpPr>
+            <a:spLocks noGrp="1"/>
+          </p:cNvSpPr>
+          <p:nvPr>
+            <p:ph idx="1"/>
+          </p:nvPr>
+        </p:nvSpPr>
+        <p:spPr/>
+        <p:txBody>
+          <a:bodyPr/>
+          <a:lstStyle/>
+          <a:p>
+            <a:r>
+              <a:rPr lang="en-US" dirty="0" smtClean="0"/>
+              <a:t>Packet Preparation</a:t>
+            </a:r>
+          </a:p>
+          <a:p>
+            <a:pPr lvl="1"/>
+            <a:r>
+              <a:rPr lang="en-US" dirty="0"/>
+              <a:t>Purpose:  </a:t>
+            </a:r>
+            <a:r>
+              <a:rPr lang="en-US" dirty="0" smtClean="0"/>
+              <a:t>Convert G-Code stream into byte-stream for printer.</a:t>
+            </a:r>
+            <a:endParaRPr lang="en-US" dirty="0"/>
+          </a:p>
+          <a:p>
+            <a:pPr lvl="1"/>
+            <a:r>
+              <a:rPr lang="en-US" dirty="0" smtClean="0"/>
+              <a:t>Function: Serialize G-Code stream and packetize so that the packets can be transmitted to the printer. Establish serial connection to printer firmware.</a:t>
+            </a:r>
+          </a:p>
+          <a:p>
+            <a:pPr lvl="1"/>
+            <a:r>
+              <a:rPr lang="en-US" dirty="0" smtClean="0"/>
+              <a:t>Dependencies: Printer state controller.</a:t>
+            </a:r>
+            <a:endParaRPr lang="en-US" dirty="0"/>
+          </a:p>
+          <a:p>
+            <a:pPr lvl="1"/>
+            <a:r>
+              <a:rPr lang="en-US" dirty="0"/>
+              <a:t>Processing:  </a:t>
+            </a:r>
+            <a:r>
+              <a:rPr lang="en-US" dirty="0" smtClean="0"/>
+              <a:t>Serialization of G-Code stream. Chunk serialized G-Code stream into packets to be sent to printer firmware.</a:t>
+            </a:r>
+            <a:endParaRPr lang="en-US" dirty="0"/>
+          </a:p>
+          <a:p>
+            <a:pPr lvl="1"/>
+            <a:r>
+              <a:rPr lang="en-US" dirty="0"/>
+              <a:t>Input</a:t>
+            </a:r>
+            <a:r>
+              <a:rPr lang="en-US" dirty="0" smtClean="0"/>
+              <a:t>: G-Code</a:t>
+            </a:r>
+            <a:endParaRPr lang="en-US" dirty="0"/>
+          </a:p>
+          <a:p>
+            <a:pPr lvl="1"/>
+            <a:r>
+              <a:rPr lang="en-US" dirty="0"/>
+              <a:t>Output</a:t>
+            </a:r>
+            <a:r>
+              <a:rPr lang="en-US" dirty="0" smtClean="0"/>
+              <a:t>: Bits on a Wire</a:t>
+            </a:r>
+            <a:endParaRPr lang="en-US" dirty="0"/>
+          </a:p>
+          <a:p>
+            <a:pPr lvl="1"/>
+            <a:endParaRPr lang="en-US" dirty="0"/>
+          </a:p>
+        </p:txBody>
+      </p:sp>
+    </p:spTree>
+    <p:extLst>
+      <p:ext uri="{BB962C8B-B14F-4D97-AF65-F5344CB8AC3E}">
+        <p14:creationId xmlns:p14="http://schemas.microsoft.com/office/powerpoint/2010/main" val="1487547368"/>
       </p:ext>
     </p:extLst>
   </p:cSld>
@@ -6217,6 +7097,344 @@
       </p:par>
     </p:tnLst>
   </p:timing>
+</p:sld>
+</file>
+
+<file path=ppt/slides/slide30.xml><?xml version="1.0" encoding="utf-8"?>
+<p:sld xmlns:a="http://schemas.openxmlformats.org/drawingml/2006/main" xmlns:r="http://schemas.openxmlformats.org/officeDocument/2006/relationships" xmlns:p="http://schemas.openxmlformats.org/presentationml/2006/main">
+  <p:cSld>
+    <p:spTree>
+      <p:nvGrpSpPr>
+        <p:cNvPr id="1" name=""/>
+        <p:cNvGrpSpPr/>
+        <p:nvPr/>
+      </p:nvGrpSpPr>
+      <p:grpSpPr>
+        <a:xfrm>
+          <a:off x="0" y="0"/>
+          <a:ext cx="0" cy="0"/>
+          <a:chOff x="0" y="0"/>
+          <a:chExt cx="0" cy="0"/>
+        </a:xfrm>
+      </p:grpSpPr>
+      <p:sp>
+        <p:nvSpPr>
+          <p:cNvPr id="2" name="Title 1"/>
+          <p:cNvSpPr>
+            <a:spLocks noGrp="1"/>
+          </p:cNvSpPr>
+          <p:nvPr>
+            <p:ph type="title"/>
+          </p:nvPr>
+        </p:nvSpPr>
+        <p:spPr/>
+        <p:txBody>
+          <a:bodyPr/>
+          <a:lstStyle/>
+          <a:p>
+            <a:r>
+              <a:rPr lang="en-US" dirty="0" smtClean="0"/>
+              <a:t>Printer Feedback Layer Subsystems</a:t>
+            </a:r>
+            <a:endParaRPr lang="en-US" dirty="0"/>
+          </a:p>
+        </p:txBody>
+      </p:sp>
+      <p:sp>
+        <p:nvSpPr>
+          <p:cNvPr id="5" name="Rectangle 2"/>
+          <p:cNvSpPr>
+            <a:spLocks noChangeArrowheads="1"/>
+          </p:cNvSpPr>
+          <p:nvPr/>
+        </p:nvSpPr>
+        <p:spPr bwMode="auto">
+          <a:xfrm>
+            <a:off x="0" y="0"/>
+            <a:ext cx="9144000" cy="0"/>
+          </a:xfrm>
+          <a:prstGeom prst="rect">
+            <a:avLst/>
+          </a:prstGeom>
+          <a:noFill/>
+          <a:ln>
+            <a:noFill/>
+          </a:ln>
+          <a:effectLst/>
+          <a:extLst>
+            <a:ext uri="{909E8E84-426E-40DD-AFC4-6F175D3DCCD1}">
+              <a14:hiddenFill xmlns:a14="http://schemas.microsoft.com/office/drawing/2010/main">
+                <a:solidFill>
+                  <a:schemeClr val="accent1"/>
+                </a:solidFill>
+              </a14:hiddenFill>
+            </a:ext>
+            <a:ext uri="{91240B29-F687-4F45-9708-019B960494DF}">
+              <a14:hiddenLine xmlns:a14="http://schemas.microsoft.com/office/drawing/2010/main" w="9525">
+                <a:solidFill>
+                  <a:schemeClr val="tx1"/>
+                </a:solidFill>
+                <a:miter lim="800000"/>
+                <a:headEnd/>
+                <a:tailEnd/>
+              </a14:hiddenLine>
+            </a:ext>
+            <a:ext uri="{AF507438-7753-43E0-B8FC-AC1667EBCBE1}">
+              <a14:hiddenEffects xmlns:a14="http://schemas.microsoft.com/office/drawing/2010/main">
+                <a:effectLst>
+                  <a:outerShdw dist="35921" dir="2700000" algn="ctr" rotWithShape="0">
+                    <a:schemeClr val="bg2"/>
+                  </a:outerShdw>
+                </a:effectLst>
+              </a14:hiddenEffects>
+            </a:ext>
+          </a:extLst>
+        </p:spPr>
+        <p:txBody>
+          <a:bodyPr vert="horz" wrap="none" lIns="91440" tIns="45720" rIns="91440" bIns="45720" numCol="1" anchor="ctr" anchorCtr="0" compatLnSpc="1">
+            <a:prstTxWarp prst="textNoShape">
+              <a:avLst/>
+            </a:prstTxWarp>
+            <a:spAutoFit/>
+          </a:bodyPr>
+          <a:lstStyle/>
+          <a:p>
+            <a:endParaRPr lang="en-US"/>
+          </a:p>
+        </p:txBody>
+      </p:sp>
+      <p:graphicFrame>
+        <p:nvGraphicFramePr>
+          <p:cNvPr id="6" name="Object 5"/>
+          <p:cNvGraphicFramePr>
+            <a:graphicFrameLocks noChangeAspect="1"/>
+          </p:cNvGraphicFramePr>
+          <p:nvPr>
+            <p:extLst>
+              <p:ext uri="{D42A27DB-BD31-4B8C-83A1-F6EECF244321}">
+                <p14:modId xmlns:p14="http://schemas.microsoft.com/office/powerpoint/2010/main" val="4247829488"/>
+              </p:ext>
+            </p:extLst>
+          </p:nvPr>
+        </p:nvGraphicFramePr>
+        <p:xfrm>
+          <a:off x="1371600" y="1524000"/>
+          <a:ext cx="5943600" cy="5219700"/>
+        </p:xfrm>
+        <a:graphic>
+          <a:graphicData uri="http://schemas.openxmlformats.org/presentationml/2006/ole">
+            <mc:AlternateContent xmlns:mc="http://schemas.openxmlformats.org/markup-compatibility/2006">
+              <mc:Choice xmlns:v="urn:schemas-microsoft-com:vml" Requires="v">
+                <p:oleObj spid="_x0000_s8195" name="Visio" r:id="rId3" imgW="6486480" imgH="5695920" progId="Visio.Drawing.15">
+                  <p:embed/>
+                </p:oleObj>
+              </mc:Choice>
+              <mc:Fallback>
+                <p:oleObj name="Visio" r:id="rId3" imgW="6486480" imgH="5695920" progId="Visio.Drawing.15">
+                  <p:embed/>
+                  <p:pic>
+                    <p:nvPicPr>
+                      <p:cNvPr id="0" name="Object 1"/>
+                      <p:cNvPicPr>
+                        <a:picLocks noChangeAspect="1" noChangeArrowheads="1"/>
+                      </p:cNvPicPr>
+                      <p:nvPr/>
+                    </p:nvPicPr>
+                    <p:blipFill>
+                      <a:blip r:embed="rId4">
+                        <a:extLst>
+                          <a:ext uri="{28A0092B-C50C-407E-A947-70E740481C1C}">
+                            <a14:useLocalDpi xmlns:a14="http://schemas.microsoft.com/office/drawing/2010/main" val="0"/>
+                          </a:ext>
+                        </a:extLst>
+                      </a:blip>
+                      <a:srcRect/>
+                      <a:stretch>
+                        <a:fillRect/>
+                      </a:stretch>
+                    </p:blipFill>
+                    <p:spPr bwMode="auto">
+                      <a:xfrm>
+                        <a:off x="1371600" y="1524000"/>
+                        <a:ext cx="5943600" cy="5219700"/>
+                      </a:xfrm>
+                      <a:prstGeom prst="rect">
+                        <a:avLst/>
+                      </a:prstGeom>
+                      <a:noFill/>
+                      <a:extLst>
+                        <a:ext uri="{909E8E84-426E-40DD-AFC4-6F175D3DCCD1}">
+                          <a14:hiddenFill xmlns:a14="http://schemas.microsoft.com/office/drawing/2010/main">
+                            <a:solidFill>
+                              <a:srgbClr val="FFFFFF"/>
+                            </a:solidFill>
+                          </a14:hiddenFill>
+                        </a:ext>
+                      </a:extLst>
+                    </p:spPr>
+                  </p:pic>
+                </p:oleObj>
+              </mc:Fallback>
+            </mc:AlternateContent>
+          </a:graphicData>
+        </a:graphic>
+      </p:graphicFrame>
+    </p:spTree>
+    <p:extLst>
+      <p:ext uri="{BB962C8B-B14F-4D97-AF65-F5344CB8AC3E}">
+        <p14:creationId xmlns:p14="http://schemas.microsoft.com/office/powerpoint/2010/main" val="362765055"/>
+      </p:ext>
+    </p:extLst>
+  </p:cSld>
+  <p:clrMapOvr>
+    <a:masterClrMapping/>
+  </p:clrMapOvr>
+</p:sld>
+</file>
+
+<file path=ppt/slides/slide31.xml><?xml version="1.0" encoding="utf-8"?>
+<p:sld xmlns:a="http://schemas.openxmlformats.org/drawingml/2006/main" xmlns:r="http://schemas.openxmlformats.org/officeDocument/2006/relationships" xmlns:p="http://schemas.openxmlformats.org/presentationml/2006/main">
+  <p:cSld>
+    <p:spTree>
+      <p:nvGrpSpPr>
+        <p:cNvPr id="1" name=""/>
+        <p:cNvGrpSpPr/>
+        <p:nvPr/>
+      </p:nvGrpSpPr>
+      <p:grpSpPr>
+        <a:xfrm>
+          <a:off x="0" y="0"/>
+          <a:ext cx="0" cy="0"/>
+          <a:chOff x="0" y="0"/>
+          <a:chExt cx="0" cy="0"/>
+        </a:xfrm>
+      </p:grpSpPr>
+      <p:sp>
+        <p:nvSpPr>
+          <p:cNvPr id="2" name="Title 1"/>
+          <p:cNvSpPr>
+            <a:spLocks noGrp="1"/>
+          </p:cNvSpPr>
+          <p:nvPr>
+            <p:ph type="title"/>
+          </p:nvPr>
+        </p:nvSpPr>
+        <p:spPr/>
+        <p:txBody>
+          <a:bodyPr/>
+          <a:lstStyle/>
+          <a:p>
+            <a:r>
+              <a:rPr lang="en-US" dirty="0" smtClean="0"/>
+              <a:t>Printer Feedback Layer Subsystems</a:t>
+            </a:r>
+            <a:endParaRPr lang="en-US" dirty="0"/>
+          </a:p>
+        </p:txBody>
+      </p:sp>
+      <p:sp>
+        <p:nvSpPr>
+          <p:cNvPr id="3" name="Content Placeholder 2"/>
+          <p:cNvSpPr>
+            <a:spLocks noGrp="1"/>
+          </p:cNvSpPr>
+          <p:nvPr>
+            <p:ph idx="1"/>
+          </p:nvPr>
+        </p:nvSpPr>
+        <p:spPr/>
+        <p:txBody>
+          <a:bodyPr/>
+          <a:lstStyle/>
+          <a:p>
+            <a:r>
+              <a:rPr lang="en-US" dirty="0" smtClean="0"/>
+              <a:t>State Monitoring</a:t>
+            </a:r>
+          </a:p>
+          <a:p>
+            <a:pPr lvl="1"/>
+            <a:r>
+              <a:rPr lang="en-US" dirty="0"/>
+              <a:t>Purpose:  </a:t>
+            </a:r>
+            <a:r>
+              <a:rPr lang="en-US" dirty="0" smtClean="0"/>
+              <a:t>To monitor the operating status of the printer hardware. </a:t>
+            </a:r>
+            <a:endParaRPr lang="en-US" dirty="0"/>
+          </a:p>
+          <a:p>
+            <a:pPr lvl="1"/>
+            <a:r>
+              <a:rPr lang="en-US" dirty="0" smtClean="0"/>
+              <a:t>Function: Listens for response from printer on established serial connection. Assembles and converts received data into form appropriate for inter-layer transmission. </a:t>
+            </a:r>
+          </a:p>
+          <a:p>
+            <a:pPr lvl="1"/>
+            <a:r>
+              <a:rPr lang="en-US" dirty="0" smtClean="0"/>
+              <a:t>Dependencies: Printer State Controller, Status Module</a:t>
+            </a:r>
+            <a:endParaRPr lang="en-US" dirty="0"/>
+          </a:p>
+          <a:p>
+            <a:pPr lvl="1"/>
+            <a:r>
+              <a:rPr lang="en-US" dirty="0"/>
+              <a:t>Processing:  </a:t>
+            </a:r>
+            <a:r>
+              <a:rPr lang="en-US" dirty="0" smtClean="0"/>
+              <a:t>Data conversion from printer byte-stream into data structure suitable for transmission to other layers in </a:t>
+            </a:r>
+            <a:r>
+              <a:rPr lang="en-US" smtClean="0"/>
+              <a:t>the system.</a:t>
+            </a:r>
+            <a:endParaRPr lang="en-US" dirty="0"/>
+          </a:p>
+          <a:p>
+            <a:pPr lvl="1"/>
+            <a:r>
+              <a:rPr lang="en-US" dirty="0"/>
+              <a:t>Input</a:t>
+            </a:r>
+            <a:r>
+              <a:rPr lang="en-US" dirty="0" smtClean="0"/>
+              <a:t>: State Info</a:t>
+            </a:r>
+            <a:endParaRPr lang="en-US" dirty="0"/>
+          </a:p>
+          <a:p>
+            <a:pPr lvl="1"/>
+            <a:r>
+              <a:rPr lang="en-US" dirty="0"/>
+              <a:t>Output</a:t>
+            </a:r>
+            <a:r>
+              <a:rPr lang="en-US" dirty="0" smtClean="0"/>
+              <a:t>: Error State, State Info</a:t>
+            </a:r>
+            <a:endParaRPr lang="en-US" dirty="0"/>
+          </a:p>
+          <a:p>
+            <a:pPr lvl="1"/>
+            <a:endParaRPr lang="en-US" dirty="0"/>
+          </a:p>
+        </p:txBody>
+      </p:sp>
+    </p:spTree>
+    <p:extLst>
+      <p:ext uri="{BB962C8B-B14F-4D97-AF65-F5344CB8AC3E}">
+        <p14:creationId xmlns:p14="http://schemas.microsoft.com/office/powerpoint/2010/main" val="2110372026"/>
+      </p:ext>
+    </p:extLst>
+  </p:cSld>
+  <p:clrMapOvr>
+    <a:masterClrMapping/>
+  </p:clrMapOvr>
 </p:sld>
 </file>
 
@@ -6724,15 +7942,15 @@
           </a:ln>
           <a:effectLst/>
           <a:extLst>
-            <a:ext uri="{909E8E84-426E-40dd-AFC4-6F175D3DCCD1}">
-              <a14:hiddenFill xmlns="" xmlns:a14="http://schemas.microsoft.com/office/drawing/2010/main">
+            <a:ext uri="{909E8E84-426E-40DD-AFC4-6F175D3DCCD1}">
+              <a14:hiddenFill xmlns:a14="http://schemas.microsoft.com/office/drawing/2010/main">
                 <a:solidFill>
                   <a:schemeClr val="accent1"/>
                 </a:solidFill>
               </a14:hiddenFill>
             </a:ext>
-            <a:ext uri="{91240B29-F687-4f45-9708-019B960494DF}">
-              <a14:hiddenLine xmlns="" xmlns:a14="http://schemas.microsoft.com/office/drawing/2010/main" w="9525">
+            <a:ext uri="{91240B29-F687-4F45-9708-019B960494DF}">
+              <a14:hiddenLine xmlns:a14="http://schemas.microsoft.com/office/drawing/2010/main" w="9525">
                 <a:solidFill>
                   <a:schemeClr val="tx1"/>
                 </a:solidFill>
@@ -6741,8 +7959,8 @@
                 <a:tailEnd/>
               </a14:hiddenLine>
             </a:ext>
-            <a:ext uri="{AF507438-7753-43e0-B8FC-AC1667EBCBE1}">
-              <a14:hiddenEffects xmlns="" xmlns:a14="http://schemas.microsoft.com/office/drawing/2010/main">
+            <a:ext uri="{AF507438-7753-43E0-B8FC-AC1667EBCBE1}">
+              <a14:hiddenEffects xmlns:a14="http://schemas.microsoft.com/office/drawing/2010/main">
                 <a:effectLst>
                   <a:outerShdw dist="35921" dir="2700000" algn="ctr" rotWithShape="0">
                     <a:schemeClr val="bg2"/>
@@ -6787,12 +8005,12 @@
           <a:graphicData uri="http://schemas.openxmlformats.org/presentationml/2006/ole">
             <mc:AlternateContent xmlns:mc="http://schemas.openxmlformats.org/markup-compatibility/2006">
               <mc:Choice xmlns:v="urn:schemas-microsoft-com:vml" Requires="v">
-                <p:oleObj spid="_x0000_s1042" name="Visio" r:id="rId4" imgW="3867210" imgH="4695840" progId="Visio.Drawing.15">
+                <p:oleObj spid="_x0000_s1044" name="Visio" r:id="rId3" imgW="3867210" imgH="4695840" progId="Visio.Drawing.15">
                   <p:embed/>
                 </p:oleObj>
               </mc:Choice>
               <mc:Fallback>
-                <p:oleObj name="Visio" r:id="rId4" imgW="3867210" imgH="4695840" progId="Visio.Drawing.15">
+                <p:oleObj name="Visio" r:id="rId3" imgW="3867210" imgH="4695840" progId="Visio.Drawing.15">
                   <p:embed/>
                   <p:pic>
                     <p:nvPicPr>
@@ -6803,7 +8021,7 @@
                       <p:nvPr/>
                     </p:nvPicPr>
                     <p:blipFill>
-                      <a:blip r:embed="rId5"/>
+                      <a:blip r:embed="rId4"/>
                       <a:srcRect/>
                       <a:stretch>
                         <a:fillRect/>
@@ -7004,15 +8222,15 @@
           </a:ln>
           <a:effectLst/>
           <a:extLst>
-            <a:ext uri="{909E8E84-426E-40dd-AFC4-6F175D3DCCD1}">
-              <a14:hiddenFill xmlns="" xmlns:a14="http://schemas.microsoft.com/office/drawing/2010/main">
+            <a:ext uri="{909E8E84-426E-40DD-AFC4-6F175D3DCCD1}">
+              <a14:hiddenFill xmlns:a14="http://schemas.microsoft.com/office/drawing/2010/main">
                 <a:solidFill>
                   <a:schemeClr val="accent1"/>
                 </a:solidFill>
               </a14:hiddenFill>
             </a:ext>
-            <a:ext uri="{91240B29-F687-4f45-9708-019B960494DF}">
-              <a14:hiddenLine xmlns="" xmlns:a14="http://schemas.microsoft.com/office/drawing/2010/main" w="9525">
+            <a:ext uri="{91240B29-F687-4F45-9708-019B960494DF}">
+              <a14:hiddenLine xmlns:a14="http://schemas.microsoft.com/office/drawing/2010/main" w="9525">
                 <a:solidFill>
                   <a:schemeClr val="tx1"/>
                 </a:solidFill>
@@ -7021,8 +8239,8 @@
                 <a:tailEnd/>
               </a14:hiddenLine>
             </a:ext>
-            <a:ext uri="{AF507438-7753-43e0-B8FC-AC1667EBCBE1}">
-              <a14:hiddenEffects xmlns="" xmlns:a14="http://schemas.microsoft.com/office/drawing/2010/main">
+            <a:ext uri="{AF507438-7753-43E0-B8FC-AC1667EBCBE1}">
+              <a14:hiddenEffects xmlns:a14="http://schemas.microsoft.com/office/drawing/2010/main">
                 <a:effectLst>
                   <a:outerShdw dist="35921" dir="2700000" algn="ctr" rotWithShape="0">
                     <a:schemeClr val="bg2"/>
@@ -7188,15 +8406,15 @@
           </a:ln>
           <a:effectLst/>
           <a:extLst>
-            <a:ext uri="{909E8E84-426E-40dd-AFC4-6F175D3DCCD1}">
-              <a14:hiddenFill xmlns="" xmlns:a14="http://schemas.microsoft.com/office/drawing/2010/main">
+            <a:ext uri="{909E8E84-426E-40DD-AFC4-6F175D3DCCD1}">
+              <a14:hiddenFill xmlns:a14="http://schemas.microsoft.com/office/drawing/2010/main">
                 <a:solidFill>
                   <a:schemeClr val="accent1"/>
                 </a:solidFill>
               </a14:hiddenFill>
             </a:ext>
-            <a:ext uri="{91240B29-F687-4f45-9708-019B960494DF}">
-              <a14:hiddenLine xmlns="" xmlns:a14="http://schemas.microsoft.com/office/drawing/2010/main" w="9525">
+            <a:ext uri="{91240B29-F687-4F45-9708-019B960494DF}">
+              <a14:hiddenLine xmlns:a14="http://schemas.microsoft.com/office/drawing/2010/main" w="9525">
                 <a:solidFill>
                   <a:schemeClr val="tx1"/>
                 </a:solidFill>
@@ -7205,8 +8423,8 @@
                 <a:tailEnd/>
               </a14:hiddenLine>
             </a:ext>
-            <a:ext uri="{AF507438-7753-43e0-B8FC-AC1667EBCBE1}">
-              <a14:hiddenEffects xmlns="" xmlns:a14="http://schemas.microsoft.com/office/drawing/2010/main">
+            <a:ext uri="{AF507438-7753-43E0-B8FC-AC1667EBCBE1}">
+              <a14:hiddenEffects xmlns:a14="http://schemas.microsoft.com/office/drawing/2010/main">
                 <a:effectLst>
                   <a:outerShdw dist="35921" dir="2700000" algn="ctr" rotWithShape="0">
                     <a:schemeClr val="bg2"/>

</xml_diff>

<commit_message>
ADS has more diagrams
</commit_message>
<xml_diff>
--- a/ADS Gate Review/Team Ink3d ADS.pptx
+++ b/ADS Gate Review/Team Ink3d ADS.pptx
@@ -137,7 +137,7 @@
   </p:defaultTextStyle>
   <p:extLst>
     <p:ext uri="{EFAFB233-063F-42B5-8137-9DF3F51BA10A}">
-      <p15:sldGuideLst xmlns="" xmlns:p15="http://schemas.microsoft.com/office/powerpoint/2012/main">
+      <p15:sldGuideLst xmlns:p15="http://schemas.microsoft.com/office/powerpoint/2012/main">
         <p15:guide id="1" orient="horz" pos="2160">
           <p15:clr>
             <a:srgbClr val="A4A3A4"/>
@@ -4465,7 +4465,7 @@
           <a:graphicData uri="http://schemas.openxmlformats.org/presentationml/2006/ole">
             <mc:AlternateContent xmlns:mc="http://schemas.openxmlformats.org/markup-compatibility/2006">
               <mc:Choice xmlns:v="urn:schemas-microsoft-com:vml" Requires="v">
-                <p:oleObj spid="_x0000_s3079" name="Visio" r:id="rId3" imgW="7134210" imgH="5152950" progId="Visio.Drawing.15">
+                <p:oleObj spid="_x0000_s3081" name="Visio" r:id="rId3" imgW="7134210" imgH="5152950" progId="Visio.Drawing.15">
                   <p:embed/>
                 </p:oleObj>
               </mc:Choice>
@@ -4643,6 +4643,30 @@
           </a:p>
         </p:txBody>
       </p:sp>
+      <p:pic>
+        <p:nvPicPr>
+          <p:cNvPr id="4" name="Picture 3"/>
+          <p:cNvPicPr>
+            <a:picLocks noChangeAspect="1"/>
+          </p:cNvPicPr>
+          <p:nvPr/>
+        </p:nvPicPr>
+        <p:blipFill>
+          <a:blip r:embed="rId2"/>
+          <a:stretch>
+            <a:fillRect/>
+          </a:stretch>
+        </p:blipFill>
+        <p:spPr>
+          <a:xfrm>
+            <a:off x="3046981" y="4500880"/>
+            <a:ext cx="5030219" cy="2357120"/>
+          </a:xfrm>
+          <a:prstGeom prst="rect">
+            <a:avLst/>
+          </a:prstGeom>
+        </p:spPr>
+      </p:pic>
     </p:spTree>
     <p:extLst>
       <p:ext uri="{BB962C8B-B14F-4D97-AF65-F5344CB8AC3E}">
@@ -4771,6 +4795,30 @@
           </a:p>
         </p:txBody>
       </p:sp>
+      <p:pic>
+        <p:nvPicPr>
+          <p:cNvPr id="4" name="Picture 3"/>
+          <p:cNvPicPr>
+            <a:picLocks noChangeAspect="1"/>
+          </p:cNvPicPr>
+          <p:nvPr/>
+        </p:nvPicPr>
+        <p:blipFill>
+          <a:blip r:embed="rId2"/>
+          <a:stretch>
+            <a:fillRect/>
+          </a:stretch>
+        </p:blipFill>
+        <p:spPr>
+          <a:xfrm>
+            <a:off x="3733800" y="4634608"/>
+            <a:ext cx="4725419" cy="2214293"/>
+          </a:xfrm>
+          <a:prstGeom prst="rect">
+            <a:avLst/>
+          </a:prstGeom>
+        </p:spPr>
+      </p:pic>
     </p:spTree>
     <p:extLst>
       <p:ext uri="{BB962C8B-B14F-4D97-AF65-F5344CB8AC3E}">
@@ -4896,6 +4944,30 @@
           </a:p>
         </p:txBody>
       </p:sp>
+      <p:pic>
+        <p:nvPicPr>
+          <p:cNvPr id="4" name="Picture 3"/>
+          <p:cNvPicPr>
+            <a:picLocks noChangeAspect="1"/>
+          </p:cNvPicPr>
+          <p:nvPr/>
+        </p:nvPicPr>
+        <p:blipFill>
+          <a:blip r:embed="rId2"/>
+          <a:stretch>
+            <a:fillRect/>
+          </a:stretch>
+        </p:blipFill>
+        <p:spPr>
+          <a:xfrm>
+            <a:off x="3124200" y="4465173"/>
+            <a:ext cx="5106419" cy="2392827"/>
+          </a:xfrm>
+          <a:prstGeom prst="rect">
+            <a:avLst/>
+          </a:prstGeom>
+        </p:spPr>
+      </p:pic>
     </p:spTree>
     <p:extLst>
       <p:ext uri="{BB962C8B-B14F-4D97-AF65-F5344CB8AC3E}">
@@ -5023,6 +5095,30 @@
           </a:p>
         </p:txBody>
       </p:sp>
+      <p:pic>
+        <p:nvPicPr>
+          <p:cNvPr id="4" name="Picture 3"/>
+          <p:cNvPicPr>
+            <a:picLocks noChangeAspect="1"/>
+          </p:cNvPicPr>
+          <p:nvPr/>
+        </p:nvPicPr>
+        <p:blipFill>
+          <a:blip r:embed="rId2"/>
+          <a:stretch>
+            <a:fillRect/>
+          </a:stretch>
+        </p:blipFill>
+        <p:spPr>
+          <a:xfrm>
+            <a:off x="2909366" y="4419600"/>
+            <a:ext cx="5182619" cy="2428533"/>
+          </a:xfrm>
+          <a:prstGeom prst="rect">
+            <a:avLst/>
+          </a:prstGeom>
+        </p:spPr>
+      </p:pic>
     </p:spTree>
     <p:extLst>
       <p:ext uri="{BB962C8B-B14F-4D97-AF65-F5344CB8AC3E}">
@@ -5251,6 +5347,30 @@
           </a:p>
         </p:txBody>
       </p:sp>
+      <p:pic>
+        <p:nvPicPr>
+          <p:cNvPr id="4" name="Picture 3"/>
+          <p:cNvPicPr>
+            <a:picLocks noChangeAspect="1"/>
+          </p:cNvPicPr>
+          <p:nvPr/>
+        </p:nvPicPr>
+        <p:blipFill>
+          <a:blip r:embed="rId2"/>
+          <a:stretch>
+            <a:fillRect/>
+          </a:stretch>
+        </p:blipFill>
+        <p:spPr>
+          <a:xfrm>
+            <a:off x="2892536" y="4495800"/>
+            <a:ext cx="5460821" cy="5572874"/>
+          </a:xfrm>
+          <a:prstGeom prst="rect">
+            <a:avLst/>
+          </a:prstGeom>
+        </p:spPr>
+      </p:pic>
     </p:spTree>
     <p:extLst>
       <p:ext uri="{BB962C8B-B14F-4D97-AF65-F5344CB8AC3E}">
@@ -5396,7 +5516,7 @@
           <a:graphicData uri="http://schemas.openxmlformats.org/presentationml/2006/ole">
             <mc:AlternateContent xmlns:mc="http://schemas.openxmlformats.org/markup-compatibility/2006">
               <mc:Choice xmlns:v="urn:schemas-microsoft-com:vml" Requires="v">
-                <p:oleObj spid="_x0000_s4103" name="Visio" r:id="rId3" imgW="5914944" imgH="4533804" progId="Visio.Drawing.15">
+                <p:oleObj spid="_x0000_s4105" name="Visio" r:id="rId3" imgW="5914944" imgH="4533804" progId="Visio.Drawing.15">
                   <p:embed/>
                 </p:oleObj>
               </mc:Choice>
@@ -5641,6 +5761,30 @@
           </a:p>
         </p:txBody>
       </p:sp>
+      <p:pic>
+        <p:nvPicPr>
+          <p:cNvPr id="5" name="Picture 4"/>
+          <p:cNvPicPr>
+            <a:picLocks noChangeAspect="1"/>
+          </p:cNvPicPr>
+          <p:nvPr/>
+        </p:nvPicPr>
+        <p:blipFill>
+          <a:blip r:embed="rId2"/>
+          <a:stretch>
+            <a:fillRect/>
+          </a:stretch>
+        </p:blipFill>
+        <p:spPr>
+          <a:xfrm>
+            <a:off x="4114800" y="3886200"/>
+            <a:ext cx="4280955" cy="2846517"/>
+          </a:xfrm>
+          <a:prstGeom prst="rect">
+            <a:avLst/>
+          </a:prstGeom>
+        </p:spPr>
+      </p:pic>
     </p:spTree>
     <p:extLst>
       <p:ext uri="{BB962C8B-B14F-4D97-AF65-F5344CB8AC3E}">
@@ -5786,7 +5930,7 @@
           <a:graphicData uri="http://schemas.openxmlformats.org/presentationml/2006/ole">
             <mc:AlternateContent xmlns:mc="http://schemas.openxmlformats.org/markup-compatibility/2006">
               <mc:Choice xmlns:v="urn:schemas-microsoft-com:vml" Requires="v">
-                <p:oleObj spid="_x0000_s5126" name="Visio" r:id="rId3" imgW="3943350" imgH="3152790" progId="Visio.Drawing.15">
+                <p:oleObj spid="_x0000_s5128" name="Visio" r:id="rId3" imgW="3943350" imgH="3152790" progId="Visio.Drawing.15">
                   <p:embed/>
                 </p:oleObj>
               </mc:Choice>
@@ -6026,6 +6170,30 @@
           </a:p>
         </p:txBody>
       </p:sp>
+      <p:pic>
+        <p:nvPicPr>
+          <p:cNvPr id="4" name="Picture 3"/>
+          <p:cNvPicPr>
+            <a:picLocks noChangeAspect="1"/>
+          </p:cNvPicPr>
+          <p:nvPr/>
+        </p:nvPicPr>
+        <p:blipFill>
+          <a:blip r:embed="rId2"/>
+          <a:stretch>
+            <a:fillRect/>
+          </a:stretch>
+        </p:blipFill>
+        <p:spPr>
+          <a:xfrm>
+            <a:off x="3657600" y="3886200"/>
+            <a:ext cx="4814355" cy="2261157"/>
+          </a:xfrm>
+          <a:prstGeom prst="rect">
+            <a:avLst/>
+          </a:prstGeom>
+        </p:spPr>
+      </p:pic>
     </p:spTree>
     <p:extLst>
       <p:ext uri="{BB962C8B-B14F-4D97-AF65-F5344CB8AC3E}">
@@ -6234,7 +6402,7 @@
           <a:graphicData uri="http://schemas.openxmlformats.org/presentationml/2006/ole">
             <mc:AlternateContent xmlns:mc="http://schemas.openxmlformats.org/markup-compatibility/2006">
               <mc:Choice xmlns:v="urn:schemas-microsoft-com:vml" Requires="v">
-                <p:oleObj spid="_x0000_s6153" name="Visio" r:id="rId3" imgW="3943350" imgH="3381480" progId="Visio.Drawing.15">
+                <p:oleObj spid="_x0000_s6155" name="Visio" r:id="rId3" imgW="3943350" imgH="3381480" progId="Visio.Drawing.15">
                   <p:embed/>
                 </p:oleObj>
               </mc:Choice>
@@ -6468,6 +6636,30 @@
           </a:p>
         </p:txBody>
       </p:sp>
+      <p:pic>
+        <p:nvPicPr>
+          <p:cNvPr id="4" name="Picture 3"/>
+          <p:cNvPicPr>
+            <a:picLocks noChangeAspect="1"/>
+          </p:cNvPicPr>
+          <p:nvPr/>
+        </p:nvPicPr>
+        <p:blipFill>
+          <a:blip r:embed="rId2"/>
+          <a:stretch>
+            <a:fillRect/>
+          </a:stretch>
+        </p:blipFill>
+        <p:spPr>
+          <a:xfrm>
+            <a:off x="3810000" y="4152444"/>
+            <a:ext cx="4267200" cy="2263141"/>
+          </a:xfrm>
+          <a:prstGeom prst="rect">
+            <a:avLst/>
+          </a:prstGeom>
+        </p:spPr>
+      </p:pic>
     </p:spTree>
     <p:extLst>
       <p:ext uri="{BB962C8B-B14F-4D97-AF65-F5344CB8AC3E}">
@@ -6613,7 +6805,7 @@
           <a:graphicData uri="http://schemas.openxmlformats.org/presentationml/2006/ole">
             <mc:AlternateContent xmlns:mc="http://schemas.openxmlformats.org/markup-compatibility/2006">
               <mc:Choice xmlns:v="urn:schemas-microsoft-com:vml" Requires="v">
-                <p:oleObj spid="_x0000_s7174" name="Visio" r:id="rId3" imgW="6543720" imgH="5695920" progId="Visio.Drawing.15">
+                <p:oleObj spid="_x0000_s7176" name="Visio" r:id="rId3" imgW="6543720" imgH="5695920" progId="Visio.Drawing.15">
                   <p:embed/>
                 </p:oleObj>
               </mc:Choice>
@@ -6788,15 +6980,7 @@
             </a:r>
             <a:r>
               <a:rPr lang="en-US" dirty="0" smtClean="0"/>
-              <a:t>: </a:t>
-            </a:r>
-            <a:r>
-              <a:rPr lang="en-US" dirty="0" smtClean="0"/>
-              <a:t>Packet </a:t>
-            </a:r>
-            <a:r>
-              <a:rPr lang="en-US" dirty="0" smtClean="0"/>
-              <a:t>of Files</a:t>
+              <a:t>: Packet of Files</a:t>
             </a:r>
           </a:p>
           <a:p>
@@ -6826,6 +7010,30 @@
           </a:p>
         </p:txBody>
       </p:sp>
+      <p:pic>
+        <p:nvPicPr>
+          <p:cNvPr id="4" name="Picture 3"/>
+          <p:cNvPicPr>
+            <a:picLocks noChangeAspect="1"/>
+          </p:cNvPicPr>
+          <p:nvPr/>
+        </p:nvPicPr>
+        <p:blipFill>
+          <a:blip r:embed="rId2"/>
+          <a:stretch>
+            <a:fillRect/>
+          </a:stretch>
+        </p:blipFill>
+        <p:spPr>
+          <a:xfrm>
+            <a:off x="3581399" y="4573161"/>
+            <a:ext cx="4477603" cy="2299624"/>
+          </a:xfrm>
+          <a:prstGeom prst="rect">
+            <a:avLst/>
+          </a:prstGeom>
+        </p:spPr>
+      </p:pic>
     </p:spTree>
     <p:extLst>
       <p:ext uri="{BB962C8B-B14F-4D97-AF65-F5344CB8AC3E}">
@@ -6953,15 +7161,7 @@
             </a:r>
             <a:r>
               <a:rPr lang="en-US" dirty="0" smtClean="0"/>
-              <a:t>: </a:t>
-            </a:r>
-            <a:r>
-              <a:rPr lang="en-US" dirty="0" smtClean="0"/>
-              <a:t>Printer </a:t>
-            </a:r>
-            <a:r>
-              <a:rPr lang="en-US" smtClean="0"/>
-              <a:t>State Information, G-Code</a:t>
+              <a:t>: Printer State Information, G-Code</a:t>
             </a:r>
             <a:endParaRPr lang="en-US" dirty="0"/>
           </a:p>
@@ -6983,6 +7183,30 @@
           </a:p>
         </p:txBody>
       </p:sp>
+      <p:pic>
+        <p:nvPicPr>
+          <p:cNvPr id="4" name="Picture 3"/>
+          <p:cNvPicPr>
+            <a:picLocks noChangeAspect="1"/>
+          </p:cNvPicPr>
+          <p:nvPr/>
+        </p:nvPicPr>
+        <p:blipFill>
+          <a:blip r:embed="rId2"/>
+          <a:stretch>
+            <a:fillRect/>
+          </a:stretch>
+        </p:blipFill>
+        <p:spPr>
+          <a:xfrm>
+            <a:off x="3505200" y="4548902"/>
+            <a:ext cx="4546979" cy="2335255"/>
+          </a:xfrm>
+          <a:prstGeom prst="rect">
+            <a:avLst/>
+          </a:prstGeom>
+        </p:spPr>
+      </p:pic>
     </p:spTree>
     <p:extLst>
       <p:ext uri="{BB962C8B-B14F-4D97-AF65-F5344CB8AC3E}">
@@ -7263,7 +7487,7 @@
           <a:graphicData uri="http://schemas.openxmlformats.org/presentationml/2006/ole">
             <mc:AlternateContent xmlns:mc="http://schemas.openxmlformats.org/markup-compatibility/2006">
               <mc:Choice xmlns:v="urn:schemas-microsoft-com:vml" Requires="v">
-                <p:oleObj spid="_x0000_s8198" name="Visio" r:id="rId3" imgW="6486480" imgH="5695920" progId="Visio.Drawing.15">
+                <p:oleObj spid="_x0000_s8200" name="Visio" r:id="rId3" imgW="6486480" imgH="5695920" progId="Visio.Drawing.15">
                   <p:embed/>
                 </p:oleObj>
               </mc:Choice>
@@ -7456,15 +7680,7 @@
             </a:r>
             <a:r>
               <a:rPr lang="en-US" dirty="0" smtClean="0"/>
-              <a:t>: </a:t>
-            </a:r>
-            <a:r>
-              <a:rPr lang="en-US" dirty="0" smtClean="0"/>
-              <a:t>State </a:t>
-            </a:r>
-            <a:r>
-              <a:rPr lang="en-US" dirty="0" smtClean="0"/>
-              <a:t>Info</a:t>
+              <a:t>: State Info</a:t>
             </a:r>
             <a:endParaRPr lang="en-US" dirty="0"/>
           </a:p>
@@ -7474,6 +7690,30 @@
           </a:p>
         </p:txBody>
       </p:sp>
+      <p:pic>
+        <p:nvPicPr>
+          <p:cNvPr id="4" name="Picture 3"/>
+          <p:cNvPicPr>
+            <a:picLocks noChangeAspect="1"/>
+          </p:cNvPicPr>
+          <p:nvPr/>
+        </p:nvPicPr>
+        <p:blipFill>
+          <a:blip r:embed="rId2"/>
+          <a:stretch>
+            <a:fillRect/>
+          </a:stretch>
+        </p:blipFill>
+        <p:spPr>
+          <a:xfrm>
+            <a:off x="4572000" y="4617034"/>
+            <a:ext cx="2655216" cy="2211395"/>
+          </a:xfrm>
+          <a:prstGeom prst="rect">
+            <a:avLst/>
+          </a:prstGeom>
+        </p:spPr>
+      </p:pic>
     </p:spTree>
     <p:extLst>
       <p:ext uri="{BB962C8B-B14F-4D97-AF65-F5344CB8AC3E}">
@@ -8175,7 +8415,7 @@
           <a:graphicData uri="http://schemas.openxmlformats.org/presentationml/2006/ole">
             <mc:AlternateContent xmlns:mc="http://schemas.openxmlformats.org/markup-compatibility/2006">
               <mc:Choice xmlns:v="urn:schemas-microsoft-com:vml" Requires="v">
-                <p:oleObj spid="_x0000_s1047" name="Visio" r:id="rId3" imgW="3867210" imgH="4695840" progId="Visio.Drawing.15">
+                <p:oleObj spid="_x0000_s1049" name="Visio" r:id="rId3" imgW="3867210" imgH="4695840" progId="Visio.Drawing.15">
                   <p:embed/>
                 </p:oleObj>
               </mc:Choice>

</xml_diff>

<commit_message>
Descriptions are no longer sentences. Diagrams now fit.
</commit_message>
<xml_diff>
--- a/ADS Gate Review/Team Ink3d ADS.pptx
+++ b/ADS Gate Review/Team Ink3d ADS.pptx
@@ -22,21 +22,22 @@
     <p:sldId id="282" r:id="rId16"/>
     <p:sldId id="293" r:id="rId17"/>
     <p:sldId id="286" r:id="rId18"/>
-    <p:sldId id="283" r:id="rId19"/>
-    <p:sldId id="284" r:id="rId20"/>
-    <p:sldId id="285" r:id="rId21"/>
-    <p:sldId id="287" r:id="rId22"/>
-    <p:sldId id="294" r:id="rId23"/>
-    <p:sldId id="288" r:id="rId24"/>
-    <p:sldId id="295" r:id="rId25"/>
-    <p:sldId id="289" r:id="rId26"/>
-    <p:sldId id="296" r:id="rId27"/>
-    <p:sldId id="290" r:id="rId28"/>
-    <p:sldId id="297" r:id="rId29"/>
-    <p:sldId id="291" r:id="rId30"/>
-    <p:sldId id="292" r:id="rId31"/>
-    <p:sldId id="298" r:id="rId32"/>
-    <p:sldId id="299" r:id="rId33"/>
+    <p:sldId id="301" r:id="rId19"/>
+    <p:sldId id="283" r:id="rId20"/>
+    <p:sldId id="284" r:id="rId21"/>
+    <p:sldId id="285" r:id="rId22"/>
+    <p:sldId id="287" r:id="rId23"/>
+    <p:sldId id="294" r:id="rId24"/>
+    <p:sldId id="288" r:id="rId25"/>
+    <p:sldId id="295" r:id="rId26"/>
+    <p:sldId id="289" r:id="rId27"/>
+    <p:sldId id="296" r:id="rId28"/>
+    <p:sldId id="290" r:id="rId29"/>
+    <p:sldId id="297" r:id="rId30"/>
+    <p:sldId id="291" r:id="rId31"/>
+    <p:sldId id="292" r:id="rId32"/>
+    <p:sldId id="298" r:id="rId33"/>
+    <p:sldId id="299" r:id="rId34"/>
   </p:sldIdLst>
   <p:sldSz cx="9144000" cy="6858000" type="screen4x3"/>
   <p:notesSz cx="6858000" cy="9144000"/>
@@ -4465,7 +4466,7 @@
           <a:graphicData uri="http://schemas.openxmlformats.org/presentationml/2006/ole">
             <mc:AlternateContent xmlns:mc="http://schemas.openxmlformats.org/markup-compatibility/2006">
               <mc:Choice xmlns:v="urn:schemas-microsoft-com:vml" Requires="v">
-                <p:oleObj spid="_x0000_s3081" name="Visio" r:id="rId3" imgW="7134210" imgH="5152950" progId="Visio.Drawing.15">
+                <p:oleObj spid="_x0000_s3084" name="Visio" r:id="rId3" imgW="7134210" imgH="5152950" progId="Visio.Drawing.15">
                   <p:embed/>
                 </p:oleObj>
               </mc:Choice>
@@ -4606,7 +4607,26 @@
             <a:pPr lvl="1"/>
             <a:r>
               <a:rPr lang="en-US" dirty="0" smtClean="0"/>
-              <a:t>Function:  Display interface from which users import files and pass those files to the Print Module.</a:t>
+              <a:t>Function:  </a:t>
+            </a:r>
+            <a:endParaRPr lang="en-US" dirty="0" smtClean="0"/>
+          </a:p>
+          <a:p>
+            <a:pPr lvl="2"/>
+            <a:r>
+              <a:rPr lang="en-US" dirty="0" smtClean="0"/>
+              <a:t>Display import file interface</a:t>
+            </a:r>
+          </a:p>
+          <a:p>
+            <a:pPr lvl="2"/>
+            <a:r>
+              <a:rPr lang="en-US" dirty="0" smtClean="0"/>
+              <a:t>pass </a:t>
+            </a:r>
+            <a:r>
+              <a:rPr lang="en-US" dirty="0" smtClean="0"/>
+              <a:t>those files to the Print Module.</a:t>
             </a:r>
           </a:p>
           <a:p>
@@ -4738,7 +4758,9 @@
         </p:nvSpPr>
         <p:spPr/>
         <p:txBody>
-          <a:bodyPr/>
+          <a:bodyPr>
+            <a:normAutofit/>
+          </a:bodyPr>
           <a:lstStyle/>
           <a:p>
             <a:r>
@@ -4757,8 +4779,21 @@
             <a:pPr lvl="1"/>
             <a:r>
               <a:rPr lang="en-US" dirty="0"/>
-              <a:t>Function:  Display interface from which users can set print settings and initiate a print.  Pass the necessary information to the Preprocessing Layer when a print is initiated.</a:t>
-            </a:r>
+              <a:t>Function:  Display </a:t>
+            </a:r>
+            <a:r>
+              <a:rPr lang="en-US" dirty="0" smtClean="0"/>
+              <a:t>print settings and initiate print. Pass </a:t>
+            </a:r>
+            <a:r>
+              <a:rPr lang="en-US" dirty="0"/>
+              <a:t>necessary information to the Preprocessing </a:t>
+            </a:r>
+            <a:r>
+              <a:rPr lang="en-US" dirty="0" smtClean="0"/>
+              <a:t>Layer.</a:t>
+            </a:r>
+            <a:endParaRPr lang="en-US" dirty="0"/>
           </a:p>
           <a:p>
             <a:pPr lvl="1"/>
@@ -4771,25 +4806,11 @@
             <a:pPr lvl="1"/>
             <a:r>
               <a:rPr lang="en-US" dirty="0"/>
-              <a:t>Processing:  Map materials to object files.  Package print request object.</a:t>
-            </a:r>
-          </a:p>
-          <a:p>
-            <a:pPr lvl="1"/>
-            <a:r>
-              <a:rPr lang="en-US" dirty="0"/>
-              <a:t>Input:  Print Settings, Printer Configuration, Material Data, Object File </a:t>
-            </a:r>
-            <a:r>
-              <a:rPr lang="en-US" dirty="0" smtClean="0"/>
-              <a:t>References</a:t>
-            </a:r>
-          </a:p>
-          <a:p>
-            <a:pPr lvl="1"/>
-            <a:r>
-              <a:rPr lang="en-US" dirty="0" smtClean="0"/>
-              <a:t>Output:  Print Packet (Encapsulates Print Settings, Printer Configuration, Material Data, Object File References)</a:t>
+              <a:t>Processing:  Map materials to object files.  Package print request object</a:t>
+            </a:r>
+            <a:r>
+              <a:rPr lang="en-US" dirty="0" smtClean="0"/>
+              <a:t>.</a:t>
             </a:r>
             <a:endParaRPr lang="en-US" dirty="0"/>
           </a:p>
@@ -4811,7 +4832,7 @@
         </p:blipFill>
         <p:spPr>
           <a:xfrm>
-            <a:off x="3733800" y="4634608"/>
+            <a:off x="3371115" y="4495800"/>
             <a:ext cx="4725419" cy="2214293"/>
           </a:xfrm>
           <a:prstGeom prst="rect">
@@ -4872,10 +4893,9 @@
           <a:lstStyle/>
           <a:p>
             <a:r>
-              <a:rPr lang="en-US" sz="4400" dirty="0" smtClean="0"/>
+              <a:rPr lang="en-US" sz="4400" dirty="0"/>
               <a:t>User Interface Layer Subsystems</a:t>
             </a:r>
-            <a:endParaRPr lang="en-US" sz="4400" dirty="0"/>
           </a:p>
         </p:txBody>
       </p:sp>
@@ -4891,54 +4911,88 @@
         </p:nvSpPr>
         <p:spPr/>
         <p:txBody>
-          <a:bodyPr/>
-          <a:lstStyle/>
-          <a:p>
-            <a:r>
-              <a:rPr lang="en-US" dirty="0" smtClean="0"/>
-              <a:t>Configuration Module</a:t>
-            </a:r>
-          </a:p>
-          <a:p>
-            <a:pPr lvl="1"/>
-            <a:r>
-              <a:rPr lang="en-US" dirty="0" smtClean="0"/>
-              <a:t>Purpose:  Allow the user to configure printer settings and material information.</a:t>
-            </a:r>
-          </a:p>
-          <a:p>
-            <a:pPr lvl="1"/>
-            <a:r>
-              <a:rPr lang="en-US" dirty="0" smtClean="0"/>
-              <a:t>Function:  Display interface from which users can input printer configuration and material information.  Pass information to the Database Interface to be saved.</a:t>
-            </a:r>
-          </a:p>
-          <a:p>
-            <a:pPr lvl="1"/>
-            <a:r>
-              <a:rPr lang="en-US" dirty="0" smtClean="0"/>
-              <a:t>Dependencies:  Database Interface</a:t>
-            </a:r>
-          </a:p>
-          <a:p>
-            <a:pPr lvl="1"/>
-            <a:r>
-              <a:rPr lang="en-US" dirty="0" smtClean="0"/>
-              <a:t>Processing:  User Input Processing</a:t>
-            </a:r>
-          </a:p>
-          <a:p>
-            <a:pPr lvl="1"/>
-            <a:r>
-              <a:rPr lang="en-US" dirty="0" smtClean="0"/>
-              <a:t>Input:  Printer Configuration Data, Material Data</a:t>
-            </a:r>
-          </a:p>
-          <a:p>
-            <a:pPr lvl="1"/>
-            <a:r>
-              <a:rPr lang="en-US" dirty="0" smtClean="0"/>
-              <a:t>Output:  Printer Configuration Data, Material Data</a:t>
+          <a:bodyPr>
+            <a:normAutofit/>
+          </a:bodyPr>
+          <a:lstStyle/>
+          <a:p>
+            <a:r>
+              <a:rPr lang="en-US" dirty="0"/>
+              <a:t>Print Module</a:t>
+            </a:r>
+          </a:p>
+          <a:p>
+            <a:pPr lvl="1"/>
+            <a:r>
+              <a:rPr lang="en-US" dirty="0" smtClean="0"/>
+              <a:t>Input</a:t>
+            </a:r>
+            <a:r>
+              <a:rPr lang="en-US" dirty="0"/>
+              <a:t>:  </a:t>
+            </a:r>
+            <a:r>
+              <a:rPr lang="en-US" dirty="0" smtClean="0"/>
+              <a:t>Print </a:t>
+            </a:r>
+            <a:r>
+              <a:rPr lang="en-US" dirty="0"/>
+              <a:t>Settings, Printer </a:t>
+            </a:r>
+            <a:r>
+              <a:rPr lang="en-US" dirty="0"/>
+              <a:t>C</a:t>
+            </a:r>
+            <a:r>
+              <a:rPr lang="en-US" dirty="0" smtClean="0"/>
+              <a:t>onfiguration</a:t>
+            </a:r>
+            <a:r>
+              <a:rPr lang="en-US" dirty="0"/>
+              <a:t>, </a:t>
+            </a:r>
+            <a:r>
+              <a:rPr lang="en-US" dirty="0" smtClean="0"/>
+              <a:t>Material </a:t>
+            </a:r>
+            <a:r>
+              <a:rPr lang="en-US" dirty="0"/>
+              <a:t>Data, </a:t>
+            </a:r>
+            <a:r>
+              <a:rPr lang="en-US" dirty="0" smtClean="0"/>
+              <a:t>Object </a:t>
+            </a:r>
+            <a:r>
+              <a:rPr lang="en-US" dirty="0"/>
+              <a:t>File </a:t>
+            </a:r>
+            <a:r>
+              <a:rPr lang="en-US" dirty="0" smtClean="0"/>
+              <a:t>References</a:t>
+            </a:r>
+          </a:p>
+          <a:p>
+            <a:pPr lvl="1"/>
+            <a:r>
+              <a:rPr lang="en-US" dirty="0" smtClean="0"/>
+              <a:t>Output:  </a:t>
+            </a:r>
+            <a:r>
+              <a:rPr lang="en-US" dirty="0" smtClean="0"/>
+              <a:t>Print </a:t>
+            </a:r>
+            <a:r>
+              <a:rPr lang="en-US" dirty="0" smtClean="0"/>
+              <a:t>Packet (Encapsulates Print Settings, </a:t>
+            </a:r>
+            <a:r>
+              <a:rPr lang="en-US" dirty="0" smtClean="0"/>
+              <a:t>Printer </a:t>
+            </a:r>
+            <a:r>
+              <a:rPr lang="en-US" dirty="0" smtClean="0"/>
+              <a:t>Configuration, Material Data, Object File References)</a:t>
             </a:r>
             <a:endParaRPr lang="en-US" dirty="0"/>
           </a:p>
@@ -4960,8 +5014,8 @@
         </p:blipFill>
         <p:spPr>
           <a:xfrm>
-            <a:off x="3124200" y="4465173"/>
-            <a:ext cx="5106419" cy="2392827"/>
+            <a:off x="3351781" y="4495800"/>
+            <a:ext cx="4725419" cy="2214293"/>
           </a:xfrm>
           <a:prstGeom prst="rect">
             <a:avLst/>
@@ -4971,7 +5025,7 @@
     </p:spTree>
     <p:extLst>
       <p:ext uri="{BB962C8B-B14F-4D97-AF65-F5344CB8AC3E}">
-        <p14:creationId xmlns:p14="http://schemas.microsoft.com/office/powerpoint/2010/main" val="4098163977"/>
+        <p14:creationId xmlns:p14="http://schemas.microsoft.com/office/powerpoint/2010/main" val="3331574523"/>
       </p:ext>
     </p:extLst>
   </p:cSld>
@@ -5021,9 +5075,10 @@
           <a:lstStyle/>
           <a:p>
             <a:r>
-              <a:rPr lang="en-US" sz="4400" dirty="0"/>
+              <a:rPr lang="en-US" sz="4400" dirty="0" smtClean="0"/>
               <a:t>User Interface Layer Subsystems</a:t>
             </a:r>
+            <a:endParaRPr lang="en-US" sz="4400" dirty="0"/>
           </a:p>
         </p:txBody>
       </p:sp>
@@ -5044,54 +5099,88 @@
           <a:p>
             <a:r>
               <a:rPr lang="en-US" dirty="0" smtClean="0"/>
-              <a:t>Database Interface</a:t>
-            </a:r>
-          </a:p>
-          <a:p>
-            <a:pPr lvl="1"/>
-            <a:r>
-              <a:rPr lang="en-US" dirty="0" smtClean="0"/>
-              <a:t>Purpose:  Abstract data persistence</a:t>
-            </a:r>
-          </a:p>
-          <a:p>
-            <a:pPr lvl="1"/>
-            <a:r>
-              <a:rPr lang="en-US" dirty="0" smtClean="0"/>
-              <a:t>Function:  Receive data from other modules and store it in a database.  Retrieve data from the database for other modules.</a:t>
-            </a:r>
-          </a:p>
-          <a:p>
-            <a:pPr lvl="1"/>
-            <a:r>
-              <a:rPr lang="en-US" dirty="0" smtClean="0"/>
-              <a:t>Dependencies:  None</a:t>
-            </a:r>
-          </a:p>
-          <a:p>
-            <a:pPr lvl="1"/>
-            <a:r>
-              <a:rPr lang="en-US" dirty="0" smtClean="0"/>
-              <a:t>Processing:  Database query generation</a:t>
-            </a:r>
-          </a:p>
-          <a:p>
-            <a:pPr lvl="1"/>
-            <a:r>
-              <a:rPr lang="en-US" dirty="0" smtClean="0"/>
-              <a:t>Input:  Configuration Information</a:t>
-            </a:r>
-          </a:p>
-          <a:p>
-            <a:pPr lvl="1"/>
-            <a:r>
-              <a:rPr lang="en-US" dirty="0" smtClean="0"/>
-              <a:t>Output:  CRUD Operations, Configuration Information</a:t>
-            </a:r>
-          </a:p>
-          <a:p>
-            <a:pPr lvl="1"/>
+              <a:t>Configuration Module</a:t>
+            </a:r>
+          </a:p>
+          <a:p>
+            <a:pPr lvl="1"/>
+            <a:r>
+              <a:rPr lang="en-US" dirty="0" smtClean="0"/>
+              <a:t>Purpose:  </a:t>
+            </a:r>
+            <a:r>
+              <a:rPr lang="en-US" dirty="0" smtClean="0"/>
+              <a:t>Configure printer settings and material info</a:t>
+            </a:r>
             <a:endParaRPr lang="en-US" dirty="0" smtClean="0"/>
+          </a:p>
+          <a:p>
+            <a:pPr lvl="1"/>
+            <a:r>
+              <a:rPr lang="en-US" dirty="0" smtClean="0"/>
+              <a:t>Function:  </a:t>
+            </a:r>
+            <a:r>
+              <a:rPr lang="en-US" dirty="0" smtClean="0"/>
+              <a:t>Printer configuration and material input interface. </a:t>
+            </a:r>
+            <a:r>
+              <a:rPr lang="en-US" dirty="0" smtClean="0"/>
+              <a:t>Passes </a:t>
+            </a:r>
+            <a:r>
+              <a:rPr lang="en-US" dirty="0" smtClean="0"/>
+              <a:t>information to the Database </a:t>
+            </a:r>
+            <a:r>
+              <a:rPr lang="en-US" dirty="0" smtClean="0"/>
+              <a:t>Interface.</a:t>
+            </a:r>
+            <a:endParaRPr lang="en-US" dirty="0" smtClean="0"/>
+          </a:p>
+          <a:p>
+            <a:pPr lvl="1"/>
+            <a:r>
+              <a:rPr lang="en-US" dirty="0" smtClean="0"/>
+              <a:t>Dependencies:  Database Interface</a:t>
+            </a:r>
+          </a:p>
+          <a:p>
+            <a:pPr lvl="1"/>
+            <a:r>
+              <a:rPr lang="en-US" dirty="0" smtClean="0"/>
+              <a:t>Processing:  User Input Processing</a:t>
+            </a:r>
+          </a:p>
+          <a:p>
+            <a:pPr lvl="1"/>
+            <a:r>
+              <a:rPr lang="en-US" dirty="0" smtClean="0"/>
+              <a:t>Input:  Printer Configuration Data, Material Data</a:t>
+            </a:r>
+          </a:p>
+          <a:p>
+            <a:pPr lvl="1"/>
+            <a:r>
+              <a:rPr lang="en-US" dirty="0" smtClean="0"/>
+              <a:t>Output:  Printer Configuration Data, </a:t>
+            </a:r>
+            <a:r>
+              <a:rPr lang="en-US" dirty="0" smtClean="0"/>
+              <a:t/>
+            </a:r>
+            <a:br>
+              <a:rPr lang="en-US" dirty="0" smtClean="0"/>
+            </a:br>
+            <a:r>
+              <a:rPr lang="en-US" dirty="0" smtClean="0"/>
+              <a:t>Material </a:t>
+            </a:r>
+            <a:r>
+              <a:rPr lang="en-US" dirty="0" smtClean="0"/>
+              <a:t>Data</a:t>
+            </a:r>
+            <a:endParaRPr lang="en-US" dirty="0"/>
           </a:p>
         </p:txBody>
       </p:sp>
@@ -5111,8 +5200,8 @@
         </p:blipFill>
         <p:spPr>
           <a:xfrm>
-            <a:off x="2909366" y="4419600"/>
-            <a:ext cx="5182619" cy="2428533"/>
+            <a:off x="3886200" y="4822240"/>
+            <a:ext cx="4344419" cy="2035760"/>
           </a:xfrm>
           <a:prstGeom prst="rect">
             <a:avLst/>
@@ -5122,7 +5211,7 @@
     </p:spTree>
     <p:extLst>
       <p:ext uri="{BB962C8B-B14F-4D97-AF65-F5344CB8AC3E}">
-        <p14:creationId xmlns:p14="http://schemas.microsoft.com/office/powerpoint/2010/main" val="1146536164"/>
+        <p14:creationId xmlns:p14="http://schemas.microsoft.com/office/powerpoint/2010/main" val="4098163977"/>
       </p:ext>
     </p:extLst>
   </p:cSld>
@@ -5303,47 +5392,54 @@
           <a:p>
             <a:r>
               <a:rPr lang="en-US" dirty="0" smtClean="0"/>
-              <a:t>Status Module</a:t>
-            </a:r>
-          </a:p>
-          <a:p>
-            <a:pPr lvl="1"/>
-            <a:r>
-              <a:rPr lang="en-US" dirty="0" smtClean="0"/>
-              <a:t>Purpose:  Display printer status information to the user and allow the user to stop/pause/resume a print job.</a:t>
-            </a:r>
-          </a:p>
-          <a:p>
-            <a:pPr lvl="1"/>
-            <a:r>
-              <a:rPr lang="en-US" dirty="0" smtClean="0"/>
-              <a:t>Function:  Interpret data from the Printer Feedback Layer and display the data to the user.  Send stop/pause/resume commands to the Physical Layer.</a:t>
-            </a:r>
-          </a:p>
-          <a:p>
-            <a:pPr lvl="1"/>
-            <a:r>
-              <a:rPr lang="en-US" dirty="0" smtClean="0"/>
-              <a:t>Processing:  User Input Processing</a:t>
-            </a:r>
-          </a:p>
-          <a:p>
-            <a:pPr lvl="1"/>
-            <a:r>
-              <a:rPr lang="en-US" dirty="0" smtClean="0"/>
-              <a:t>Input:  Stop/Pause/Resume User Input, Printer State Data, Configuration Data</a:t>
-            </a:r>
-          </a:p>
-          <a:p>
-            <a:pPr lvl="1"/>
-            <a:r>
-              <a:rPr lang="en-US" dirty="0" smtClean="0"/>
-              <a:t>Output:  Stop/Pause/Resume Command</a:t>
-            </a:r>
-          </a:p>
-          <a:p>
-            <a:pPr lvl="1"/>
-            <a:endParaRPr lang="en-US" dirty="0"/>
+              <a:t>Database Interface</a:t>
+            </a:r>
+          </a:p>
+          <a:p>
+            <a:pPr lvl="1"/>
+            <a:r>
+              <a:rPr lang="en-US" dirty="0" smtClean="0"/>
+              <a:t>Purpose:  Abstract data persistence</a:t>
+            </a:r>
+          </a:p>
+          <a:p>
+            <a:pPr lvl="1"/>
+            <a:r>
+              <a:rPr lang="en-US" dirty="0" smtClean="0"/>
+              <a:t>Function:  Receive data from other modules and store it in a database.  Retrieve data from the database for other modules.</a:t>
+            </a:r>
+          </a:p>
+          <a:p>
+            <a:pPr lvl="1"/>
+            <a:r>
+              <a:rPr lang="en-US" dirty="0" smtClean="0"/>
+              <a:t>Dependencies:  None</a:t>
+            </a:r>
+          </a:p>
+          <a:p>
+            <a:pPr lvl="1"/>
+            <a:r>
+              <a:rPr lang="en-US" dirty="0" smtClean="0"/>
+              <a:t>Processing:  Database query generation</a:t>
+            </a:r>
+          </a:p>
+          <a:p>
+            <a:pPr lvl="1"/>
+            <a:r>
+              <a:rPr lang="en-US" dirty="0" smtClean="0"/>
+              <a:t>Input:  Configuration Information</a:t>
+            </a:r>
+          </a:p>
+          <a:p>
+            <a:pPr lvl="1"/>
+            <a:r>
+              <a:rPr lang="en-US" dirty="0" smtClean="0"/>
+              <a:t>Output:  CRUD Operations, Configuration Information</a:t>
+            </a:r>
+          </a:p>
+          <a:p>
+            <a:pPr lvl="1"/>
+            <a:endParaRPr lang="en-US" dirty="0" smtClean="0"/>
           </a:p>
         </p:txBody>
       </p:sp>
@@ -5363,8 +5459,160 @@
         </p:blipFill>
         <p:spPr>
           <a:xfrm>
-            <a:off x="2892536" y="4495800"/>
-            <a:ext cx="5460821" cy="5572874"/>
+            <a:off x="3581400" y="4678650"/>
+            <a:ext cx="4662985" cy="2185037"/>
+          </a:xfrm>
+          <a:prstGeom prst="rect">
+            <a:avLst/>
+          </a:prstGeom>
+        </p:spPr>
+      </p:pic>
+    </p:spTree>
+    <p:extLst>
+      <p:ext uri="{BB962C8B-B14F-4D97-AF65-F5344CB8AC3E}">
+        <p14:creationId xmlns:p14="http://schemas.microsoft.com/office/powerpoint/2010/main" val="1146536164"/>
+      </p:ext>
+    </p:extLst>
+  </p:cSld>
+  <p:clrMapOvr>
+    <a:masterClrMapping/>
+  </p:clrMapOvr>
+  <p:timing>
+    <p:tnLst>
+      <p:par>
+        <p:cTn id="1" dur="indefinite" restart="never" nodeType="tmRoot"/>
+      </p:par>
+    </p:tnLst>
+  </p:timing>
+</p:sld>
+</file>
+
+<file path=ppt/slides/slide21.xml><?xml version="1.0" encoding="utf-8"?>
+<p:sld xmlns:a="http://schemas.openxmlformats.org/drawingml/2006/main" xmlns:r="http://schemas.openxmlformats.org/officeDocument/2006/relationships" xmlns:p="http://schemas.openxmlformats.org/presentationml/2006/main">
+  <p:cSld>
+    <p:spTree>
+      <p:nvGrpSpPr>
+        <p:cNvPr id="1" name=""/>
+        <p:cNvGrpSpPr/>
+        <p:nvPr/>
+      </p:nvGrpSpPr>
+      <p:grpSpPr>
+        <a:xfrm>
+          <a:off x="0" y="0"/>
+          <a:ext cx="0" cy="0"/>
+          <a:chOff x="0" y="0"/>
+          <a:chExt cx="0" cy="0"/>
+        </a:xfrm>
+      </p:grpSpPr>
+      <p:sp>
+        <p:nvSpPr>
+          <p:cNvPr id="2" name="Title 1"/>
+          <p:cNvSpPr>
+            <a:spLocks noGrp="1"/>
+          </p:cNvSpPr>
+          <p:nvPr>
+            <p:ph type="title"/>
+          </p:nvPr>
+        </p:nvSpPr>
+        <p:spPr/>
+        <p:txBody>
+          <a:bodyPr/>
+          <a:lstStyle/>
+          <a:p>
+            <a:r>
+              <a:rPr lang="en-US" sz="4400" dirty="0"/>
+              <a:t>User Interface Layer Subsystems</a:t>
+            </a:r>
+          </a:p>
+        </p:txBody>
+      </p:sp>
+      <p:sp>
+        <p:nvSpPr>
+          <p:cNvPr id="3" name="Content Placeholder 2"/>
+          <p:cNvSpPr>
+            <a:spLocks noGrp="1"/>
+          </p:cNvSpPr>
+          <p:nvPr>
+            <p:ph idx="1"/>
+          </p:nvPr>
+        </p:nvSpPr>
+        <p:spPr/>
+        <p:txBody>
+          <a:bodyPr/>
+          <a:lstStyle/>
+          <a:p>
+            <a:r>
+              <a:rPr lang="en-US" dirty="0" smtClean="0"/>
+              <a:t>Status Module</a:t>
+            </a:r>
+          </a:p>
+          <a:p>
+            <a:pPr lvl="1"/>
+            <a:r>
+              <a:rPr lang="en-US" dirty="0" smtClean="0"/>
+              <a:t>Purpose:  Display printer status information to the user and allow the user to stop/pause/resume a print job.</a:t>
+            </a:r>
+          </a:p>
+          <a:p>
+            <a:pPr lvl="1"/>
+            <a:r>
+              <a:rPr lang="en-US" dirty="0" smtClean="0"/>
+              <a:t>Function:  </a:t>
+            </a:r>
+            <a:r>
+              <a:rPr lang="en-US" dirty="0" smtClean="0"/>
+              <a:t>Interpret and display Printer Feedback.  </a:t>
+            </a:r>
+            <a:r>
+              <a:rPr lang="en-US" dirty="0" smtClean="0"/>
+              <a:t>Send stop/pause/resume commands to the Physical Layer.</a:t>
+            </a:r>
+          </a:p>
+          <a:p>
+            <a:pPr lvl="1"/>
+            <a:r>
+              <a:rPr lang="en-US" dirty="0" smtClean="0"/>
+              <a:t>Processing:  User Input Processing</a:t>
+            </a:r>
+          </a:p>
+          <a:p>
+            <a:pPr lvl="1"/>
+            <a:r>
+              <a:rPr lang="en-US" dirty="0" smtClean="0"/>
+              <a:t>Input:  Stop/Pause/Resume User Input, Printer State Data, Configuration Data</a:t>
+            </a:r>
+          </a:p>
+          <a:p>
+            <a:pPr lvl="1"/>
+            <a:r>
+              <a:rPr lang="en-US" dirty="0" smtClean="0"/>
+              <a:t>Output:  Stop/Pause/Resume Command</a:t>
+            </a:r>
+          </a:p>
+          <a:p>
+            <a:pPr lvl="1"/>
+            <a:endParaRPr lang="en-US" dirty="0"/>
+          </a:p>
+        </p:txBody>
+      </p:sp>
+      <p:pic>
+        <p:nvPicPr>
+          <p:cNvPr id="4" name="Picture 3"/>
+          <p:cNvPicPr>
+            <a:picLocks noChangeAspect="1"/>
+          </p:cNvPicPr>
+          <p:nvPr/>
+        </p:nvPicPr>
+        <p:blipFill>
+          <a:blip r:embed="rId2"/>
+          <a:stretch>
+            <a:fillRect/>
+          </a:stretch>
+        </p:blipFill>
+        <p:spPr>
+          <a:xfrm>
+            <a:off x="3581400" y="4648200"/>
+            <a:ext cx="4779618" cy="4877693"/>
           </a:xfrm>
           <a:prstGeom prst="rect">
             <a:avLst/>
@@ -5391,7 +5639,7 @@
 </p:sld>
 </file>
 
-<file path=ppt/slides/slide21.xml><?xml version="1.0" encoding="utf-8"?>
+<file path=ppt/slides/slide22.xml><?xml version="1.0" encoding="utf-8"?>
 <p:sld xmlns:a="http://schemas.openxmlformats.org/drawingml/2006/main" xmlns:r="http://schemas.openxmlformats.org/officeDocument/2006/relationships" xmlns:p="http://schemas.openxmlformats.org/presentationml/2006/main">
   <p:cSld>
     <p:spTree>
@@ -5516,7 +5764,7 @@
           <a:graphicData uri="http://schemas.openxmlformats.org/presentationml/2006/ole">
             <mc:AlternateContent xmlns:mc="http://schemas.openxmlformats.org/markup-compatibility/2006">
               <mc:Choice xmlns:v="urn:schemas-microsoft-com:vml" Requires="v">
-                <p:oleObj spid="_x0000_s4105" name="Visio" r:id="rId3" imgW="5914944" imgH="4533804" progId="Visio.Drawing.15">
+                <p:oleObj spid="_x0000_s4108" name="Visio" r:id="rId3" imgW="5914944" imgH="4533804" progId="Visio.Drawing.15">
                   <p:embed/>
                 </p:oleObj>
               </mc:Choice>
@@ -5590,7 +5838,7 @@
 </p:sld>
 </file>
 
-<file path=ppt/slides/slide22.xml><?xml version="1.0" encoding="utf-8"?>
+<file path=ppt/slides/slide23.xml><?xml version="1.0" encoding="utf-8"?>
 <p:sld xmlns:a="http://schemas.openxmlformats.org/drawingml/2006/main" xmlns:r="http://schemas.openxmlformats.org/officeDocument/2006/relationships" xmlns:p="http://schemas.openxmlformats.org/presentationml/2006/main">
   <p:cSld>
     <p:spTree>
@@ -5660,8 +5908,29 @@
             </a:r>
             <a:r>
               <a:rPr lang="en-US" dirty="0" smtClean="0"/>
-              <a:t>Provide a uniform interface between the Print Module and the Processing Layer. </a:t>
-            </a:r>
+              <a:t>Uniform interface </a:t>
+            </a:r>
+            <a:r>
+              <a:rPr lang="en-US" dirty="0" smtClean="0"/>
+              <a:t>between </a:t>
+            </a:r>
+            <a:r>
+              <a:rPr lang="en-US" dirty="0" smtClean="0"/>
+              <a:t>Print </a:t>
+            </a:r>
+            <a:r>
+              <a:rPr lang="en-US" dirty="0" smtClean="0"/>
+              <a:t>Module </a:t>
+            </a:r>
+            <a:r>
+              <a:rPr lang="en-US" dirty="0" smtClean="0"/>
+              <a:t>and </a:t>
+            </a:r>
+            <a:r>
+              <a:rPr lang="en-US" dirty="0" smtClean="0"/>
+              <a:t>Processing Layer</a:t>
+            </a:r>
+            <a:endParaRPr lang="en-US" dirty="0" smtClean="0"/>
           </a:p>
           <a:p>
             <a:pPr lvl="1"/>
@@ -5805,7 +6074,7 @@
 </p:sld>
 </file>
 
-<file path=ppt/slides/slide23.xml><?xml version="1.0" encoding="utf-8"?>
+<file path=ppt/slides/slide24.xml><?xml version="1.0" encoding="utf-8"?>
 <p:sld xmlns:a="http://schemas.openxmlformats.org/drawingml/2006/main" xmlns:r="http://schemas.openxmlformats.org/officeDocument/2006/relationships" xmlns:p="http://schemas.openxmlformats.org/presentationml/2006/main">
   <p:cSld>
     <p:spTree>
@@ -5930,7 +6199,7 @@
           <a:graphicData uri="http://schemas.openxmlformats.org/presentationml/2006/ole">
             <mc:AlternateContent xmlns:mc="http://schemas.openxmlformats.org/markup-compatibility/2006">
               <mc:Choice xmlns:v="urn:schemas-microsoft-com:vml" Requires="v">
-                <p:oleObj spid="_x0000_s5128" name="Visio" r:id="rId3" imgW="3943350" imgH="3152790" progId="Visio.Drawing.15">
+                <p:oleObj spid="_x0000_s5131" name="Visio" r:id="rId3" imgW="3943350" imgH="3152790" progId="Visio.Drawing.15">
                   <p:embed/>
                 </p:oleObj>
               </mc:Choice>
@@ -5998,7 +6267,7 @@
 </p:sld>
 </file>
 
-<file path=ppt/slides/slide24.xml><?xml version="1.0" encoding="utf-8"?>
+<file path=ppt/slides/slide25.xml><?xml version="1.0" encoding="utf-8"?>
 <p:sld xmlns:a="http://schemas.openxmlformats.org/drawingml/2006/main" xmlns:r="http://schemas.openxmlformats.org/officeDocument/2006/relationships" xmlns:p="http://schemas.openxmlformats.org/presentationml/2006/main">
   <p:cSld>
     <p:spTree>
@@ -6074,8 +6343,13 @@
             <a:pPr lvl="1"/>
             <a:r>
               <a:rPr lang="en-US" dirty="0" smtClean="0"/>
-              <a:t>Function: Uses the Object File to create a printing path.</a:t>
-            </a:r>
+              <a:t>Function: Uses the Object File to create a printing </a:t>
+            </a:r>
+            <a:r>
+              <a:rPr lang="en-US" dirty="0" smtClean="0"/>
+              <a:t>path</a:t>
+            </a:r>
+            <a:endParaRPr lang="en-US" dirty="0" smtClean="0"/>
           </a:p>
           <a:p>
             <a:pPr lvl="1"/>
@@ -6186,8 +6460,8 @@
         </p:blipFill>
         <p:spPr>
           <a:xfrm>
-            <a:off x="3657600" y="3886200"/>
-            <a:ext cx="4814355" cy="2261157"/>
+            <a:off x="4038600" y="4648200"/>
+            <a:ext cx="4357155" cy="2046424"/>
           </a:xfrm>
           <a:prstGeom prst="rect">
             <a:avLst/>
@@ -6214,7 +6488,7 @@
 </p:sld>
 </file>
 
-<file path=ppt/slides/slide25.xml><?xml version="1.0" encoding="utf-8"?>
+<file path=ppt/slides/slide26.xml><?xml version="1.0" encoding="utf-8"?>
 <p:sld xmlns:a="http://schemas.openxmlformats.org/drawingml/2006/main" xmlns:r="http://schemas.openxmlformats.org/officeDocument/2006/relationships" xmlns:p="http://schemas.openxmlformats.org/presentationml/2006/main">
   <p:cSld>
     <p:spTree>
@@ -6402,7 +6676,7 @@
           <a:graphicData uri="http://schemas.openxmlformats.org/presentationml/2006/ole">
             <mc:AlternateContent xmlns:mc="http://schemas.openxmlformats.org/markup-compatibility/2006">
               <mc:Choice xmlns:v="urn:schemas-microsoft-com:vml" Requires="v">
-                <p:oleObj spid="_x0000_s6155" name="Visio" r:id="rId3" imgW="3943350" imgH="3381480" progId="Visio.Drawing.15">
+                <p:oleObj spid="_x0000_s6158" name="Visio" r:id="rId3" imgW="3943350" imgH="3381480" progId="Visio.Drawing.15">
                   <p:embed/>
                 </p:oleObj>
               </mc:Choice>
@@ -6476,7 +6750,7 @@
 </p:sld>
 </file>
 
-<file path=ppt/slides/slide26.xml><?xml version="1.0" encoding="utf-8"?>
+<file path=ppt/slides/slide27.xml><?xml version="1.0" encoding="utf-8"?>
 <p:sld xmlns:a="http://schemas.openxmlformats.org/drawingml/2006/main" xmlns:r="http://schemas.openxmlformats.org/officeDocument/2006/relationships" xmlns:p="http://schemas.openxmlformats.org/presentationml/2006/main">
   <p:cSld>
     <p:spTree>
@@ -6652,7 +6926,7 @@
         </p:blipFill>
         <p:spPr>
           <a:xfrm>
-            <a:off x="3810000" y="4152444"/>
+            <a:off x="4038600" y="4598271"/>
             <a:ext cx="4267200" cy="2263141"/>
           </a:xfrm>
           <a:prstGeom prst="rect">
@@ -6680,7 +6954,7 @@
 </p:sld>
 </file>
 
-<file path=ppt/slides/slide27.xml><?xml version="1.0" encoding="utf-8"?>
+<file path=ppt/slides/slide28.xml><?xml version="1.0" encoding="utf-8"?>
 <p:sld xmlns:a="http://schemas.openxmlformats.org/drawingml/2006/main" xmlns:r="http://schemas.openxmlformats.org/officeDocument/2006/relationships" xmlns:p="http://schemas.openxmlformats.org/presentationml/2006/main">
   <p:cSld>
     <p:spTree>
@@ -6805,7 +7079,7 @@
           <a:graphicData uri="http://schemas.openxmlformats.org/presentationml/2006/ole">
             <mc:AlternateContent xmlns:mc="http://schemas.openxmlformats.org/markup-compatibility/2006">
               <mc:Choice xmlns:v="urn:schemas-microsoft-com:vml" Requires="v">
-                <p:oleObj spid="_x0000_s7176" name="Visio" r:id="rId3" imgW="6543720" imgH="5695920" progId="Visio.Drawing.15">
+                <p:oleObj spid="_x0000_s7179" name="Visio" r:id="rId3" imgW="6543720" imgH="5695920" progId="Visio.Drawing.15">
                   <p:embed/>
                 </p:oleObj>
               </mc:Choice>
@@ -6873,187 +7147,6 @@
 </p:sld>
 </file>
 
-<file path=ppt/slides/slide28.xml><?xml version="1.0" encoding="utf-8"?>
-<p:sld xmlns:a="http://schemas.openxmlformats.org/drawingml/2006/main" xmlns:r="http://schemas.openxmlformats.org/officeDocument/2006/relationships" xmlns:p="http://schemas.openxmlformats.org/presentationml/2006/main">
-  <p:cSld>
-    <p:spTree>
-      <p:nvGrpSpPr>
-        <p:cNvPr id="1" name=""/>
-        <p:cNvGrpSpPr/>
-        <p:nvPr/>
-      </p:nvGrpSpPr>
-      <p:grpSpPr>
-        <a:xfrm>
-          <a:off x="0" y="0"/>
-          <a:ext cx="0" cy="0"/>
-          <a:chOff x="0" y="0"/>
-          <a:chExt cx="0" cy="0"/>
-        </a:xfrm>
-      </p:grpSpPr>
-      <p:sp>
-        <p:nvSpPr>
-          <p:cNvPr id="2" name="Title 1"/>
-          <p:cNvSpPr>
-            <a:spLocks noGrp="1"/>
-          </p:cNvSpPr>
-          <p:nvPr>
-            <p:ph type="title"/>
-          </p:nvPr>
-        </p:nvSpPr>
-        <p:spPr/>
-        <p:txBody>
-          <a:bodyPr/>
-          <a:lstStyle/>
-          <a:p>
-            <a:r>
-              <a:rPr lang="en-US" dirty="0" smtClean="0"/>
-              <a:t>Physical Layer Subsystems</a:t>
-            </a:r>
-            <a:endParaRPr lang="en-US" dirty="0"/>
-          </a:p>
-        </p:txBody>
-      </p:sp>
-      <p:sp>
-        <p:nvSpPr>
-          <p:cNvPr id="3" name="Content Placeholder 2"/>
-          <p:cNvSpPr>
-            <a:spLocks noGrp="1"/>
-          </p:cNvSpPr>
-          <p:nvPr>
-            <p:ph idx="1"/>
-          </p:nvPr>
-        </p:nvSpPr>
-        <p:spPr/>
-        <p:txBody>
-          <a:bodyPr/>
-          <a:lstStyle/>
-          <a:p>
-            <a:r>
-              <a:rPr lang="en-US" dirty="0" smtClean="0"/>
-              <a:t>Printer State Controller</a:t>
-            </a:r>
-          </a:p>
-          <a:p>
-            <a:pPr lvl="1"/>
-            <a:r>
-              <a:rPr lang="en-US" dirty="0"/>
-              <a:t>Purpose:  </a:t>
-            </a:r>
-            <a:r>
-              <a:rPr lang="en-US" dirty="0" smtClean="0"/>
-              <a:t>To conditionally dispatch G-Codes to packet preparation module based on printer and operator state.</a:t>
-            </a:r>
-            <a:endParaRPr lang="en-US" dirty="0"/>
-          </a:p>
-          <a:p>
-            <a:pPr lvl="1"/>
-            <a:r>
-              <a:rPr lang="en-US" dirty="0" smtClean="0"/>
-              <a:t>Function: Accept status inputs from status module and printer state monitoring and conditionally dispatches G-Code stream to packet preparation module.</a:t>
-            </a:r>
-          </a:p>
-          <a:p>
-            <a:pPr lvl="1"/>
-            <a:r>
-              <a:rPr lang="en-US" dirty="0" smtClean="0"/>
-              <a:t>Dependencies: Packet preparation module, status module, and printer state monitoring module.</a:t>
-            </a:r>
-            <a:endParaRPr lang="en-US" dirty="0"/>
-          </a:p>
-          <a:p>
-            <a:pPr lvl="1"/>
-            <a:r>
-              <a:rPr lang="en-US" dirty="0"/>
-              <a:t>Processing:  </a:t>
-            </a:r>
-            <a:r>
-              <a:rPr lang="en-US" dirty="0" smtClean="0"/>
-              <a:t>May insert G-codes to halt the print if necessary.</a:t>
-            </a:r>
-            <a:endParaRPr lang="en-US" dirty="0"/>
-          </a:p>
-          <a:p>
-            <a:pPr lvl="1"/>
-            <a:r>
-              <a:rPr lang="en-US" dirty="0"/>
-              <a:t>Input</a:t>
-            </a:r>
-            <a:r>
-              <a:rPr lang="en-US" dirty="0" smtClean="0"/>
-              <a:t>: Packet of Files</a:t>
-            </a:r>
-          </a:p>
-          <a:p>
-            <a:pPr lvl="2"/>
-            <a:r>
-              <a:rPr lang="en-US" dirty="0" smtClean="0"/>
-              <a:t>G-Code</a:t>
-            </a:r>
-          </a:p>
-          <a:p>
-            <a:pPr lvl="2"/>
-            <a:r>
-              <a:rPr lang="en-US" dirty="0" smtClean="0"/>
-              <a:t>Print Configuration</a:t>
-            </a:r>
-          </a:p>
-          <a:p>
-            <a:pPr lvl="1"/>
-            <a:r>
-              <a:rPr lang="en-US" dirty="0" smtClean="0"/>
-              <a:t>Output: G-Code</a:t>
-            </a:r>
-          </a:p>
-          <a:p>
-            <a:pPr lvl="1"/>
-            <a:endParaRPr lang="en-US" dirty="0"/>
-          </a:p>
-        </p:txBody>
-      </p:sp>
-      <p:pic>
-        <p:nvPicPr>
-          <p:cNvPr id="4" name="Picture 3"/>
-          <p:cNvPicPr>
-            <a:picLocks noChangeAspect="1"/>
-          </p:cNvPicPr>
-          <p:nvPr/>
-        </p:nvPicPr>
-        <p:blipFill>
-          <a:blip r:embed="rId2"/>
-          <a:stretch>
-            <a:fillRect/>
-          </a:stretch>
-        </p:blipFill>
-        <p:spPr>
-          <a:xfrm>
-            <a:off x="3581399" y="4573161"/>
-            <a:ext cx="4477603" cy="2299624"/>
-          </a:xfrm>
-          <a:prstGeom prst="rect">
-            <a:avLst/>
-          </a:prstGeom>
-        </p:spPr>
-      </p:pic>
-    </p:spTree>
-    <p:extLst>
-      <p:ext uri="{BB962C8B-B14F-4D97-AF65-F5344CB8AC3E}">
-        <p14:creationId xmlns:p14="http://schemas.microsoft.com/office/powerpoint/2010/main" val="2811952652"/>
-      </p:ext>
-    </p:extLst>
-  </p:cSld>
-  <p:clrMapOvr>
-    <a:masterClrMapping/>
-  </p:clrMapOvr>
-  <p:timing>
-    <p:tnLst>
-      <p:par>
-        <p:cTn id="1" dur="indefinite" restart="never" nodeType="tmRoot"/>
-      </p:par>
-    </p:tnLst>
-  </p:timing>
-</p:sld>
-</file>
-
 <file path=ppt/slides/slide29.xml><?xml version="1.0" encoding="utf-8"?>
 <p:sld xmlns:a="http://schemas.openxmlformats.org/drawingml/2006/main" xmlns:r="http://schemas.openxmlformats.org/officeDocument/2006/relationships" xmlns:p="http://schemas.openxmlformats.org/presentationml/2006/main">
   <p:cSld>
@@ -7111,7 +7204,7 @@
           <a:p>
             <a:r>
               <a:rPr lang="en-US" dirty="0" smtClean="0"/>
-              <a:t>Packet Preparation</a:t>
+              <a:t>Printer State Controller</a:t>
             </a:r>
           </a:p>
           <a:p>
@@ -7122,7 +7215,7 @@
             </a:r>
             <a:r>
               <a:rPr lang="en-US" dirty="0" smtClean="0"/>
-              <a:t>Convert G-Code stream into byte-stream for printer.</a:t>
+              <a:t>To conditionally dispatch G-Codes to packet preparation module based on printer and operator state.</a:t>
             </a:r>
             <a:endParaRPr lang="en-US" dirty="0"/>
           </a:p>
@@ -7130,14 +7223,14 @@
             <a:pPr lvl="1"/>
             <a:r>
               <a:rPr lang="en-US" dirty="0" smtClean="0"/>
-              <a:t>Function: Serialize G-Code stream and packetize so that the packets can be transmitted to the printer. Establish serial connection to printer firmware.</a:t>
-            </a:r>
-          </a:p>
-          <a:p>
-            <a:pPr lvl="1"/>
-            <a:r>
-              <a:rPr lang="en-US" dirty="0" smtClean="0"/>
-              <a:t>Dependencies: Printer state controller.</a:t>
+              <a:t>Function: Accept status inputs from status module and printer state monitoring and conditionally dispatches G-Code stream to packet preparation module.</a:t>
+            </a:r>
+          </a:p>
+          <a:p>
+            <a:pPr lvl="1"/>
+            <a:r>
+              <a:rPr lang="en-US" dirty="0" smtClean="0"/>
+              <a:t>Dependencies: Packet preparation module, status module, and printer state monitoring module.</a:t>
             </a:r>
             <a:endParaRPr lang="en-US" dirty="0"/>
           </a:p>
@@ -7149,7 +7242,7 @@
             </a:r>
             <a:r>
               <a:rPr lang="en-US" dirty="0" smtClean="0"/>
-              <a:t>Serialization of G-Code stream. Chunk serialized G-Code stream into packets to be sent to printer firmware.</a:t>
+              <a:t>May insert G-codes to halt the print if necessary.</a:t>
             </a:r>
             <a:endParaRPr lang="en-US" dirty="0"/>
           </a:p>
@@ -7161,21 +7254,29 @@
             </a:r>
             <a:r>
               <a:rPr lang="en-US" dirty="0" smtClean="0"/>
-              <a:t>: Printer State Information, G-Code</a:t>
-            </a:r>
-            <a:endParaRPr lang="en-US" dirty="0"/>
-          </a:p>
-          <a:p>
-            <a:pPr lvl="1"/>
-            <a:r>
-              <a:rPr lang="en-US" dirty="0"/>
-              <a:t>Output</a:t>
-            </a:r>
-            <a:r>
-              <a:rPr lang="en-US" dirty="0" smtClean="0"/>
-              <a:t>: Bits on a Wire</a:t>
-            </a:r>
-            <a:endParaRPr lang="en-US" dirty="0"/>
+              <a:t>: Packet of Files</a:t>
+            </a:r>
+          </a:p>
+          <a:p>
+            <a:pPr lvl="2"/>
+            <a:r>
+              <a:rPr lang="en-US" dirty="0" smtClean="0"/>
+              <a:t>G-Code</a:t>
+            </a:r>
+          </a:p>
+          <a:p>
+            <a:pPr lvl="2"/>
+            <a:r>
+              <a:rPr lang="en-US" dirty="0" smtClean="0"/>
+              <a:t>Print Configuration</a:t>
+            </a:r>
+          </a:p>
+          <a:p>
+            <a:pPr lvl="1"/>
+            <a:r>
+              <a:rPr lang="en-US" dirty="0" smtClean="0"/>
+              <a:t>Output: G-Code</a:t>
+            </a:r>
           </a:p>
           <a:p>
             <a:pPr lvl="1"/>
@@ -7199,8 +7300,8 @@
         </p:blipFill>
         <p:spPr>
           <a:xfrm>
-            <a:off x="3505200" y="4548902"/>
-            <a:ext cx="4546979" cy="2335255"/>
+            <a:off x="3657600" y="4612296"/>
+            <a:ext cx="4401402" cy="2260488"/>
           </a:xfrm>
           <a:prstGeom prst="rect">
             <a:avLst/>
@@ -7210,7 +7311,7 @@
     </p:spTree>
     <p:extLst>
       <p:ext uri="{BB962C8B-B14F-4D97-AF65-F5344CB8AC3E}">
-        <p14:creationId xmlns:p14="http://schemas.microsoft.com/office/powerpoint/2010/main" val="1487547368"/>
+        <p14:creationId xmlns:p14="http://schemas.microsoft.com/office/powerpoint/2010/main" val="2811952652"/>
       </p:ext>
     </p:extLst>
   </p:cSld>
@@ -7363,6 +7464,179 @@
 </file>
 
 <file path=ppt/slides/slide30.xml><?xml version="1.0" encoding="utf-8"?>
+<p:sld xmlns:a="http://schemas.openxmlformats.org/drawingml/2006/main" xmlns:r="http://schemas.openxmlformats.org/officeDocument/2006/relationships" xmlns:p="http://schemas.openxmlformats.org/presentationml/2006/main">
+  <p:cSld>
+    <p:spTree>
+      <p:nvGrpSpPr>
+        <p:cNvPr id="1" name=""/>
+        <p:cNvGrpSpPr/>
+        <p:nvPr/>
+      </p:nvGrpSpPr>
+      <p:grpSpPr>
+        <a:xfrm>
+          <a:off x="0" y="0"/>
+          <a:ext cx="0" cy="0"/>
+          <a:chOff x="0" y="0"/>
+          <a:chExt cx="0" cy="0"/>
+        </a:xfrm>
+      </p:grpSpPr>
+      <p:sp>
+        <p:nvSpPr>
+          <p:cNvPr id="2" name="Title 1"/>
+          <p:cNvSpPr>
+            <a:spLocks noGrp="1"/>
+          </p:cNvSpPr>
+          <p:nvPr>
+            <p:ph type="title"/>
+          </p:nvPr>
+        </p:nvSpPr>
+        <p:spPr/>
+        <p:txBody>
+          <a:bodyPr/>
+          <a:lstStyle/>
+          <a:p>
+            <a:r>
+              <a:rPr lang="en-US" dirty="0" smtClean="0"/>
+              <a:t>Physical Layer Subsystems</a:t>
+            </a:r>
+            <a:endParaRPr lang="en-US" dirty="0"/>
+          </a:p>
+        </p:txBody>
+      </p:sp>
+      <p:sp>
+        <p:nvSpPr>
+          <p:cNvPr id="3" name="Content Placeholder 2"/>
+          <p:cNvSpPr>
+            <a:spLocks noGrp="1"/>
+          </p:cNvSpPr>
+          <p:nvPr>
+            <p:ph idx="1"/>
+          </p:nvPr>
+        </p:nvSpPr>
+        <p:spPr/>
+        <p:txBody>
+          <a:bodyPr/>
+          <a:lstStyle/>
+          <a:p>
+            <a:r>
+              <a:rPr lang="en-US" dirty="0" smtClean="0"/>
+              <a:t>Packet Preparation</a:t>
+            </a:r>
+          </a:p>
+          <a:p>
+            <a:pPr lvl="1"/>
+            <a:r>
+              <a:rPr lang="en-US" dirty="0"/>
+              <a:t>Purpose:  </a:t>
+            </a:r>
+            <a:r>
+              <a:rPr lang="en-US" dirty="0" smtClean="0"/>
+              <a:t>Convert G-Code stream into byte-stream for printer.</a:t>
+            </a:r>
+            <a:endParaRPr lang="en-US" dirty="0"/>
+          </a:p>
+          <a:p>
+            <a:pPr lvl="1"/>
+            <a:r>
+              <a:rPr lang="en-US" dirty="0" smtClean="0"/>
+              <a:t>Function: Serialize G-Code stream and packetize so that the packets can be transmitted to the printer. Establish serial connection to printer firmware.</a:t>
+            </a:r>
+          </a:p>
+          <a:p>
+            <a:pPr lvl="1"/>
+            <a:r>
+              <a:rPr lang="en-US" dirty="0" smtClean="0"/>
+              <a:t>Dependencies: Printer state controller.</a:t>
+            </a:r>
+            <a:endParaRPr lang="en-US" dirty="0"/>
+          </a:p>
+          <a:p>
+            <a:pPr lvl="1"/>
+            <a:r>
+              <a:rPr lang="en-US" dirty="0"/>
+              <a:t>Processing:  </a:t>
+            </a:r>
+            <a:r>
+              <a:rPr lang="en-US" dirty="0" smtClean="0"/>
+              <a:t>Serialization of G-Code stream. Chunk serialized G-Code stream into packets to be sent to printer firmware.</a:t>
+            </a:r>
+            <a:endParaRPr lang="en-US" dirty="0"/>
+          </a:p>
+          <a:p>
+            <a:pPr lvl="1"/>
+            <a:r>
+              <a:rPr lang="en-US" dirty="0"/>
+              <a:t>Input</a:t>
+            </a:r>
+            <a:r>
+              <a:rPr lang="en-US" dirty="0" smtClean="0"/>
+              <a:t>: Printer State Information, G-Code</a:t>
+            </a:r>
+            <a:endParaRPr lang="en-US" dirty="0"/>
+          </a:p>
+          <a:p>
+            <a:pPr lvl="1"/>
+            <a:r>
+              <a:rPr lang="en-US" dirty="0"/>
+              <a:t>Output</a:t>
+            </a:r>
+            <a:r>
+              <a:rPr lang="en-US" dirty="0" smtClean="0"/>
+              <a:t>: Bits on a Wire</a:t>
+            </a:r>
+            <a:endParaRPr lang="en-US" dirty="0"/>
+          </a:p>
+          <a:p>
+            <a:pPr lvl="1"/>
+            <a:endParaRPr lang="en-US" dirty="0"/>
+          </a:p>
+        </p:txBody>
+      </p:sp>
+      <p:pic>
+        <p:nvPicPr>
+          <p:cNvPr id="4" name="Picture 3"/>
+          <p:cNvPicPr>
+            <a:picLocks noChangeAspect="1"/>
+          </p:cNvPicPr>
+          <p:nvPr/>
+        </p:nvPicPr>
+        <p:blipFill>
+          <a:blip r:embed="rId2"/>
+          <a:stretch>
+            <a:fillRect/>
+          </a:stretch>
+        </p:blipFill>
+        <p:spPr>
+          <a:xfrm>
+            <a:off x="3657600" y="4627172"/>
+            <a:ext cx="4394579" cy="2256985"/>
+          </a:xfrm>
+          <a:prstGeom prst="rect">
+            <a:avLst/>
+          </a:prstGeom>
+        </p:spPr>
+      </p:pic>
+    </p:spTree>
+    <p:extLst>
+      <p:ext uri="{BB962C8B-B14F-4D97-AF65-F5344CB8AC3E}">
+        <p14:creationId xmlns:p14="http://schemas.microsoft.com/office/powerpoint/2010/main" val="1487547368"/>
+      </p:ext>
+    </p:extLst>
+  </p:cSld>
+  <p:clrMapOvr>
+    <a:masterClrMapping/>
+  </p:clrMapOvr>
+  <p:timing>
+    <p:tnLst>
+      <p:par>
+        <p:cTn id="1" dur="indefinite" restart="never" nodeType="tmRoot"/>
+      </p:par>
+    </p:tnLst>
+  </p:timing>
+</p:sld>
+</file>
+
+<file path=ppt/slides/slide31.xml><?xml version="1.0" encoding="utf-8"?>
 <p:sld xmlns:a="http://schemas.openxmlformats.org/drawingml/2006/main" xmlns:r="http://schemas.openxmlformats.org/officeDocument/2006/relationships" xmlns:p="http://schemas.openxmlformats.org/presentationml/2006/main">
   <p:cSld>
     <p:spTree>
@@ -7487,7 +7761,7 @@
           <a:graphicData uri="http://schemas.openxmlformats.org/presentationml/2006/ole">
             <mc:AlternateContent xmlns:mc="http://schemas.openxmlformats.org/markup-compatibility/2006">
               <mc:Choice xmlns:v="urn:schemas-microsoft-com:vml" Requires="v">
-                <p:oleObj spid="_x0000_s8200" name="Visio" r:id="rId3" imgW="6486480" imgH="5695920" progId="Visio.Drawing.15">
+                <p:oleObj spid="_x0000_s8203" name="Visio" r:id="rId3" imgW="6486480" imgH="5695920" progId="Visio.Drawing.15">
                   <p:embed/>
                 </p:oleObj>
               </mc:Choice>
@@ -7561,7 +7835,7 @@
 </p:sld>
 </file>
 
-<file path=ppt/slides/slide31.xml><?xml version="1.0" encoding="utf-8"?>
+<file path=ppt/slides/slide32.xml><?xml version="1.0" encoding="utf-8"?>
 <p:sld xmlns:a="http://schemas.openxmlformats.org/drawingml/2006/main" xmlns:r="http://schemas.openxmlformats.org/officeDocument/2006/relationships" xmlns:p="http://schemas.openxmlformats.org/presentationml/2006/main">
   <p:cSld>
     <p:spTree>
@@ -7734,7 +8008,7 @@
 </p:sld>
 </file>
 
-<file path=ppt/slides/slide32.xml><?xml version="1.0" encoding="utf-8"?>
+<file path=ppt/slides/slide33.xml><?xml version="1.0" encoding="utf-8"?>
 <p:sld xmlns:a="http://schemas.openxmlformats.org/drawingml/2006/main" xmlns:r="http://schemas.openxmlformats.org/officeDocument/2006/relationships" xmlns:p="http://schemas.openxmlformats.org/presentationml/2006/main">
   <p:cSld>
     <p:spTree>
@@ -8415,7 +8689,7 @@
           <a:graphicData uri="http://schemas.openxmlformats.org/presentationml/2006/ole">
             <mc:AlternateContent xmlns:mc="http://schemas.openxmlformats.org/markup-compatibility/2006">
               <mc:Choice xmlns:v="urn:schemas-microsoft-com:vml" Requires="v">
-                <p:oleObj spid="_x0000_s1049" name="Visio" r:id="rId3" imgW="3867210" imgH="4695840" progId="Visio.Drawing.15">
+                <p:oleObj spid="_x0000_s1052" name="Visio" r:id="rId3" imgW="3867210" imgH="4695840" progId="Visio.Drawing.15">
                   <p:embed/>
                 </p:oleObj>
               </mc:Choice>

</xml_diff>